<commit_message>
added example where scope is first left and then re-entered (slide #4)
git-svn-id: https://www.hpi.uni-potsdam.de/giese/gforge/svn/bp2009/sources/trunk@1568 3ca8e212-6386-4b1e-b09d-39f68028012c
</commit_message>
<xml_diff>
--- a/de.hpi.sam.bp2009.solution.impactAnalyzer/ExampleTree.pptx
+++ b/de.hpi.sam.bp2009.solution.impactAnalyzer/ExampleTree.pptx
@@ -7,6 +7,9 @@
   <p:sldIdLst>
     <p:sldId id="256" r:id="rId2"/>
     <p:sldId id="257" r:id="rId3"/>
+    <p:sldId id="258" r:id="rId4"/>
+    <p:sldId id="260" r:id="rId5"/>
+    <p:sldId id="259" r:id="rId6"/>
   </p:sldIdLst>
   <p:sldSz cx="9144000" cy="6858000" type="screen4x3"/>
   <p:notesSz cx="6858000" cy="9144000"/>
@@ -3097,10 +3100,10 @@
           <a:p>
             <a:pPr algn="ctr"/>
             <a:r>
-              <a:rPr lang="en-US" dirty="0" smtClean="0"/>
+              <a:rPr lang="en-US" smtClean="0"/>
               <a:t>let x</a:t>
             </a:r>
-            <a:endParaRPr lang="en-US" dirty="0"/>
+            <a:endParaRPr lang="en-US"/>
           </a:p>
         </p:txBody>
       </p:sp>
@@ -3141,18 +3144,18 @@
           <a:p>
             <a:pPr algn="ctr"/>
             <a:r>
-              <a:rPr lang="en-US" dirty="0" smtClean="0"/>
+              <a:rPr lang="en-US" smtClean="0"/>
               <a:t>select(</a:t>
             </a:r>
             <a:r>
-              <a:rPr lang="en-US" dirty="0" err="1" smtClean="0"/>
+              <a:rPr lang="en-US" err="1" smtClean="0"/>
               <a:t>i</a:t>
             </a:r>
             <a:r>
-              <a:rPr lang="en-US" dirty="0" smtClean="0"/>
+              <a:rPr lang="en-US" smtClean="0"/>
               <a:t>|...)</a:t>
             </a:r>
-            <a:endParaRPr lang="en-US" dirty="0"/>
+            <a:endParaRPr lang="en-US"/>
           </a:p>
         </p:txBody>
       </p:sp>
@@ -3193,14 +3196,14 @@
           <a:p>
             <a:pPr algn="ctr"/>
             <a:r>
-              <a:rPr lang="en-US" dirty="0" err="1" smtClean="0"/>
+              <a:rPr lang="en-US" err="1" smtClean="0"/>
               <a:t>x.a</a:t>
             </a:r>
             <a:r>
-              <a:rPr lang="en-US" dirty="0" err="1" smtClean="0"/>
+              <a:rPr lang="en-US" err="1" smtClean="0"/>
               <a:t>.d</a:t>
             </a:r>
-            <a:endParaRPr lang="en-US" dirty="0"/>
+            <a:endParaRPr lang="en-US"/>
           </a:p>
         </p:txBody>
       </p:sp>
@@ -3371,10 +3374,10 @@
           <a:lstStyle/>
           <a:p>
             <a:r>
-              <a:rPr lang="en-US" dirty="0" smtClean="0"/>
+              <a:rPr lang="en-US" smtClean="0"/>
               <a:t>in</a:t>
             </a:r>
-            <a:endParaRPr lang="en-US" dirty="0"/>
+            <a:endParaRPr lang="en-US"/>
           </a:p>
         </p:txBody>
       </p:sp>
@@ -3401,10 +3404,10 @@
           <a:lstStyle/>
           <a:p>
             <a:r>
-              <a:rPr lang="en-US" dirty="0" smtClean="0"/>
+              <a:rPr lang="en-US" smtClean="0"/>
               <a:t>source</a:t>
             </a:r>
-            <a:endParaRPr lang="en-US" dirty="0"/>
+            <a:endParaRPr lang="en-US"/>
           </a:p>
         </p:txBody>
       </p:sp>
@@ -3431,10 +3434,10 @@
           <a:lstStyle/>
           <a:p>
             <a:r>
-              <a:rPr lang="en-US" dirty="0" smtClean="0"/>
+              <a:rPr lang="en-US" smtClean="0"/>
               <a:t>body</a:t>
             </a:r>
-            <a:endParaRPr lang="en-US" dirty="0"/>
+            <a:endParaRPr lang="en-US"/>
           </a:p>
         </p:txBody>
       </p:sp>
@@ -3475,10 +3478,10 @@
           <a:p>
             <a:pPr algn="ctr"/>
             <a:r>
-              <a:rPr lang="en-US" dirty="0" smtClean="0"/>
+              <a:rPr lang="en-US" smtClean="0"/>
               <a:t>let y</a:t>
             </a:r>
-            <a:endParaRPr lang="en-US" dirty="0"/>
+            <a:endParaRPr lang="en-US"/>
           </a:p>
         </p:txBody>
       </p:sp>
@@ -3519,18 +3522,18 @@
           <a:p>
             <a:pPr algn="ctr"/>
             <a:r>
-              <a:rPr lang="en-US" dirty="0" err="1" smtClean="0"/>
+              <a:rPr lang="en-US" err="1" smtClean="0"/>
               <a:t>y.b</a:t>
             </a:r>
             <a:r>
-              <a:rPr lang="en-US" dirty="0" smtClean="0"/>
+              <a:rPr lang="en-US" smtClean="0"/>
               <a:t>&gt;</a:t>
             </a:r>
             <a:r>
-              <a:rPr lang="en-US" dirty="0" err="1" smtClean="0"/>
+              <a:rPr lang="en-US" err="1" smtClean="0"/>
               <a:t>i.c+x.a</a:t>
             </a:r>
-            <a:endParaRPr lang="en-US" dirty="0"/>
+            <a:endParaRPr lang="en-US"/>
           </a:p>
         </p:txBody>
       </p:sp>
@@ -3629,10 +3632,10 @@
           <a:lstStyle/>
           <a:p>
             <a:r>
-              <a:rPr lang="en-US" dirty="0" smtClean="0"/>
+              <a:rPr lang="en-US" smtClean="0"/>
               <a:t>in</a:t>
             </a:r>
-            <a:endParaRPr lang="en-US" dirty="0"/>
+            <a:endParaRPr lang="en-US"/>
           </a:p>
         </p:txBody>
       </p:sp>
@@ -3659,10 +3662,10 @@
           <a:lstStyle/>
           <a:p>
             <a:r>
-              <a:rPr lang="en-US" dirty="0" err="1" smtClean="0"/>
+              <a:rPr lang="en-US" err="1" smtClean="0"/>
               <a:t>initExpr</a:t>
             </a:r>
-            <a:endParaRPr lang="en-US" dirty="0"/>
+            <a:endParaRPr lang="en-US"/>
           </a:p>
         </p:txBody>
       </p:sp>
@@ -3703,18 +3706,18 @@
           <a:p>
             <a:pPr algn="ctr"/>
             <a:r>
-              <a:rPr lang="en-US" dirty="0" err="1" smtClean="0"/>
+              <a:rPr lang="en-US" err="1" smtClean="0"/>
               <a:t>x.a</a:t>
             </a:r>
             <a:r>
-              <a:rPr lang="en-US" dirty="0" smtClean="0"/>
+              <a:rPr lang="en-US" smtClean="0"/>
               <a:t>&gt;</a:t>
             </a:r>
             <a:r>
-              <a:rPr lang="en-US" dirty="0" err="1" smtClean="0"/>
+              <a:rPr lang="en-US" err="1" smtClean="0"/>
               <a:t>i.c</a:t>
             </a:r>
-            <a:endParaRPr lang="en-US" dirty="0"/>
+            <a:endParaRPr lang="en-US"/>
           </a:p>
         </p:txBody>
       </p:sp>
@@ -3755,18 +3758,18 @@
           <a:p>
             <a:pPr algn="ctr"/>
             <a:r>
-              <a:rPr lang="en-US" dirty="0" err="1" smtClean="0"/>
+              <a:rPr lang="en-US" err="1" smtClean="0"/>
               <a:t>self</a:t>
             </a:r>
             <a:r>
-              <a:rPr lang="en-US" dirty="0" err="1" smtClean="0"/>
+              <a:rPr lang="en-US" err="1" smtClean="0"/>
               <a:t>.g</a:t>
             </a:r>
             <a:r>
-              <a:rPr lang="en-US" dirty="0" smtClean="0"/>
+              <a:rPr lang="en-US" smtClean="0"/>
               <a:t>&gt;3</a:t>
             </a:r>
-            <a:endParaRPr lang="en-US" dirty="0"/>
+            <a:endParaRPr lang="en-US"/>
           </a:p>
         </p:txBody>
       </p:sp>
@@ -3807,10 +3810,10 @@
           <a:p>
             <a:pPr algn="ctr"/>
             <a:r>
-              <a:rPr lang="en-US" dirty="0" smtClean="0"/>
+              <a:rPr lang="en-US" smtClean="0"/>
               <a:t>if</a:t>
             </a:r>
-            <a:endParaRPr lang="en-US" dirty="0"/>
+            <a:endParaRPr lang="en-US"/>
           </a:p>
         </p:txBody>
       </p:sp>
@@ -3945,10 +3948,10 @@
           <a:lstStyle/>
           <a:p>
             <a:r>
-              <a:rPr lang="en-US" dirty="0" err="1" smtClean="0"/>
+              <a:rPr lang="en-US" err="1" smtClean="0"/>
               <a:t>cond</a:t>
             </a:r>
-            <a:endParaRPr lang="en-US" dirty="0"/>
+            <a:endParaRPr lang="en-US"/>
           </a:p>
         </p:txBody>
       </p:sp>
@@ -3975,10 +3978,10 @@
           <a:lstStyle/>
           <a:p>
             <a:r>
-              <a:rPr lang="en-US" dirty="0" smtClean="0"/>
+              <a:rPr lang="en-US" smtClean="0"/>
               <a:t>then</a:t>
             </a:r>
-            <a:endParaRPr lang="en-US" dirty="0"/>
+            <a:endParaRPr lang="en-US"/>
           </a:p>
         </p:txBody>
       </p:sp>
@@ -4005,10 +4008,10 @@
           <a:lstStyle/>
           <a:p>
             <a:r>
-              <a:rPr lang="en-US" dirty="0" smtClean="0"/>
+              <a:rPr lang="en-US" smtClean="0"/>
               <a:t>else</a:t>
             </a:r>
-            <a:endParaRPr lang="en-US" dirty="0"/>
+            <a:endParaRPr lang="en-US"/>
           </a:p>
         </p:txBody>
       </p:sp>
@@ -4049,10 +4052,10 @@
           <a:p>
             <a:pPr algn="ctr"/>
             <a:r>
-              <a:rPr lang="en-US" dirty="0" smtClean="0"/>
+              <a:rPr lang="en-US" smtClean="0"/>
               <a:t>let z</a:t>
             </a:r>
-            <a:endParaRPr lang="en-US" dirty="0"/>
+            <a:endParaRPr lang="en-US"/>
           </a:p>
         </p:txBody>
       </p:sp>
@@ -4093,14 +4096,14 @@
           <a:p>
             <a:pPr algn="ctr"/>
             <a:r>
-              <a:rPr lang="en-US" dirty="0" err="1" smtClean="0"/>
+              <a:rPr lang="en-US" err="1" smtClean="0"/>
               <a:t>i.c</a:t>
             </a:r>
             <a:r>
-              <a:rPr lang="en-US" dirty="0" smtClean="0"/>
+              <a:rPr lang="en-US" smtClean="0"/>
               <a:t>-2</a:t>
             </a:r>
-            <a:endParaRPr lang="en-US" dirty="0"/>
+            <a:endParaRPr lang="en-US"/>
           </a:p>
         </p:txBody>
       </p:sp>
@@ -4141,10 +4144,10 @@
           <a:p>
             <a:pPr algn="ctr"/>
             <a:r>
-              <a:rPr lang="en-US" dirty="0" err="1" smtClean="0"/>
+              <a:rPr lang="en-US" err="1" smtClean="0"/>
               <a:t>z+i.c</a:t>
             </a:r>
-            <a:endParaRPr lang="en-US" dirty="0"/>
+            <a:endParaRPr lang="en-US"/>
           </a:p>
         </p:txBody>
       </p:sp>
@@ -4243,10 +4246,10 @@
           <a:lstStyle/>
           <a:p>
             <a:r>
-              <a:rPr lang="en-US" dirty="0" smtClean="0"/>
+              <a:rPr lang="en-US" smtClean="0"/>
               <a:t>in</a:t>
             </a:r>
-            <a:endParaRPr lang="en-US" dirty="0"/>
+            <a:endParaRPr lang="en-US"/>
           </a:p>
         </p:txBody>
       </p:sp>
@@ -4273,10 +4276,10 @@
           <a:lstStyle/>
           <a:p>
             <a:r>
-              <a:rPr lang="en-US" dirty="0" err="1" smtClean="0"/>
+              <a:rPr lang="en-US" err="1" smtClean="0"/>
               <a:t>initExpr</a:t>
             </a:r>
-            <a:endParaRPr lang="en-US" dirty="0"/>
+            <a:endParaRPr lang="en-US"/>
           </a:p>
         </p:txBody>
       </p:sp>
@@ -4317,18 +4320,18 @@
           <a:p>
             <a:pPr algn="ctr"/>
             <a:r>
-              <a:rPr lang="en-US" dirty="0" smtClean="0"/>
+              <a:rPr lang="en-US" smtClean="0"/>
               <a:t>collect(</a:t>
             </a:r>
             <a:r>
-              <a:rPr lang="en-US" dirty="0" smtClean="0"/>
+              <a:rPr lang="en-US" smtClean="0"/>
               <a:t>j</a:t>
             </a:r>
             <a:r>
-              <a:rPr lang="en-US" dirty="0" smtClean="0"/>
+              <a:rPr lang="en-US" smtClean="0"/>
               <a:t>|...)-&gt;any(true)</a:t>
             </a:r>
-            <a:endParaRPr lang="en-US" dirty="0"/>
+            <a:endParaRPr lang="en-US"/>
           </a:p>
         </p:txBody>
       </p:sp>
@@ -4369,10 +4372,10 @@
           <a:p>
             <a:pPr algn="ctr"/>
             <a:r>
-              <a:rPr lang="en-US" dirty="0" err="1" smtClean="0"/>
+              <a:rPr lang="en-US" err="1" smtClean="0"/>
               <a:t>self.f</a:t>
             </a:r>
-            <a:endParaRPr lang="en-US" dirty="0"/>
+            <a:endParaRPr lang="en-US"/>
           </a:p>
         </p:txBody>
       </p:sp>
@@ -4471,10 +4474,10 @@
           <a:lstStyle/>
           <a:p>
             <a:r>
-              <a:rPr lang="en-US" dirty="0" smtClean="0"/>
+              <a:rPr lang="en-US" smtClean="0"/>
               <a:t>source</a:t>
             </a:r>
-            <a:endParaRPr lang="en-US" dirty="0"/>
+            <a:endParaRPr lang="en-US"/>
           </a:p>
         </p:txBody>
       </p:sp>
@@ -4501,10 +4504,10 @@
           <a:lstStyle/>
           <a:p>
             <a:r>
-              <a:rPr lang="en-US" dirty="0" smtClean="0"/>
+              <a:rPr lang="en-US" smtClean="0"/>
               <a:t>body</a:t>
             </a:r>
-            <a:endParaRPr lang="en-US" dirty="0"/>
+            <a:endParaRPr lang="en-US"/>
           </a:p>
         </p:txBody>
       </p:sp>
@@ -4545,10 +4548,10 @@
           <a:p>
             <a:pPr algn="ctr"/>
             <a:r>
-              <a:rPr lang="en-US" dirty="0" err="1" smtClean="0"/>
+              <a:rPr lang="en-US" err="1" smtClean="0"/>
               <a:t>j.e</a:t>
             </a:r>
-            <a:endParaRPr lang="en-US" dirty="0"/>
+            <a:endParaRPr lang="en-US"/>
           </a:p>
         </p:txBody>
       </p:sp>
@@ -4575,10 +4578,10 @@
           <a:lstStyle/>
           <a:p>
             <a:r>
-              <a:rPr lang="en-US" dirty="0" err="1" smtClean="0"/>
+              <a:rPr lang="en-US" err="1" smtClean="0"/>
               <a:t>initExpr</a:t>
             </a:r>
-            <a:endParaRPr lang="en-US" dirty="0"/>
+            <a:endParaRPr lang="en-US"/>
           </a:p>
         </p:txBody>
       </p:sp>
@@ -4644,10 +4647,10 @@
           <a:p>
             <a:pPr algn="ctr"/>
             <a:r>
-              <a:rPr lang="en-US" dirty="0" smtClean="0"/>
+              <a:rPr lang="en-US" smtClean="0"/>
               <a:t>let x</a:t>
             </a:r>
-            <a:endParaRPr lang="en-US" dirty="0"/>
+            <a:endParaRPr lang="en-US"/>
           </a:p>
         </p:txBody>
       </p:sp>
@@ -4688,18 +4691,18 @@
           <a:p>
             <a:pPr algn="ctr"/>
             <a:r>
-              <a:rPr lang="en-US" dirty="0" smtClean="0"/>
+              <a:rPr lang="en-US" smtClean="0"/>
               <a:t>select(</a:t>
             </a:r>
             <a:r>
-              <a:rPr lang="en-US" dirty="0" err="1" smtClean="0"/>
+              <a:rPr lang="en-US" err="1" smtClean="0"/>
               <a:t>i</a:t>
             </a:r>
             <a:r>
-              <a:rPr lang="en-US" dirty="0" smtClean="0"/>
+              <a:rPr lang="en-US" smtClean="0"/>
               <a:t>|...)</a:t>
             </a:r>
-            <a:endParaRPr lang="en-US" dirty="0"/>
+            <a:endParaRPr lang="en-US"/>
           </a:p>
         </p:txBody>
       </p:sp>
@@ -4740,14 +4743,14 @@
           <a:p>
             <a:pPr algn="ctr"/>
             <a:r>
-              <a:rPr lang="en-US" dirty="0" err="1" smtClean="0"/>
+              <a:rPr lang="en-US" err="1" smtClean="0"/>
               <a:t>x.a</a:t>
             </a:r>
             <a:r>
-              <a:rPr lang="en-US" dirty="0" err="1" smtClean="0"/>
+              <a:rPr lang="en-US" err="1" smtClean="0"/>
               <a:t>.d</a:t>
             </a:r>
-            <a:endParaRPr lang="en-US" dirty="0"/>
+            <a:endParaRPr lang="en-US"/>
           </a:p>
         </p:txBody>
       </p:sp>
@@ -4918,10 +4921,10 @@
           <a:lstStyle/>
           <a:p>
             <a:r>
-              <a:rPr lang="en-US" dirty="0" smtClean="0"/>
+              <a:rPr lang="en-US" smtClean="0"/>
               <a:t>in</a:t>
             </a:r>
-            <a:endParaRPr lang="en-US" dirty="0"/>
+            <a:endParaRPr lang="en-US"/>
           </a:p>
         </p:txBody>
       </p:sp>
@@ -4948,10 +4951,10 @@
           <a:lstStyle/>
           <a:p>
             <a:r>
-              <a:rPr lang="en-US" dirty="0" smtClean="0"/>
+              <a:rPr lang="en-US" smtClean="0"/>
               <a:t>source</a:t>
             </a:r>
-            <a:endParaRPr lang="en-US" dirty="0"/>
+            <a:endParaRPr lang="en-US"/>
           </a:p>
         </p:txBody>
       </p:sp>
@@ -4978,10 +4981,10 @@
           <a:lstStyle/>
           <a:p>
             <a:r>
-              <a:rPr lang="en-US" dirty="0" smtClean="0"/>
+              <a:rPr lang="en-US" smtClean="0"/>
               <a:t>body</a:t>
             </a:r>
-            <a:endParaRPr lang="en-US" dirty="0"/>
+            <a:endParaRPr lang="en-US"/>
           </a:p>
         </p:txBody>
       </p:sp>
@@ -5022,10 +5025,10 @@
           <a:p>
             <a:pPr algn="ctr"/>
             <a:r>
-              <a:rPr lang="en-US" dirty="0" smtClean="0"/>
+              <a:rPr lang="en-US" smtClean="0"/>
               <a:t>let y</a:t>
             </a:r>
-            <a:endParaRPr lang="en-US" dirty="0"/>
+            <a:endParaRPr lang="en-US"/>
           </a:p>
         </p:txBody>
       </p:sp>
@@ -5066,18 +5069,18 @@
           <a:p>
             <a:pPr algn="ctr"/>
             <a:r>
-              <a:rPr lang="en-US" dirty="0" err="1" smtClean="0"/>
+              <a:rPr lang="en-US" err="1" smtClean="0"/>
               <a:t>y.b</a:t>
             </a:r>
             <a:r>
-              <a:rPr lang="en-US" dirty="0" smtClean="0"/>
+              <a:rPr lang="en-US" smtClean="0"/>
               <a:t>&gt;</a:t>
             </a:r>
             <a:r>
-              <a:rPr lang="en-US" dirty="0" err="1" smtClean="0"/>
+              <a:rPr lang="en-US" err="1" smtClean="0"/>
               <a:t>i.c+x.a</a:t>
             </a:r>
-            <a:endParaRPr lang="en-US" dirty="0"/>
+            <a:endParaRPr lang="en-US"/>
           </a:p>
         </p:txBody>
       </p:sp>
@@ -5176,10 +5179,10 @@
           <a:lstStyle/>
           <a:p>
             <a:r>
-              <a:rPr lang="en-US" dirty="0" smtClean="0"/>
+              <a:rPr lang="en-US" smtClean="0"/>
               <a:t>in</a:t>
             </a:r>
-            <a:endParaRPr lang="en-US" dirty="0"/>
+            <a:endParaRPr lang="en-US"/>
           </a:p>
         </p:txBody>
       </p:sp>
@@ -5206,10 +5209,10 @@
           <a:lstStyle/>
           <a:p>
             <a:r>
-              <a:rPr lang="en-US" dirty="0" err="1" smtClean="0"/>
+              <a:rPr lang="en-US" err="1" smtClean="0"/>
               <a:t>initExpr</a:t>
             </a:r>
-            <a:endParaRPr lang="en-US" dirty="0"/>
+            <a:endParaRPr lang="en-US"/>
           </a:p>
         </p:txBody>
       </p:sp>
@@ -5250,18 +5253,18 @@
           <a:p>
             <a:pPr algn="ctr"/>
             <a:r>
-              <a:rPr lang="en-US" dirty="0" err="1" smtClean="0"/>
+              <a:rPr lang="en-US" err="1" smtClean="0"/>
               <a:t>x.a</a:t>
             </a:r>
             <a:r>
-              <a:rPr lang="en-US" dirty="0" smtClean="0"/>
+              <a:rPr lang="en-US" smtClean="0"/>
               <a:t>&gt;</a:t>
             </a:r>
             <a:r>
-              <a:rPr lang="en-US" dirty="0" err="1" smtClean="0"/>
+              <a:rPr lang="en-US" err="1" smtClean="0"/>
               <a:t>i.c</a:t>
             </a:r>
-            <a:endParaRPr lang="en-US" dirty="0"/>
+            <a:endParaRPr lang="en-US"/>
           </a:p>
         </p:txBody>
       </p:sp>
@@ -5302,14 +5305,14 @@
           <a:p>
             <a:pPr algn="ctr"/>
             <a:r>
-              <a:rPr lang="en-US" dirty="0" err="1" smtClean="0"/>
+              <a:rPr lang="en-US" err="1" smtClean="0"/>
               <a:t>self.g</a:t>
             </a:r>
             <a:r>
-              <a:rPr lang="en-US" dirty="0" smtClean="0"/>
+              <a:rPr lang="en-US" smtClean="0"/>
               <a:t>&gt;3</a:t>
             </a:r>
-            <a:endParaRPr lang="en-US" dirty="0"/>
+            <a:endParaRPr lang="en-US"/>
           </a:p>
         </p:txBody>
       </p:sp>
@@ -5350,10 +5353,10 @@
           <a:p>
             <a:pPr algn="ctr"/>
             <a:r>
-              <a:rPr lang="en-US" dirty="0" smtClean="0"/>
+              <a:rPr lang="en-US" smtClean="0"/>
               <a:t>if</a:t>
             </a:r>
-            <a:endParaRPr lang="en-US" dirty="0"/>
+            <a:endParaRPr lang="en-US"/>
           </a:p>
         </p:txBody>
       </p:sp>
@@ -5488,10 +5491,10 @@
           <a:lstStyle/>
           <a:p>
             <a:r>
-              <a:rPr lang="en-US" dirty="0" err="1" smtClean="0"/>
+              <a:rPr lang="en-US" err="1" smtClean="0"/>
               <a:t>cond</a:t>
             </a:r>
-            <a:endParaRPr lang="en-US" dirty="0"/>
+            <a:endParaRPr lang="en-US"/>
           </a:p>
         </p:txBody>
       </p:sp>
@@ -5518,10 +5521,10 @@
           <a:lstStyle/>
           <a:p>
             <a:r>
-              <a:rPr lang="en-US" dirty="0" smtClean="0"/>
+              <a:rPr lang="en-US" smtClean="0"/>
               <a:t>then</a:t>
             </a:r>
-            <a:endParaRPr lang="en-US" dirty="0"/>
+            <a:endParaRPr lang="en-US"/>
           </a:p>
         </p:txBody>
       </p:sp>
@@ -5548,10 +5551,10 @@
           <a:lstStyle/>
           <a:p>
             <a:r>
-              <a:rPr lang="en-US" dirty="0" smtClean="0"/>
+              <a:rPr lang="en-US" smtClean="0"/>
               <a:t>else</a:t>
             </a:r>
-            <a:endParaRPr lang="en-US" dirty="0"/>
+            <a:endParaRPr lang="en-US"/>
           </a:p>
         </p:txBody>
       </p:sp>
@@ -5592,10 +5595,10 @@
           <a:p>
             <a:pPr algn="ctr"/>
             <a:r>
-              <a:rPr lang="en-US" dirty="0" smtClean="0"/>
+              <a:rPr lang="en-US" smtClean="0"/>
               <a:t>let z</a:t>
             </a:r>
-            <a:endParaRPr lang="en-US" dirty="0"/>
+            <a:endParaRPr lang="en-US"/>
           </a:p>
         </p:txBody>
       </p:sp>
@@ -5636,14 +5639,14 @@
           <a:p>
             <a:pPr algn="ctr"/>
             <a:r>
-              <a:rPr lang="en-US" dirty="0" err="1" smtClean="0"/>
+              <a:rPr lang="en-US" err="1" smtClean="0"/>
               <a:t>i.c</a:t>
             </a:r>
             <a:r>
-              <a:rPr lang="en-US" dirty="0" smtClean="0"/>
+              <a:rPr lang="en-US" smtClean="0"/>
               <a:t>-2</a:t>
             </a:r>
-            <a:endParaRPr lang="en-US" dirty="0"/>
+            <a:endParaRPr lang="en-US"/>
           </a:p>
         </p:txBody>
       </p:sp>
@@ -5684,10 +5687,10 @@
           <a:p>
             <a:pPr algn="ctr"/>
             <a:r>
-              <a:rPr lang="en-US" dirty="0" err="1" smtClean="0"/>
+              <a:rPr lang="en-US" err="1" smtClean="0"/>
               <a:t>z+i.c</a:t>
             </a:r>
-            <a:endParaRPr lang="en-US" dirty="0"/>
+            <a:endParaRPr lang="en-US"/>
           </a:p>
         </p:txBody>
       </p:sp>
@@ -5786,10 +5789,10 @@
           <a:lstStyle/>
           <a:p>
             <a:r>
-              <a:rPr lang="en-US" dirty="0" smtClean="0"/>
+              <a:rPr lang="en-US" smtClean="0"/>
               <a:t>in</a:t>
             </a:r>
-            <a:endParaRPr lang="en-US" dirty="0"/>
+            <a:endParaRPr lang="en-US"/>
           </a:p>
         </p:txBody>
       </p:sp>
@@ -5816,10 +5819,10 @@
           <a:lstStyle/>
           <a:p>
             <a:r>
-              <a:rPr lang="en-US" dirty="0" err="1" smtClean="0"/>
+              <a:rPr lang="en-US" err="1" smtClean="0"/>
               <a:t>initExpr</a:t>
             </a:r>
-            <a:endParaRPr lang="en-US" dirty="0"/>
+            <a:endParaRPr lang="en-US"/>
           </a:p>
         </p:txBody>
       </p:sp>
@@ -5860,10 +5863,10 @@
           <a:p>
             <a:pPr algn="ctr"/>
             <a:r>
-              <a:rPr lang="en-US" dirty="0" err="1" smtClean="0"/>
+              <a:rPr lang="en-US" err="1" smtClean="0"/>
               <a:t>self.f</a:t>
             </a:r>
-            <a:endParaRPr lang="en-US" dirty="0"/>
+            <a:endParaRPr lang="en-US"/>
           </a:p>
         </p:txBody>
       </p:sp>
@@ -5962,10 +5965,10 @@
           <a:lstStyle/>
           <a:p>
             <a:r>
-              <a:rPr lang="en-US" dirty="0" smtClean="0"/>
+              <a:rPr lang="en-US" smtClean="0"/>
               <a:t>source</a:t>
             </a:r>
-            <a:endParaRPr lang="en-US" dirty="0"/>
+            <a:endParaRPr lang="en-US"/>
           </a:p>
         </p:txBody>
       </p:sp>
@@ -5992,10 +5995,10 @@
           <a:lstStyle/>
           <a:p>
             <a:r>
-              <a:rPr lang="en-US" dirty="0" smtClean="0"/>
+              <a:rPr lang="en-US" smtClean="0"/>
               <a:t>body</a:t>
             </a:r>
-            <a:endParaRPr lang="en-US" dirty="0"/>
+            <a:endParaRPr lang="en-US"/>
           </a:p>
         </p:txBody>
       </p:sp>
@@ -6036,10 +6039,10 @@
           <a:p>
             <a:pPr algn="ctr"/>
             <a:r>
-              <a:rPr lang="en-US" dirty="0" err="1" smtClean="0"/>
+              <a:rPr lang="en-US" err="1" smtClean="0"/>
               <a:t>j.e</a:t>
             </a:r>
-            <a:endParaRPr lang="en-US" dirty="0"/>
+            <a:endParaRPr lang="en-US"/>
           </a:p>
         </p:txBody>
       </p:sp>
@@ -6112,10 +6115,10 @@
           <a:lstStyle/>
           <a:p>
             <a:r>
-              <a:rPr lang="en-US" dirty="0" err="1" smtClean="0"/>
+              <a:rPr lang="en-US" err="1" smtClean="0"/>
               <a:t>initExpr</a:t>
             </a:r>
-            <a:endParaRPr lang="en-US" dirty="0"/>
+            <a:endParaRPr lang="en-US"/>
           </a:p>
         </p:txBody>
       </p:sp>
@@ -6156,18 +6159,3250 @@
           <a:p>
             <a:pPr algn="ctr"/>
             <a:r>
-              <a:rPr lang="en-US" dirty="0" smtClean="0"/>
+              <a:rPr lang="en-US" smtClean="0"/>
               <a:t>collect(</a:t>
             </a:r>
             <a:r>
-              <a:rPr lang="en-US" dirty="0" smtClean="0"/>
+              <a:rPr lang="en-US" smtClean="0"/>
               <a:t>j</a:t>
             </a:r>
             <a:r>
-              <a:rPr lang="en-US" dirty="0" smtClean="0"/>
+              <a:rPr lang="en-US" smtClean="0"/>
               <a:t>|...)-&gt;any(true)</a:t>
             </a:r>
-            <a:endParaRPr lang="en-US" dirty="0"/>
+            <a:endParaRPr lang="en-US"/>
+          </a:p>
+        </p:txBody>
+      </p:sp>
+    </p:spTree>
+  </p:cSld>
+  <p:clrMapOvr>
+    <a:masterClrMapping/>
+  </p:clrMapOvr>
+</p:sld>
+</file>
+
+<file path=ppt/slides/slide3.xml><?xml version="1.0" encoding="utf-8"?>
+<p:sld xmlns:a="http://schemas.openxmlformats.org/drawingml/2006/main" xmlns:r="http://schemas.openxmlformats.org/officeDocument/2006/relationships" xmlns:p="http://schemas.openxmlformats.org/presentationml/2006/main">
+  <p:cSld>
+    <p:spTree>
+      <p:nvGrpSpPr>
+        <p:cNvPr id="1" name=""/>
+        <p:cNvGrpSpPr/>
+        <p:nvPr/>
+      </p:nvGrpSpPr>
+      <p:grpSpPr>
+        <a:xfrm>
+          <a:off x="0" y="0"/>
+          <a:ext cx="0" cy="0"/>
+          <a:chOff x="0" y="0"/>
+          <a:chExt cx="0" cy="0"/>
+        </a:xfrm>
+      </p:grpSpPr>
+      <p:sp>
+        <p:nvSpPr>
+          <p:cNvPr id="50" name="Oval 49"/>
+          <p:cNvSpPr/>
+          <p:nvPr/>
+        </p:nvSpPr>
+        <p:spPr>
+          <a:xfrm>
+            <a:off x="3886200" y="152400"/>
+            <a:ext cx="914400" cy="457200"/>
+          </a:xfrm>
+          <a:prstGeom prst="ellipse">
+            <a:avLst/>
+          </a:prstGeom>
+        </p:spPr>
+        <p:style>
+          <a:lnRef idx="2">
+            <a:schemeClr val="accent1">
+              <a:shade val="50000"/>
+            </a:schemeClr>
+          </a:lnRef>
+          <a:fillRef idx="1">
+            <a:schemeClr val="accent1"/>
+          </a:fillRef>
+          <a:effectRef idx="0">
+            <a:schemeClr val="accent1"/>
+          </a:effectRef>
+          <a:fontRef idx="minor">
+            <a:schemeClr val="lt1"/>
+          </a:fontRef>
+        </p:style>
+        <p:txBody>
+          <a:bodyPr rtlCol="0" anchor="ctr"/>
+          <a:lstStyle/>
+          <a:p>
+            <a:pPr algn="ctr"/>
+            <a:r>
+              <a:rPr lang="en-US" smtClean="0"/>
+              <a:t>let y</a:t>
+            </a:r>
+            <a:endParaRPr lang="en-US"/>
+          </a:p>
+        </p:txBody>
+      </p:sp>
+      <p:sp>
+        <p:nvSpPr>
+          <p:cNvPr id="52" name="Oval 51"/>
+          <p:cNvSpPr/>
+          <p:nvPr/>
+        </p:nvSpPr>
+        <p:spPr>
+          <a:xfrm>
+            <a:off x="2590800" y="1066800"/>
+            <a:ext cx="2057400" cy="457200"/>
+          </a:xfrm>
+          <a:prstGeom prst="ellipse">
+            <a:avLst/>
+          </a:prstGeom>
+        </p:spPr>
+        <p:style>
+          <a:lnRef idx="2">
+            <a:schemeClr val="accent1">
+              <a:shade val="50000"/>
+            </a:schemeClr>
+          </a:lnRef>
+          <a:fillRef idx="1">
+            <a:schemeClr val="accent1"/>
+          </a:fillRef>
+          <a:effectRef idx="0">
+            <a:schemeClr val="accent1"/>
+          </a:effectRef>
+          <a:fontRef idx="minor">
+            <a:schemeClr val="lt1"/>
+          </a:fontRef>
+        </p:style>
+        <p:txBody>
+          <a:bodyPr rtlCol="0" anchor="ctr"/>
+          <a:lstStyle/>
+          <a:p>
+            <a:pPr algn="ctr"/>
+            <a:r>
+              <a:rPr lang="en-US" smtClean="0"/>
+              <a:t>self</a:t>
+            </a:r>
+            <a:endParaRPr lang="en-US"/>
+          </a:p>
+        </p:txBody>
+      </p:sp>
+      <p:cxnSp>
+        <p:nvCxnSpPr>
+          <p:cNvPr id="53" name="Straight Arrow Connector 52"/>
+          <p:cNvCxnSpPr>
+            <a:stCxn id="50" idx="3"/>
+            <a:endCxn id="52" idx="0"/>
+          </p:cNvCxnSpPr>
+          <p:nvPr/>
+        </p:nvCxnSpPr>
+        <p:spPr>
+          <a:xfrm rot="5400000">
+            <a:off x="3557729" y="604417"/>
+            <a:ext cx="524155" cy="400611"/>
+          </a:xfrm>
+          <a:prstGeom prst="straightConnector1">
+            <a:avLst/>
+          </a:prstGeom>
+          <a:ln>
+            <a:tailEnd type="arrow"/>
+          </a:ln>
+        </p:spPr>
+        <p:style>
+          <a:lnRef idx="1">
+            <a:schemeClr val="accent1"/>
+          </a:lnRef>
+          <a:fillRef idx="0">
+            <a:schemeClr val="accent1"/>
+          </a:fillRef>
+          <a:effectRef idx="0">
+            <a:schemeClr val="accent1"/>
+          </a:effectRef>
+          <a:fontRef idx="minor">
+            <a:schemeClr val="tx1"/>
+          </a:fontRef>
+        </p:style>
+      </p:cxnSp>
+      <p:cxnSp>
+        <p:nvCxnSpPr>
+          <p:cNvPr id="54" name="Straight Arrow Connector 53"/>
+          <p:cNvCxnSpPr>
+            <a:stCxn id="50" idx="5"/>
+            <a:endCxn id="84" idx="0"/>
+          </p:cNvCxnSpPr>
+          <p:nvPr/>
+        </p:nvCxnSpPr>
+        <p:spPr>
+          <a:xfrm rot="16200000" flipH="1">
+            <a:off x="4585867" y="623466"/>
+            <a:ext cx="981355" cy="819711"/>
+          </a:xfrm>
+          <a:prstGeom prst="straightConnector1">
+            <a:avLst/>
+          </a:prstGeom>
+          <a:ln>
+            <a:tailEnd type="arrow"/>
+          </a:ln>
+        </p:spPr>
+        <p:style>
+          <a:lnRef idx="1">
+            <a:schemeClr val="accent1"/>
+          </a:lnRef>
+          <a:fillRef idx="0">
+            <a:schemeClr val="accent1"/>
+          </a:fillRef>
+          <a:effectRef idx="0">
+            <a:schemeClr val="accent1"/>
+          </a:effectRef>
+          <a:fontRef idx="minor">
+            <a:schemeClr val="tx1"/>
+          </a:fontRef>
+        </p:style>
+      </p:cxnSp>
+      <p:sp>
+        <p:nvSpPr>
+          <p:cNvPr id="55" name="TextBox 54"/>
+          <p:cNvSpPr txBox="1"/>
+          <p:nvPr/>
+        </p:nvSpPr>
+        <p:spPr>
+          <a:xfrm>
+            <a:off x="4876800" y="533400"/>
+            <a:ext cx="359394" cy="369332"/>
+          </a:xfrm>
+          <a:prstGeom prst="rect">
+            <a:avLst/>
+          </a:prstGeom>
+          <a:noFill/>
+        </p:spPr>
+        <p:txBody>
+          <a:bodyPr wrap="none" rtlCol="0">
+            <a:spAutoFit/>
+          </a:bodyPr>
+          <a:lstStyle/>
+          <a:p>
+            <a:r>
+              <a:rPr lang="en-US" smtClean="0"/>
+              <a:t>in</a:t>
+            </a:r>
+            <a:endParaRPr lang="en-US"/>
+          </a:p>
+        </p:txBody>
+      </p:sp>
+      <p:sp>
+        <p:nvSpPr>
+          <p:cNvPr id="56" name="TextBox 55"/>
+          <p:cNvSpPr txBox="1"/>
+          <p:nvPr/>
+        </p:nvSpPr>
+        <p:spPr>
+          <a:xfrm>
+            <a:off x="2971800" y="609600"/>
+            <a:ext cx="902811" cy="369332"/>
+          </a:xfrm>
+          <a:prstGeom prst="rect">
+            <a:avLst/>
+          </a:prstGeom>
+          <a:noFill/>
+        </p:spPr>
+        <p:txBody>
+          <a:bodyPr wrap="none" rtlCol="0">
+            <a:spAutoFit/>
+          </a:bodyPr>
+          <a:lstStyle/>
+          <a:p>
+            <a:r>
+              <a:rPr lang="en-US" err="1" smtClean="0"/>
+              <a:t>initExpr</a:t>
+            </a:r>
+            <a:endParaRPr lang="en-US"/>
+          </a:p>
+        </p:txBody>
+      </p:sp>
+      <p:sp>
+        <p:nvSpPr>
+          <p:cNvPr id="84" name="Oval 83"/>
+          <p:cNvSpPr/>
+          <p:nvPr/>
+        </p:nvSpPr>
+        <p:spPr>
+          <a:xfrm>
+            <a:off x="5029200" y="1524000"/>
+            <a:ext cx="914400" cy="457200"/>
+          </a:xfrm>
+          <a:prstGeom prst="ellipse">
+            <a:avLst/>
+          </a:prstGeom>
+        </p:spPr>
+        <p:style>
+          <a:lnRef idx="2">
+            <a:schemeClr val="accent1">
+              <a:shade val="50000"/>
+            </a:schemeClr>
+          </a:lnRef>
+          <a:fillRef idx="1">
+            <a:schemeClr val="accent1"/>
+          </a:fillRef>
+          <a:effectRef idx="0">
+            <a:schemeClr val="accent1"/>
+          </a:effectRef>
+          <a:fontRef idx="minor">
+            <a:schemeClr val="lt1"/>
+          </a:fontRef>
+        </p:style>
+        <p:txBody>
+          <a:bodyPr rtlCol="0" anchor="ctr"/>
+          <a:lstStyle/>
+          <a:p>
+            <a:pPr algn="ctr"/>
+            <a:r>
+              <a:rPr lang="en-US" smtClean="0"/>
+              <a:t>let z</a:t>
+            </a:r>
+            <a:endParaRPr lang="en-US"/>
+          </a:p>
+        </p:txBody>
+      </p:sp>
+      <p:sp>
+        <p:nvSpPr>
+          <p:cNvPr id="85" name="Oval 84"/>
+          <p:cNvSpPr/>
+          <p:nvPr/>
+        </p:nvSpPr>
+        <p:spPr>
+          <a:xfrm>
+            <a:off x="3657600" y="2362200"/>
+            <a:ext cx="990600" cy="457200"/>
+          </a:xfrm>
+          <a:prstGeom prst="ellipse">
+            <a:avLst/>
+          </a:prstGeom>
+        </p:spPr>
+        <p:style>
+          <a:lnRef idx="2">
+            <a:schemeClr val="accent1">
+              <a:shade val="50000"/>
+            </a:schemeClr>
+          </a:lnRef>
+          <a:fillRef idx="1">
+            <a:schemeClr val="accent1"/>
+          </a:fillRef>
+          <a:effectRef idx="0">
+            <a:schemeClr val="accent1"/>
+          </a:effectRef>
+          <a:fontRef idx="minor">
+            <a:schemeClr val="lt1"/>
+          </a:fontRef>
+        </p:style>
+        <p:txBody>
+          <a:bodyPr rtlCol="0" anchor="ctr"/>
+          <a:lstStyle/>
+          <a:p>
+            <a:pPr algn="ctr"/>
+            <a:r>
+              <a:rPr lang="en-US" err="1" smtClean="0"/>
+              <a:t>y.h.k</a:t>
+            </a:r>
+            <a:endParaRPr lang="en-US"/>
+          </a:p>
+        </p:txBody>
+      </p:sp>
+      <p:sp>
+        <p:nvSpPr>
+          <p:cNvPr id="86" name="Oval 85"/>
+          <p:cNvSpPr/>
+          <p:nvPr/>
+        </p:nvSpPr>
+        <p:spPr>
+          <a:xfrm>
+            <a:off x="5715000" y="2362200"/>
+            <a:ext cx="1143000" cy="457200"/>
+          </a:xfrm>
+          <a:prstGeom prst="ellipse">
+            <a:avLst/>
+          </a:prstGeom>
+        </p:spPr>
+        <p:style>
+          <a:lnRef idx="2">
+            <a:schemeClr val="accent1">
+              <a:shade val="50000"/>
+            </a:schemeClr>
+          </a:lnRef>
+          <a:fillRef idx="1">
+            <a:schemeClr val="accent1"/>
+          </a:fillRef>
+          <a:effectRef idx="0">
+            <a:schemeClr val="accent1"/>
+          </a:effectRef>
+          <a:fontRef idx="minor">
+            <a:schemeClr val="lt1"/>
+          </a:fontRef>
+        </p:style>
+        <p:txBody>
+          <a:bodyPr rtlCol="0" anchor="ctr"/>
+          <a:lstStyle/>
+          <a:p>
+            <a:pPr algn="ctr"/>
+            <a:r>
+              <a:rPr lang="en-US" err="1" smtClean="0"/>
+              <a:t>y</a:t>
+            </a:r>
+            <a:r>
+              <a:rPr lang="en-US" err="1" smtClean="0"/>
+              <a:t>+z</a:t>
+            </a:r>
+            <a:endParaRPr lang="en-US"/>
+          </a:p>
+        </p:txBody>
+      </p:sp>
+      <p:cxnSp>
+        <p:nvCxnSpPr>
+          <p:cNvPr id="87" name="Straight Arrow Connector 86"/>
+          <p:cNvCxnSpPr>
+            <a:stCxn id="84" idx="3"/>
+            <a:endCxn id="85" idx="7"/>
+          </p:cNvCxnSpPr>
+          <p:nvPr/>
+        </p:nvCxnSpPr>
+        <p:spPr>
+          <a:xfrm rot="5400000">
+            <a:off x="4575666" y="1841710"/>
+            <a:ext cx="514910" cy="659981"/>
+          </a:xfrm>
+          <a:prstGeom prst="straightConnector1">
+            <a:avLst/>
+          </a:prstGeom>
+          <a:ln>
+            <a:tailEnd type="arrow"/>
+          </a:ln>
+        </p:spPr>
+        <p:style>
+          <a:lnRef idx="1">
+            <a:schemeClr val="accent1"/>
+          </a:lnRef>
+          <a:fillRef idx="0">
+            <a:schemeClr val="accent1"/>
+          </a:fillRef>
+          <a:effectRef idx="0">
+            <a:schemeClr val="accent1"/>
+          </a:effectRef>
+          <a:fontRef idx="minor">
+            <a:schemeClr val="tx1"/>
+          </a:fontRef>
+        </p:style>
+      </p:cxnSp>
+      <p:cxnSp>
+        <p:nvCxnSpPr>
+          <p:cNvPr id="88" name="Straight Arrow Connector 87"/>
+          <p:cNvCxnSpPr>
+            <a:stCxn id="84" idx="5"/>
+            <a:endCxn id="86" idx="1"/>
+          </p:cNvCxnSpPr>
+          <p:nvPr/>
+        </p:nvCxnSpPr>
+        <p:spPr>
+          <a:xfrm rot="16200000" flipH="1">
+            <a:off x="5588584" y="2135350"/>
+            <a:ext cx="514910" cy="72700"/>
+          </a:xfrm>
+          <a:prstGeom prst="straightConnector1">
+            <a:avLst/>
+          </a:prstGeom>
+          <a:ln>
+            <a:tailEnd type="arrow"/>
+          </a:ln>
+        </p:spPr>
+        <p:style>
+          <a:lnRef idx="1">
+            <a:schemeClr val="accent1"/>
+          </a:lnRef>
+          <a:fillRef idx="0">
+            <a:schemeClr val="accent1"/>
+          </a:fillRef>
+          <a:effectRef idx="0">
+            <a:schemeClr val="accent1"/>
+          </a:effectRef>
+          <a:fontRef idx="minor">
+            <a:schemeClr val="tx1"/>
+          </a:fontRef>
+        </p:style>
+      </p:cxnSp>
+      <p:sp>
+        <p:nvSpPr>
+          <p:cNvPr id="89" name="TextBox 88"/>
+          <p:cNvSpPr txBox="1"/>
+          <p:nvPr/>
+        </p:nvSpPr>
+        <p:spPr>
+          <a:xfrm>
+            <a:off x="5791200" y="2057400"/>
+            <a:ext cx="359394" cy="369332"/>
+          </a:xfrm>
+          <a:prstGeom prst="rect">
+            <a:avLst/>
+          </a:prstGeom>
+          <a:noFill/>
+        </p:spPr>
+        <p:txBody>
+          <a:bodyPr wrap="none" rtlCol="0">
+            <a:spAutoFit/>
+          </a:bodyPr>
+          <a:lstStyle/>
+          <a:p>
+            <a:r>
+              <a:rPr lang="en-US" smtClean="0"/>
+              <a:t>in</a:t>
+            </a:r>
+            <a:endParaRPr lang="en-US"/>
+          </a:p>
+        </p:txBody>
+      </p:sp>
+      <p:sp>
+        <p:nvSpPr>
+          <p:cNvPr id="90" name="TextBox 89"/>
+          <p:cNvSpPr txBox="1"/>
+          <p:nvPr/>
+        </p:nvSpPr>
+        <p:spPr>
+          <a:xfrm>
+            <a:off x="4267200" y="1981200"/>
+            <a:ext cx="902811" cy="369332"/>
+          </a:xfrm>
+          <a:prstGeom prst="rect">
+            <a:avLst/>
+          </a:prstGeom>
+          <a:noFill/>
+        </p:spPr>
+        <p:txBody>
+          <a:bodyPr wrap="none" rtlCol="0">
+            <a:spAutoFit/>
+          </a:bodyPr>
+          <a:lstStyle/>
+          <a:p>
+            <a:r>
+              <a:rPr lang="en-US" err="1" smtClean="0"/>
+              <a:t>initExpr</a:t>
+            </a:r>
+            <a:endParaRPr lang="en-US"/>
+          </a:p>
+        </p:txBody>
+      </p:sp>
+      <p:sp>
+        <p:nvSpPr>
+          <p:cNvPr id="41" name="Oval 40"/>
+          <p:cNvSpPr/>
+          <p:nvPr/>
+        </p:nvSpPr>
+        <p:spPr>
+          <a:xfrm flipH="1">
+            <a:off x="4038600" y="2438400"/>
+            <a:ext cx="381000" cy="304800"/>
+          </a:xfrm>
+          <a:prstGeom prst="ellipse">
+            <a:avLst/>
+          </a:prstGeom>
+          <a:noFill/>
+          <a:ln>
+            <a:solidFill>
+              <a:srgbClr val="FF0000"/>
+            </a:solidFill>
+          </a:ln>
+        </p:spPr>
+        <p:style>
+          <a:lnRef idx="2">
+            <a:schemeClr val="accent1">
+              <a:shade val="50000"/>
+            </a:schemeClr>
+          </a:lnRef>
+          <a:fillRef idx="1">
+            <a:schemeClr val="accent1"/>
+          </a:fillRef>
+          <a:effectRef idx="0">
+            <a:schemeClr val="accent1"/>
+          </a:effectRef>
+          <a:fontRef idx="minor">
+            <a:schemeClr val="lt1"/>
+          </a:fontRef>
+        </p:style>
+        <p:txBody>
+          <a:bodyPr rtlCol="0" anchor="ctr"/>
+          <a:lstStyle/>
+          <a:p>
+            <a:pPr algn="ctr"/>
+            <a:endParaRPr lang="en-US"/>
+          </a:p>
+        </p:txBody>
+      </p:sp>
+      <p:sp>
+        <p:nvSpPr>
+          <p:cNvPr id="92" name="TextBox 91"/>
+          <p:cNvSpPr txBox="1"/>
+          <p:nvPr/>
+        </p:nvSpPr>
+        <p:spPr>
+          <a:xfrm>
+            <a:off x="1066800" y="3048000"/>
+            <a:ext cx="7543800" cy="3693319"/>
+          </a:xfrm>
+          <a:prstGeom prst="rect">
+            <a:avLst/>
+          </a:prstGeom>
+          <a:noFill/>
+        </p:spPr>
+        <p:txBody>
+          <a:bodyPr wrap="square" rtlCol="0">
+            <a:spAutoFit/>
+          </a:bodyPr>
+          <a:lstStyle/>
+          <a:p>
+            <a:r>
+              <a:rPr lang="en-US" err="1" smtClean="0"/>
+              <a:t>traceback</a:t>
+            </a:r>
+            <a:r>
+              <a:rPr lang="en-US" smtClean="0"/>
+              <a:t> on </a:t>
+            </a:r>
+            <a:r>
+              <a:rPr lang="en-US" err="1" smtClean="0"/>
+              <a:t>y.h</a:t>
+            </a:r>
+            <a:r>
+              <a:rPr lang="en-US" smtClean="0"/>
+              <a:t>; unused for </a:t>
+            </a:r>
+            <a:r>
+              <a:rPr lang="en-US" err="1" smtClean="0"/>
+              <a:t>y.h</a:t>
+            </a:r>
+            <a:r>
+              <a:rPr lang="en-US" smtClean="0"/>
+              <a:t>; unused for </a:t>
+            </a:r>
+            <a:r>
+              <a:rPr lang="en-US" err="1" smtClean="0"/>
+              <a:t>y.h.k</a:t>
+            </a:r>
+            <a:r>
+              <a:rPr lang="en-US" smtClean="0"/>
+              <a:t>; unused for z in </a:t>
+            </a:r>
+            <a:r>
+              <a:rPr lang="en-US" err="1" smtClean="0"/>
+              <a:t>y+z</a:t>
+            </a:r>
+            <a:r>
+              <a:rPr lang="en-US" smtClean="0"/>
+              <a:t>; unused for </a:t>
+            </a:r>
+            <a:r>
+              <a:rPr lang="en-US" err="1" smtClean="0"/>
+              <a:t>y+z</a:t>
+            </a:r>
+            <a:r>
+              <a:rPr lang="en-US" smtClean="0"/>
+              <a:t> in </a:t>
+            </a:r>
+            <a:r>
+              <a:rPr lang="en-US" err="1" smtClean="0"/>
+              <a:t>y+z</a:t>
+            </a:r>
+            <a:r>
+              <a:rPr lang="en-US" smtClean="0"/>
+              <a:t> (=false)</a:t>
+            </a:r>
+          </a:p>
+          <a:p>
+            <a:r>
+              <a:rPr lang="en-US" err="1" smtClean="0"/>
+              <a:t>traceback</a:t>
+            </a:r>
+            <a:r>
+              <a:rPr lang="en-US" smtClean="0"/>
+              <a:t> on y (after reverse-traversal across </a:t>
+            </a:r>
+            <a:r>
+              <a:rPr lang="en-US" err="1" smtClean="0"/>
+              <a:t>y.h</a:t>
+            </a:r>
+            <a:r>
+              <a:rPr lang="en-US" smtClean="0"/>
+              <a:t>); unused for y; unused for </a:t>
+            </a:r>
+            <a:r>
+              <a:rPr lang="en-US" err="1" smtClean="0"/>
+              <a:t>y</a:t>
+            </a:r>
+            <a:r>
+              <a:rPr lang="en-US" err="1" smtClean="0"/>
+              <a:t>.h</a:t>
+            </a:r>
+            <a:r>
+              <a:rPr lang="en-US" smtClean="0"/>
+              <a:t> (cached=false) --&gt; on to initExpr for let-variable y:</a:t>
+            </a:r>
+          </a:p>
+          <a:p>
+            <a:r>
+              <a:rPr lang="en-US" err="1" smtClean="0"/>
+              <a:t>traceback</a:t>
+            </a:r>
+            <a:r>
+              <a:rPr lang="en-US" smtClean="0"/>
+              <a:t> on self; unused for self; unused for y in </a:t>
+            </a:r>
+            <a:r>
+              <a:rPr lang="en-US" err="1" smtClean="0"/>
+              <a:t>y.h.k</a:t>
+            </a:r>
+            <a:r>
+              <a:rPr lang="en-US" smtClean="0"/>
+              <a:t> in let z and unused for y in </a:t>
+            </a:r>
+            <a:r>
+              <a:rPr lang="en-US" err="1" smtClean="0"/>
+              <a:t>y+z</a:t>
+            </a:r>
+            <a:r>
+              <a:rPr lang="en-US" smtClean="0"/>
+              <a:t> in let z; unused for </a:t>
+            </a:r>
+            <a:r>
+              <a:rPr lang="en-US" err="1" smtClean="0"/>
+              <a:t>y.h</a:t>
+            </a:r>
+            <a:r>
+              <a:rPr lang="en-US" smtClean="0"/>
+              <a:t> and unused for </a:t>
+            </a:r>
+            <a:r>
+              <a:rPr lang="en-US" err="1" smtClean="0"/>
+              <a:t>y+z</a:t>
+            </a:r>
+            <a:r>
+              <a:rPr lang="en-US" smtClean="0"/>
+              <a:t> in let z</a:t>
+            </a:r>
+          </a:p>
+          <a:p>
+            <a:endParaRPr lang="en-US" smtClean="0"/>
+          </a:p>
+          <a:p>
+            <a:r>
+              <a:rPr lang="en-US" smtClean="0"/>
+              <a:t>Not an exact match because the context expressions are different (let y in the first case, let z in the second case). However, the question remains what to assume for variables when again entering the scopes under let z. let-expressions are only a substitution rule. Leaving the let expression while not changing other variables used in the let expression does not change the dynamic scope</a:t>
+            </a:r>
+            <a:endParaRPr lang="en-US"/>
+          </a:p>
+        </p:txBody>
+      </p:sp>
+      <p:sp>
+        <p:nvSpPr>
+          <p:cNvPr id="93" name="Oval 92"/>
+          <p:cNvSpPr/>
+          <p:nvPr/>
+        </p:nvSpPr>
+        <p:spPr>
+          <a:xfrm>
+            <a:off x="2362200" y="4419600"/>
+            <a:ext cx="1447800" cy="381000"/>
+          </a:xfrm>
+          <a:prstGeom prst="ellipse">
+            <a:avLst/>
+          </a:prstGeom>
+          <a:noFill/>
+          <a:ln>
+            <a:solidFill>
+              <a:srgbClr val="FFFF00"/>
+            </a:solidFill>
+          </a:ln>
+        </p:spPr>
+        <p:style>
+          <a:lnRef idx="2">
+            <a:schemeClr val="accent1">
+              <a:shade val="50000"/>
+            </a:schemeClr>
+          </a:lnRef>
+          <a:fillRef idx="1">
+            <a:schemeClr val="accent1"/>
+          </a:fillRef>
+          <a:effectRef idx="0">
+            <a:schemeClr val="accent1"/>
+          </a:effectRef>
+          <a:fontRef idx="minor">
+            <a:schemeClr val="lt1"/>
+          </a:fontRef>
+        </p:style>
+        <p:txBody>
+          <a:bodyPr rtlCol="0" anchor="ctr"/>
+          <a:lstStyle/>
+          <a:p>
+            <a:pPr algn="ctr"/>
+            <a:endParaRPr lang="en-US"/>
+          </a:p>
+        </p:txBody>
+      </p:sp>
+      <p:sp>
+        <p:nvSpPr>
+          <p:cNvPr id="94" name="Oval 93"/>
+          <p:cNvSpPr/>
+          <p:nvPr/>
+        </p:nvSpPr>
+        <p:spPr>
+          <a:xfrm>
+            <a:off x="2743200" y="3048000"/>
+            <a:ext cx="1600200" cy="381000"/>
+          </a:xfrm>
+          <a:prstGeom prst="ellipse">
+            <a:avLst/>
+          </a:prstGeom>
+          <a:noFill/>
+          <a:ln>
+            <a:solidFill>
+              <a:srgbClr val="FFFF00"/>
+            </a:solidFill>
+          </a:ln>
+        </p:spPr>
+        <p:style>
+          <a:lnRef idx="2">
+            <a:schemeClr val="accent1">
+              <a:shade val="50000"/>
+            </a:schemeClr>
+          </a:lnRef>
+          <a:fillRef idx="1">
+            <a:schemeClr val="accent1"/>
+          </a:fillRef>
+          <a:effectRef idx="0">
+            <a:schemeClr val="accent1"/>
+          </a:effectRef>
+          <a:fontRef idx="minor">
+            <a:schemeClr val="lt1"/>
+          </a:fontRef>
+        </p:style>
+        <p:txBody>
+          <a:bodyPr rtlCol="0" anchor="ctr"/>
+          <a:lstStyle/>
+          <a:p>
+            <a:pPr algn="ctr"/>
+            <a:endParaRPr lang="en-US"/>
+          </a:p>
+        </p:txBody>
+      </p:sp>
+      <p:cxnSp>
+        <p:nvCxnSpPr>
+          <p:cNvPr id="96" name="Straight Arrow Connector 95"/>
+          <p:cNvCxnSpPr>
+            <a:stCxn id="93" idx="0"/>
+            <a:endCxn id="94" idx="4"/>
+          </p:cNvCxnSpPr>
+          <p:nvPr/>
+        </p:nvCxnSpPr>
+        <p:spPr>
+          <a:xfrm rot="5400000" flipH="1" flipV="1">
+            <a:off x="2819400" y="3695700"/>
+            <a:ext cx="990600" cy="457200"/>
+          </a:xfrm>
+          <a:prstGeom prst="straightConnector1">
+            <a:avLst/>
+          </a:prstGeom>
+          <a:ln>
+            <a:tailEnd type="arrow"/>
+          </a:ln>
+        </p:spPr>
+        <p:style>
+          <a:lnRef idx="1">
+            <a:schemeClr val="accent1"/>
+          </a:lnRef>
+          <a:fillRef idx="0">
+            <a:schemeClr val="accent1"/>
+          </a:fillRef>
+          <a:effectRef idx="0">
+            <a:schemeClr val="accent1"/>
+          </a:effectRef>
+          <a:fontRef idx="minor">
+            <a:schemeClr val="tx1"/>
+          </a:fontRef>
+        </p:style>
+      </p:cxnSp>
+    </p:spTree>
+  </p:cSld>
+  <p:clrMapOvr>
+    <a:masterClrMapping/>
+  </p:clrMapOvr>
+</p:sld>
+</file>
+
+<file path=ppt/slides/slide4.xml><?xml version="1.0" encoding="utf-8"?>
+<p:sld xmlns:a="http://schemas.openxmlformats.org/drawingml/2006/main" xmlns:r="http://schemas.openxmlformats.org/officeDocument/2006/relationships" xmlns:p="http://schemas.openxmlformats.org/presentationml/2006/main">
+  <p:cSld>
+    <p:spTree>
+      <p:nvGrpSpPr>
+        <p:cNvPr id="1" name=""/>
+        <p:cNvGrpSpPr/>
+        <p:nvPr/>
+      </p:nvGrpSpPr>
+      <p:grpSpPr>
+        <a:xfrm>
+          <a:off x="0" y="0"/>
+          <a:ext cx="0" cy="0"/>
+          <a:chOff x="0" y="0"/>
+          <a:chExt cx="0" cy="0"/>
+        </a:xfrm>
+      </p:grpSpPr>
+      <p:sp>
+        <p:nvSpPr>
+          <p:cNvPr id="4" name="Oval 3"/>
+          <p:cNvSpPr/>
+          <p:nvPr/>
+        </p:nvSpPr>
+        <p:spPr>
+          <a:xfrm>
+            <a:off x="4572000" y="685800"/>
+            <a:ext cx="914400" cy="457200"/>
+          </a:xfrm>
+          <a:prstGeom prst="ellipse">
+            <a:avLst/>
+          </a:prstGeom>
+        </p:spPr>
+        <p:style>
+          <a:lnRef idx="2">
+            <a:schemeClr val="accent1">
+              <a:shade val="50000"/>
+            </a:schemeClr>
+          </a:lnRef>
+          <a:fillRef idx="1">
+            <a:schemeClr val="accent1"/>
+          </a:fillRef>
+          <a:effectRef idx="0">
+            <a:schemeClr val="accent1"/>
+          </a:effectRef>
+          <a:fontRef idx="minor">
+            <a:schemeClr val="lt1"/>
+          </a:fontRef>
+        </p:style>
+        <p:txBody>
+          <a:bodyPr rtlCol="0" anchor="ctr"/>
+          <a:lstStyle/>
+          <a:p>
+            <a:pPr algn="ctr"/>
+            <a:r>
+              <a:rPr lang="en-US" smtClean="0"/>
+              <a:t>let x</a:t>
+            </a:r>
+            <a:endParaRPr lang="en-US"/>
+          </a:p>
+        </p:txBody>
+      </p:sp>
+      <p:sp>
+        <p:nvSpPr>
+          <p:cNvPr id="7" name="Oval 6"/>
+          <p:cNvSpPr/>
+          <p:nvPr/>
+        </p:nvSpPr>
+        <p:spPr>
+          <a:xfrm>
+            <a:off x="5334000" y="1447800"/>
+            <a:ext cx="1752600" cy="457200"/>
+          </a:xfrm>
+          <a:prstGeom prst="ellipse">
+            <a:avLst/>
+          </a:prstGeom>
+        </p:spPr>
+        <p:style>
+          <a:lnRef idx="2">
+            <a:schemeClr val="accent1">
+              <a:shade val="50000"/>
+            </a:schemeClr>
+          </a:lnRef>
+          <a:fillRef idx="1">
+            <a:schemeClr val="accent1"/>
+          </a:fillRef>
+          <a:effectRef idx="0">
+            <a:schemeClr val="accent1"/>
+          </a:effectRef>
+          <a:fontRef idx="minor">
+            <a:schemeClr val="lt1"/>
+          </a:fontRef>
+        </p:style>
+        <p:txBody>
+          <a:bodyPr rtlCol="0" anchor="ctr"/>
+          <a:lstStyle/>
+          <a:p>
+            <a:pPr algn="ctr"/>
+            <a:r>
+              <a:rPr lang="en-US" smtClean="0"/>
+              <a:t>select(</a:t>
+            </a:r>
+            <a:r>
+              <a:rPr lang="en-US" err="1" smtClean="0"/>
+              <a:t>i</a:t>
+            </a:r>
+            <a:r>
+              <a:rPr lang="en-US" smtClean="0"/>
+              <a:t>|...)</a:t>
+            </a:r>
+            <a:endParaRPr lang="en-US"/>
+          </a:p>
+        </p:txBody>
+      </p:sp>
+      <p:sp>
+        <p:nvSpPr>
+          <p:cNvPr id="9" name="Oval 8"/>
+          <p:cNvSpPr/>
+          <p:nvPr/>
+        </p:nvSpPr>
+        <p:spPr>
+          <a:xfrm>
+            <a:off x="4572000" y="2209800"/>
+            <a:ext cx="1143000" cy="457200"/>
+          </a:xfrm>
+          <a:prstGeom prst="ellipse">
+            <a:avLst/>
+          </a:prstGeom>
+        </p:spPr>
+        <p:style>
+          <a:lnRef idx="2">
+            <a:schemeClr val="accent1">
+              <a:shade val="50000"/>
+            </a:schemeClr>
+          </a:lnRef>
+          <a:fillRef idx="1">
+            <a:schemeClr val="accent1"/>
+          </a:fillRef>
+          <a:effectRef idx="0">
+            <a:schemeClr val="accent1"/>
+          </a:effectRef>
+          <a:fontRef idx="minor">
+            <a:schemeClr val="lt1"/>
+          </a:fontRef>
+        </p:style>
+        <p:txBody>
+          <a:bodyPr rtlCol="0" anchor="ctr"/>
+          <a:lstStyle/>
+          <a:p>
+            <a:pPr algn="ctr"/>
+            <a:r>
+              <a:rPr lang="en-US" err="1" smtClean="0"/>
+              <a:t>x.a</a:t>
+            </a:r>
+            <a:r>
+              <a:rPr lang="en-US" err="1" smtClean="0"/>
+              <a:t>.d</a:t>
+            </a:r>
+            <a:endParaRPr lang="en-US"/>
+          </a:p>
+        </p:txBody>
+      </p:sp>
+      <p:cxnSp>
+        <p:nvCxnSpPr>
+          <p:cNvPr id="22" name="Straight Arrow Connector 21"/>
+          <p:cNvCxnSpPr>
+            <a:stCxn id="4" idx="3"/>
+            <a:endCxn id="47" idx="7"/>
+          </p:cNvCxnSpPr>
+          <p:nvPr/>
+        </p:nvCxnSpPr>
+        <p:spPr>
+          <a:xfrm rot="5400000">
+            <a:off x="4183506" y="992350"/>
+            <a:ext cx="438710" cy="606100"/>
+          </a:xfrm>
+          <a:prstGeom prst="straightConnector1">
+            <a:avLst/>
+          </a:prstGeom>
+          <a:ln>
+            <a:tailEnd type="arrow"/>
+          </a:ln>
+        </p:spPr>
+        <p:style>
+          <a:lnRef idx="1">
+            <a:schemeClr val="accent1"/>
+          </a:lnRef>
+          <a:fillRef idx="0">
+            <a:schemeClr val="accent1"/>
+          </a:fillRef>
+          <a:effectRef idx="0">
+            <a:schemeClr val="accent1"/>
+          </a:effectRef>
+          <a:fontRef idx="minor">
+            <a:schemeClr val="tx1"/>
+          </a:fontRef>
+        </p:style>
+      </p:cxnSp>
+      <p:cxnSp>
+        <p:nvCxnSpPr>
+          <p:cNvPr id="24" name="Straight Arrow Connector 23"/>
+          <p:cNvCxnSpPr>
+            <a:stCxn id="4" idx="5"/>
+            <a:endCxn id="7" idx="1"/>
+          </p:cNvCxnSpPr>
+          <p:nvPr/>
+        </p:nvCxnSpPr>
+        <p:spPr>
+          <a:xfrm rot="16200000" flipH="1">
+            <a:off x="5252221" y="1176313"/>
+            <a:ext cx="438710" cy="238174"/>
+          </a:xfrm>
+          <a:prstGeom prst="straightConnector1">
+            <a:avLst/>
+          </a:prstGeom>
+          <a:ln>
+            <a:tailEnd type="arrow"/>
+          </a:ln>
+        </p:spPr>
+        <p:style>
+          <a:lnRef idx="1">
+            <a:schemeClr val="accent1"/>
+          </a:lnRef>
+          <a:fillRef idx="0">
+            <a:schemeClr val="accent1"/>
+          </a:fillRef>
+          <a:effectRef idx="0">
+            <a:schemeClr val="accent1"/>
+          </a:effectRef>
+          <a:fontRef idx="minor">
+            <a:schemeClr val="tx1"/>
+          </a:fontRef>
+        </p:style>
+      </p:cxnSp>
+      <p:cxnSp>
+        <p:nvCxnSpPr>
+          <p:cNvPr id="26" name="Straight Arrow Connector 25"/>
+          <p:cNvCxnSpPr>
+            <a:stCxn id="7" idx="4"/>
+            <a:endCxn id="50" idx="1"/>
+          </p:cNvCxnSpPr>
+          <p:nvPr/>
+        </p:nvCxnSpPr>
+        <p:spPr>
+          <a:xfrm rot="16200000" flipH="1">
+            <a:off x="6262828" y="1852471"/>
+            <a:ext cx="371755" cy="476811"/>
+          </a:xfrm>
+          <a:prstGeom prst="straightConnector1">
+            <a:avLst/>
+          </a:prstGeom>
+          <a:ln>
+            <a:tailEnd type="arrow"/>
+          </a:ln>
+        </p:spPr>
+        <p:style>
+          <a:lnRef idx="1">
+            <a:schemeClr val="accent1"/>
+          </a:lnRef>
+          <a:fillRef idx="0">
+            <a:schemeClr val="accent1"/>
+          </a:fillRef>
+          <a:effectRef idx="0">
+            <a:schemeClr val="accent1"/>
+          </a:effectRef>
+          <a:fontRef idx="minor">
+            <a:schemeClr val="tx1"/>
+          </a:fontRef>
+        </p:style>
+      </p:cxnSp>
+      <p:cxnSp>
+        <p:nvCxnSpPr>
+          <p:cNvPr id="28" name="Straight Arrow Connector 27"/>
+          <p:cNvCxnSpPr>
+            <a:stCxn id="7" idx="4"/>
+            <a:endCxn id="9" idx="0"/>
+          </p:cNvCxnSpPr>
+          <p:nvPr/>
+        </p:nvCxnSpPr>
+        <p:spPr>
+          <a:xfrm rot="5400000">
+            <a:off x="5524500" y="1524000"/>
+            <a:ext cx="304800" cy="1066800"/>
+          </a:xfrm>
+          <a:prstGeom prst="straightConnector1">
+            <a:avLst/>
+          </a:prstGeom>
+          <a:ln>
+            <a:tailEnd type="arrow"/>
+          </a:ln>
+        </p:spPr>
+        <p:style>
+          <a:lnRef idx="1">
+            <a:schemeClr val="accent1"/>
+          </a:lnRef>
+          <a:fillRef idx="0">
+            <a:schemeClr val="accent1"/>
+          </a:fillRef>
+          <a:effectRef idx="0">
+            <a:schemeClr val="accent1"/>
+          </a:effectRef>
+          <a:fontRef idx="minor">
+            <a:schemeClr val="tx1"/>
+          </a:fontRef>
+        </p:style>
+      </p:cxnSp>
+      <p:sp>
+        <p:nvSpPr>
+          <p:cNvPr id="29" name="TextBox 28"/>
+          <p:cNvSpPr txBox="1"/>
+          <p:nvPr/>
+        </p:nvSpPr>
+        <p:spPr>
+          <a:xfrm>
+            <a:off x="5486400" y="1143000"/>
+            <a:ext cx="359394" cy="369332"/>
+          </a:xfrm>
+          <a:prstGeom prst="rect">
+            <a:avLst/>
+          </a:prstGeom>
+          <a:noFill/>
+        </p:spPr>
+        <p:txBody>
+          <a:bodyPr wrap="none" rtlCol="0">
+            <a:spAutoFit/>
+          </a:bodyPr>
+          <a:lstStyle/>
+          <a:p>
+            <a:r>
+              <a:rPr lang="en-US" smtClean="0"/>
+              <a:t>in</a:t>
+            </a:r>
+            <a:endParaRPr lang="en-US"/>
+          </a:p>
+        </p:txBody>
+      </p:sp>
+      <p:sp>
+        <p:nvSpPr>
+          <p:cNvPr id="48" name="TextBox 47"/>
+          <p:cNvSpPr txBox="1"/>
+          <p:nvPr/>
+        </p:nvSpPr>
+        <p:spPr>
+          <a:xfrm>
+            <a:off x="4800600" y="1828800"/>
+            <a:ext cx="808042" cy="369332"/>
+          </a:xfrm>
+          <a:prstGeom prst="rect">
+            <a:avLst/>
+          </a:prstGeom>
+          <a:noFill/>
+        </p:spPr>
+        <p:txBody>
+          <a:bodyPr wrap="none" rtlCol="0">
+            <a:spAutoFit/>
+          </a:bodyPr>
+          <a:lstStyle/>
+          <a:p>
+            <a:r>
+              <a:rPr lang="en-US" smtClean="0"/>
+              <a:t>source</a:t>
+            </a:r>
+            <a:endParaRPr lang="en-US"/>
+          </a:p>
+        </p:txBody>
+      </p:sp>
+      <p:sp>
+        <p:nvSpPr>
+          <p:cNvPr id="49" name="TextBox 48"/>
+          <p:cNvSpPr txBox="1"/>
+          <p:nvPr/>
+        </p:nvSpPr>
+        <p:spPr>
+          <a:xfrm>
+            <a:off x="6705600" y="1828800"/>
+            <a:ext cx="654346" cy="369332"/>
+          </a:xfrm>
+          <a:prstGeom prst="rect">
+            <a:avLst/>
+          </a:prstGeom>
+          <a:noFill/>
+        </p:spPr>
+        <p:txBody>
+          <a:bodyPr wrap="none" rtlCol="0">
+            <a:spAutoFit/>
+          </a:bodyPr>
+          <a:lstStyle/>
+          <a:p>
+            <a:r>
+              <a:rPr lang="en-US" smtClean="0"/>
+              <a:t>body</a:t>
+            </a:r>
+            <a:endParaRPr lang="en-US"/>
+          </a:p>
+        </p:txBody>
+      </p:sp>
+      <p:sp>
+        <p:nvSpPr>
+          <p:cNvPr id="50" name="Oval 49"/>
+          <p:cNvSpPr/>
+          <p:nvPr/>
+        </p:nvSpPr>
+        <p:spPr>
+          <a:xfrm>
+            <a:off x="6553200" y="2209800"/>
+            <a:ext cx="914400" cy="457200"/>
+          </a:xfrm>
+          <a:prstGeom prst="ellipse">
+            <a:avLst/>
+          </a:prstGeom>
+        </p:spPr>
+        <p:style>
+          <a:lnRef idx="2">
+            <a:schemeClr val="accent1">
+              <a:shade val="50000"/>
+            </a:schemeClr>
+          </a:lnRef>
+          <a:fillRef idx="1">
+            <a:schemeClr val="accent1"/>
+          </a:fillRef>
+          <a:effectRef idx="0">
+            <a:schemeClr val="accent1"/>
+          </a:effectRef>
+          <a:fontRef idx="minor">
+            <a:schemeClr val="lt1"/>
+          </a:fontRef>
+        </p:style>
+        <p:txBody>
+          <a:bodyPr rtlCol="0" anchor="ctr"/>
+          <a:lstStyle/>
+          <a:p>
+            <a:pPr algn="ctr"/>
+            <a:r>
+              <a:rPr lang="en-US" smtClean="0"/>
+              <a:t>let y</a:t>
+            </a:r>
+            <a:endParaRPr lang="en-US"/>
+          </a:p>
+        </p:txBody>
+      </p:sp>
+      <p:sp>
+        <p:nvSpPr>
+          <p:cNvPr id="52" name="Oval 51"/>
+          <p:cNvSpPr/>
+          <p:nvPr/>
+        </p:nvSpPr>
+        <p:spPr>
+          <a:xfrm>
+            <a:off x="7239000" y="2971800"/>
+            <a:ext cx="1676400" cy="457200"/>
+          </a:xfrm>
+          <a:prstGeom prst="ellipse">
+            <a:avLst/>
+          </a:prstGeom>
+        </p:spPr>
+        <p:style>
+          <a:lnRef idx="2">
+            <a:schemeClr val="accent1">
+              <a:shade val="50000"/>
+            </a:schemeClr>
+          </a:lnRef>
+          <a:fillRef idx="1">
+            <a:schemeClr val="accent1"/>
+          </a:fillRef>
+          <a:effectRef idx="0">
+            <a:schemeClr val="accent1"/>
+          </a:effectRef>
+          <a:fontRef idx="minor">
+            <a:schemeClr val="lt1"/>
+          </a:fontRef>
+        </p:style>
+        <p:txBody>
+          <a:bodyPr rtlCol="0" anchor="ctr"/>
+          <a:lstStyle/>
+          <a:p>
+            <a:pPr algn="ctr"/>
+            <a:r>
+              <a:rPr lang="en-US" err="1" smtClean="0"/>
+              <a:t>y.b</a:t>
+            </a:r>
+            <a:r>
+              <a:rPr lang="en-US" smtClean="0"/>
+              <a:t>&gt;</a:t>
+            </a:r>
+            <a:r>
+              <a:rPr lang="en-US" err="1" smtClean="0"/>
+              <a:t>i.c+x.a</a:t>
+            </a:r>
+            <a:endParaRPr lang="en-US"/>
+          </a:p>
+        </p:txBody>
+      </p:sp>
+      <p:cxnSp>
+        <p:nvCxnSpPr>
+          <p:cNvPr id="53" name="Straight Arrow Connector 52"/>
+          <p:cNvCxnSpPr>
+            <a:stCxn id="50" idx="3"/>
+            <a:endCxn id="70" idx="7"/>
+          </p:cNvCxnSpPr>
+          <p:nvPr/>
+        </p:nvCxnSpPr>
+        <p:spPr>
+          <a:xfrm rot="5400000">
+            <a:off x="6333845" y="2685489"/>
+            <a:ext cx="438710" cy="267822"/>
+          </a:xfrm>
+          <a:prstGeom prst="straightConnector1">
+            <a:avLst/>
+          </a:prstGeom>
+          <a:ln>
+            <a:tailEnd type="arrow"/>
+          </a:ln>
+        </p:spPr>
+        <p:style>
+          <a:lnRef idx="1">
+            <a:schemeClr val="accent1"/>
+          </a:lnRef>
+          <a:fillRef idx="0">
+            <a:schemeClr val="accent1"/>
+          </a:fillRef>
+          <a:effectRef idx="0">
+            <a:schemeClr val="accent1"/>
+          </a:effectRef>
+          <a:fontRef idx="minor">
+            <a:schemeClr val="tx1"/>
+          </a:fontRef>
+        </p:style>
+      </p:cxnSp>
+      <p:cxnSp>
+        <p:nvCxnSpPr>
+          <p:cNvPr id="54" name="Straight Arrow Connector 53"/>
+          <p:cNvCxnSpPr>
+            <a:stCxn id="50" idx="5"/>
+            <a:endCxn id="52" idx="1"/>
+          </p:cNvCxnSpPr>
+          <p:nvPr/>
+        </p:nvCxnSpPr>
+        <p:spPr>
+          <a:xfrm rot="16200000" flipH="1">
+            <a:off x="7189741" y="2743993"/>
+            <a:ext cx="438710" cy="150814"/>
+          </a:xfrm>
+          <a:prstGeom prst="straightConnector1">
+            <a:avLst/>
+          </a:prstGeom>
+          <a:ln>
+            <a:tailEnd type="arrow"/>
+          </a:ln>
+        </p:spPr>
+        <p:style>
+          <a:lnRef idx="1">
+            <a:schemeClr val="accent1"/>
+          </a:lnRef>
+          <a:fillRef idx="0">
+            <a:schemeClr val="accent1"/>
+          </a:fillRef>
+          <a:effectRef idx="0">
+            <a:schemeClr val="accent1"/>
+          </a:effectRef>
+          <a:fontRef idx="minor">
+            <a:schemeClr val="tx1"/>
+          </a:fontRef>
+        </p:style>
+      </p:cxnSp>
+      <p:sp>
+        <p:nvSpPr>
+          <p:cNvPr id="55" name="TextBox 54"/>
+          <p:cNvSpPr txBox="1"/>
+          <p:nvPr/>
+        </p:nvSpPr>
+        <p:spPr>
+          <a:xfrm>
+            <a:off x="7543800" y="2590800"/>
+            <a:ext cx="359394" cy="369332"/>
+          </a:xfrm>
+          <a:prstGeom prst="rect">
+            <a:avLst/>
+          </a:prstGeom>
+          <a:noFill/>
+        </p:spPr>
+        <p:txBody>
+          <a:bodyPr wrap="none" rtlCol="0">
+            <a:spAutoFit/>
+          </a:bodyPr>
+          <a:lstStyle/>
+          <a:p>
+            <a:r>
+              <a:rPr lang="en-US" smtClean="0"/>
+              <a:t>in</a:t>
+            </a:r>
+            <a:endParaRPr lang="en-US"/>
+          </a:p>
+        </p:txBody>
+      </p:sp>
+      <p:sp>
+        <p:nvSpPr>
+          <p:cNvPr id="56" name="TextBox 55"/>
+          <p:cNvSpPr txBox="1"/>
+          <p:nvPr/>
+        </p:nvSpPr>
+        <p:spPr>
+          <a:xfrm>
+            <a:off x="5638800" y="2667000"/>
+            <a:ext cx="902811" cy="369332"/>
+          </a:xfrm>
+          <a:prstGeom prst="rect">
+            <a:avLst/>
+          </a:prstGeom>
+          <a:noFill/>
+        </p:spPr>
+        <p:txBody>
+          <a:bodyPr wrap="none" rtlCol="0">
+            <a:spAutoFit/>
+          </a:bodyPr>
+          <a:lstStyle/>
+          <a:p>
+            <a:r>
+              <a:rPr lang="en-US" err="1" smtClean="0"/>
+              <a:t>initExpr</a:t>
+            </a:r>
+            <a:endParaRPr lang="en-US"/>
+          </a:p>
+        </p:txBody>
+      </p:sp>
+      <p:sp>
+        <p:nvSpPr>
+          <p:cNvPr id="68" name="Oval 67"/>
+          <p:cNvSpPr/>
+          <p:nvPr/>
+        </p:nvSpPr>
+        <p:spPr>
+          <a:xfrm>
+            <a:off x="4343400" y="4038600"/>
+            <a:ext cx="1143000" cy="457200"/>
+          </a:xfrm>
+          <a:prstGeom prst="ellipse">
+            <a:avLst/>
+          </a:prstGeom>
+        </p:spPr>
+        <p:style>
+          <a:lnRef idx="2">
+            <a:schemeClr val="accent1">
+              <a:shade val="50000"/>
+            </a:schemeClr>
+          </a:lnRef>
+          <a:fillRef idx="1">
+            <a:schemeClr val="accent1"/>
+          </a:fillRef>
+          <a:effectRef idx="0">
+            <a:schemeClr val="accent1"/>
+          </a:effectRef>
+          <a:fontRef idx="minor">
+            <a:schemeClr val="lt1"/>
+          </a:fontRef>
+        </p:style>
+        <p:txBody>
+          <a:bodyPr rtlCol="0" anchor="ctr"/>
+          <a:lstStyle/>
+          <a:p>
+            <a:pPr algn="ctr"/>
+            <a:r>
+              <a:rPr lang="en-US" smtClean="0"/>
+              <a:t>i.a&gt;2</a:t>
+            </a:r>
+            <a:endParaRPr lang="en-US"/>
+          </a:p>
+        </p:txBody>
+      </p:sp>
+      <p:sp>
+        <p:nvSpPr>
+          <p:cNvPr id="69" name="Oval 68"/>
+          <p:cNvSpPr/>
+          <p:nvPr/>
+        </p:nvSpPr>
+        <p:spPr>
+          <a:xfrm>
+            <a:off x="6705600" y="4038600"/>
+            <a:ext cx="1295400" cy="457200"/>
+          </a:xfrm>
+          <a:prstGeom prst="ellipse">
+            <a:avLst/>
+          </a:prstGeom>
+        </p:spPr>
+        <p:style>
+          <a:lnRef idx="2">
+            <a:schemeClr val="accent1">
+              <a:shade val="50000"/>
+            </a:schemeClr>
+          </a:lnRef>
+          <a:fillRef idx="1">
+            <a:schemeClr val="accent1"/>
+          </a:fillRef>
+          <a:effectRef idx="0">
+            <a:schemeClr val="accent1"/>
+          </a:effectRef>
+          <a:fontRef idx="minor">
+            <a:schemeClr val="lt1"/>
+          </a:fontRef>
+        </p:style>
+        <p:txBody>
+          <a:bodyPr rtlCol="0" anchor="ctr"/>
+          <a:lstStyle/>
+          <a:p>
+            <a:pPr algn="ctr"/>
+            <a:r>
+              <a:rPr lang="en-US" err="1" smtClean="0"/>
+              <a:t>self.g</a:t>
+            </a:r>
+            <a:r>
+              <a:rPr lang="en-US" smtClean="0"/>
+              <a:t>&gt;3</a:t>
+            </a:r>
+            <a:endParaRPr lang="en-US"/>
+          </a:p>
+        </p:txBody>
+      </p:sp>
+      <p:sp>
+        <p:nvSpPr>
+          <p:cNvPr id="70" name="Oval 69"/>
+          <p:cNvSpPr/>
+          <p:nvPr/>
+        </p:nvSpPr>
+        <p:spPr>
+          <a:xfrm>
+            <a:off x="5638800" y="2971800"/>
+            <a:ext cx="914400" cy="457200"/>
+          </a:xfrm>
+          <a:prstGeom prst="ellipse">
+            <a:avLst/>
+          </a:prstGeom>
+        </p:spPr>
+        <p:style>
+          <a:lnRef idx="2">
+            <a:schemeClr val="accent1">
+              <a:shade val="50000"/>
+            </a:schemeClr>
+          </a:lnRef>
+          <a:fillRef idx="1">
+            <a:schemeClr val="accent1"/>
+          </a:fillRef>
+          <a:effectRef idx="0">
+            <a:schemeClr val="accent1"/>
+          </a:effectRef>
+          <a:fontRef idx="minor">
+            <a:schemeClr val="lt1"/>
+          </a:fontRef>
+        </p:style>
+        <p:txBody>
+          <a:bodyPr rtlCol="0" anchor="ctr"/>
+          <a:lstStyle/>
+          <a:p>
+            <a:pPr algn="ctr"/>
+            <a:r>
+              <a:rPr lang="en-US" smtClean="0"/>
+              <a:t>if</a:t>
+            </a:r>
+            <a:endParaRPr lang="en-US"/>
+          </a:p>
+        </p:txBody>
+      </p:sp>
+      <p:cxnSp>
+        <p:nvCxnSpPr>
+          <p:cNvPr id="71" name="Straight Arrow Connector 70"/>
+          <p:cNvCxnSpPr>
+            <a:stCxn id="70" idx="3"/>
+            <a:endCxn id="68" idx="0"/>
+          </p:cNvCxnSpPr>
+          <p:nvPr/>
+        </p:nvCxnSpPr>
+        <p:spPr>
+          <a:xfrm rot="5400000">
+            <a:off x="5005529" y="3271417"/>
+            <a:ext cx="676555" cy="857811"/>
+          </a:xfrm>
+          <a:prstGeom prst="straightConnector1">
+            <a:avLst/>
+          </a:prstGeom>
+          <a:ln>
+            <a:tailEnd type="arrow"/>
+          </a:ln>
+        </p:spPr>
+        <p:style>
+          <a:lnRef idx="1">
+            <a:schemeClr val="accent1"/>
+          </a:lnRef>
+          <a:fillRef idx="0">
+            <a:schemeClr val="accent1"/>
+          </a:fillRef>
+          <a:effectRef idx="0">
+            <a:schemeClr val="accent1"/>
+          </a:effectRef>
+          <a:fontRef idx="minor">
+            <a:schemeClr val="tx1"/>
+          </a:fontRef>
+        </p:style>
+      </p:cxnSp>
+      <p:cxnSp>
+        <p:nvCxnSpPr>
+          <p:cNvPr id="72" name="Straight Arrow Connector 71"/>
+          <p:cNvCxnSpPr>
+            <a:stCxn id="70" idx="4"/>
+            <a:endCxn id="84" idx="0"/>
+          </p:cNvCxnSpPr>
+          <p:nvPr/>
+        </p:nvCxnSpPr>
+        <p:spPr>
+          <a:xfrm rot="5400000">
+            <a:off x="5791200" y="3733800"/>
+            <a:ext cx="609600" cy="1588"/>
+          </a:xfrm>
+          <a:prstGeom prst="straightConnector1">
+            <a:avLst/>
+          </a:prstGeom>
+          <a:ln>
+            <a:tailEnd type="arrow"/>
+          </a:ln>
+        </p:spPr>
+        <p:style>
+          <a:lnRef idx="1">
+            <a:schemeClr val="accent1"/>
+          </a:lnRef>
+          <a:fillRef idx="0">
+            <a:schemeClr val="accent1"/>
+          </a:fillRef>
+          <a:effectRef idx="0">
+            <a:schemeClr val="accent1"/>
+          </a:effectRef>
+          <a:fontRef idx="minor">
+            <a:schemeClr val="tx1"/>
+          </a:fontRef>
+        </p:style>
+      </p:cxnSp>
+      <p:cxnSp>
+        <p:nvCxnSpPr>
+          <p:cNvPr id="73" name="Straight Arrow Connector 72"/>
+          <p:cNvCxnSpPr>
+            <a:stCxn id="70" idx="5"/>
+            <a:endCxn id="69" idx="1"/>
+          </p:cNvCxnSpPr>
+          <p:nvPr/>
+        </p:nvCxnSpPr>
+        <p:spPr>
+          <a:xfrm rot="16200000" flipH="1">
+            <a:off x="6285543" y="3495791"/>
+            <a:ext cx="743510" cy="476018"/>
+          </a:xfrm>
+          <a:prstGeom prst="straightConnector1">
+            <a:avLst/>
+          </a:prstGeom>
+          <a:ln>
+            <a:tailEnd type="arrow"/>
+          </a:ln>
+        </p:spPr>
+        <p:style>
+          <a:lnRef idx="1">
+            <a:schemeClr val="accent1"/>
+          </a:lnRef>
+          <a:fillRef idx="0">
+            <a:schemeClr val="accent1"/>
+          </a:fillRef>
+          <a:effectRef idx="0">
+            <a:schemeClr val="accent1"/>
+          </a:effectRef>
+          <a:fontRef idx="minor">
+            <a:schemeClr val="tx1"/>
+          </a:fontRef>
+        </p:style>
+      </p:cxnSp>
+      <p:sp>
+        <p:nvSpPr>
+          <p:cNvPr id="74" name="TextBox 73"/>
+          <p:cNvSpPr txBox="1"/>
+          <p:nvPr/>
+        </p:nvSpPr>
+        <p:spPr>
+          <a:xfrm>
+            <a:off x="4572000" y="3657600"/>
+            <a:ext cx="646011" cy="369332"/>
+          </a:xfrm>
+          <a:prstGeom prst="rect">
+            <a:avLst/>
+          </a:prstGeom>
+          <a:noFill/>
+        </p:spPr>
+        <p:txBody>
+          <a:bodyPr wrap="none" rtlCol="0">
+            <a:spAutoFit/>
+          </a:bodyPr>
+          <a:lstStyle/>
+          <a:p>
+            <a:r>
+              <a:rPr lang="en-US" err="1" smtClean="0"/>
+              <a:t>cond</a:t>
+            </a:r>
+            <a:endParaRPr lang="en-US"/>
+          </a:p>
+        </p:txBody>
+      </p:sp>
+      <p:sp>
+        <p:nvSpPr>
+          <p:cNvPr id="75" name="TextBox 74"/>
+          <p:cNvSpPr txBox="1"/>
+          <p:nvPr/>
+        </p:nvSpPr>
+        <p:spPr>
+          <a:xfrm>
+            <a:off x="5562600" y="3657600"/>
+            <a:ext cx="620683" cy="369332"/>
+          </a:xfrm>
+          <a:prstGeom prst="rect">
+            <a:avLst/>
+          </a:prstGeom>
+          <a:noFill/>
+        </p:spPr>
+        <p:txBody>
+          <a:bodyPr wrap="none" rtlCol="0">
+            <a:spAutoFit/>
+          </a:bodyPr>
+          <a:lstStyle/>
+          <a:p>
+            <a:r>
+              <a:rPr lang="en-US" smtClean="0"/>
+              <a:t>then</a:t>
+            </a:r>
+            <a:endParaRPr lang="en-US"/>
+          </a:p>
+        </p:txBody>
+      </p:sp>
+      <p:sp>
+        <p:nvSpPr>
+          <p:cNvPr id="76" name="TextBox 75"/>
+          <p:cNvSpPr txBox="1"/>
+          <p:nvPr/>
+        </p:nvSpPr>
+        <p:spPr>
+          <a:xfrm>
+            <a:off x="6705600" y="3657600"/>
+            <a:ext cx="558166" cy="369332"/>
+          </a:xfrm>
+          <a:prstGeom prst="rect">
+            <a:avLst/>
+          </a:prstGeom>
+          <a:noFill/>
+        </p:spPr>
+        <p:txBody>
+          <a:bodyPr wrap="none" rtlCol="0">
+            <a:spAutoFit/>
+          </a:bodyPr>
+          <a:lstStyle/>
+          <a:p>
+            <a:r>
+              <a:rPr lang="en-US" smtClean="0"/>
+              <a:t>else</a:t>
+            </a:r>
+            <a:endParaRPr lang="en-US"/>
+          </a:p>
+        </p:txBody>
+      </p:sp>
+      <p:sp>
+        <p:nvSpPr>
+          <p:cNvPr id="84" name="Oval 83"/>
+          <p:cNvSpPr/>
+          <p:nvPr/>
+        </p:nvSpPr>
+        <p:spPr>
+          <a:xfrm>
+            <a:off x="5638800" y="4038600"/>
+            <a:ext cx="914400" cy="457200"/>
+          </a:xfrm>
+          <a:prstGeom prst="ellipse">
+            <a:avLst/>
+          </a:prstGeom>
+        </p:spPr>
+        <p:style>
+          <a:lnRef idx="2">
+            <a:schemeClr val="accent1">
+              <a:shade val="50000"/>
+            </a:schemeClr>
+          </a:lnRef>
+          <a:fillRef idx="1">
+            <a:schemeClr val="accent1"/>
+          </a:fillRef>
+          <a:effectRef idx="0">
+            <a:schemeClr val="accent1"/>
+          </a:effectRef>
+          <a:fontRef idx="minor">
+            <a:schemeClr val="lt1"/>
+          </a:fontRef>
+        </p:style>
+        <p:txBody>
+          <a:bodyPr rtlCol="0" anchor="ctr"/>
+          <a:lstStyle/>
+          <a:p>
+            <a:pPr algn="ctr"/>
+            <a:r>
+              <a:rPr lang="en-US" smtClean="0"/>
+              <a:t>let z</a:t>
+            </a:r>
+            <a:endParaRPr lang="en-US"/>
+          </a:p>
+        </p:txBody>
+      </p:sp>
+      <p:sp>
+        <p:nvSpPr>
+          <p:cNvPr id="85" name="Oval 84"/>
+          <p:cNvSpPr/>
+          <p:nvPr/>
+        </p:nvSpPr>
+        <p:spPr>
+          <a:xfrm>
+            <a:off x="4343400" y="4876800"/>
+            <a:ext cx="1600200" cy="457200"/>
+          </a:xfrm>
+          <a:prstGeom prst="ellipse">
+            <a:avLst/>
+          </a:prstGeom>
+        </p:spPr>
+        <p:style>
+          <a:lnRef idx="2">
+            <a:schemeClr val="accent1">
+              <a:shade val="50000"/>
+            </a:schemeClr>
+          </a:lnRef>
+          <a:fillRef idx="1">
+            <a:schemeClr val="accent1"/>
+          </a:fillRef>
+          <a:effectRef idx="0">
+            <a:schemeClr val="accent1"/>
+          </a:effectRef>
+          <a:fontRef idx="minor">
+            <a:schemeClr val="lt1"/>
+          </a:fontRef>
+        </p:style>
+        <p:txBody>
+          <a:bodyPr rtlCol="0" anchor="ctr"/>
+          <a:lstStyle/>
+          <a:p>
+            <a:pPr algn="ctr"/>
+            <a:r>
+              <a:rPr lang="en-US" smtClean="0"/>
+              <a:t>i.b.c + x.g</a:t>
+            </a:r>
+            <a:endParaRPr lang="en-US"/>
+          </a:p>
+        </p:txBody>
+      </p:sp>
+      <p:sp>
+        <p:nvSpPr>
+          <p:cNvPr id="86" name="Oval 85"/>
+          <p:cNvSpPr/>
+          <p:nvPr/>
+        </p:nvSpPr>
+        <p:spPr>
+          <a:xfrm>
+            <a:off x="6324600" y="4876800"/>
+            <a:ext cx="1143000" cy="457200"/>
+          </a:xfrm>
+          <a:prstGeom prst="ellipse">
+            <a:avLst/>
+          </a:prstGeom>
+        </p:spPr>
+        <p:style>
+          <a:lnRef idx="2">
+            <a:schemeClr val="accent1">
+              <a:shade val="50000"/>
+            </a:schemeClr>
+          </a:lnRef>
+          <a:fillRef idx="1">
+            <a:schemeClr val="accent1"/>
+          </a:fillRef>
+          <a:effectRef idx="0">
+            <a:schemeClr val="accent1"/>
+          </a:effectRef>
+          <a:fontRef idx="minor">
+            <a:schemeClr val="lt1"/>
+          </a:fontRef>
+        </p:style>
+        <p:txBody>
+          <a:bodyPr rtlCol="0" anchor="ctr"/>
+          <a:lstStyle/>
+          <a:p>
+            <a:pPr algn="ctr"/>
+            <a:r>
+              <a:rPr lang="en-US" smtClean="0"/>
+              <a:t>z</a:t>
+            </a:r>
+            <a:endParaRPr lang="en-US"/>
+          </a:p>
+        </p:txBody>
+      </p:sp>
+      <p:cxnSp>
+        <p:nvCxnSpPr>
+          <p:cNvPr id="87" name="Straight Arrow Connector 86"/>
+          <p:cNvCxnSpPr>
+            <a:stCxn id="84" idx="3"/>
+            <a:endCxn id="85" idx="7"/>
+          </p:cNvCxnSpPr>
+          <p:nvPr/>
+        </p:nvCxnSpPr>
+        <p:spPr>
+          <a:xfrm rot="5400000">
+            <a:off x="5483529" y="4654573"/>
+            <a:ext cx="514910" cy="63455"/>
+          </a:xfrm>
+          <a:prstGeom prst="straightConnector1">
+            <a:avLst/>
+          </a:prstGeom>
+          <a:ln>
+            <a:tailEnd type="arrow"/>
+          </a:ln>
+        </p:spPr>
+        <p:style>
+          <a:lnRef idx="1">
+            <a:schemeClr val="accent1"/>
+          </a:lnRef>
+          <a:fillRef idx="0">
+            <a:schemeClr val="accent1"/>
+          </a:fillRef>
+          <a:effectRef idx="0">
+            <a:schemeClr val="accent1"/>
+          </a:effectRef>
+          <a:fontRef idx="minor">
+            <a:schemeClr val="tx1"/>
+          </a:fontRef>
+        </p:style>
+      </p:cxnSp>
+      <p:cxnSp>
+        <p:nvCxnSpPr>
+          <p:cNvPr id="88" name="Straight Arrow Connector 87"/>
+          <p:cNvCxnSpPr>
+            <a:stCxn id="84" idx="5"/>
+            <a:endCxn id="86" idx="1"/>
+          </p:cNvCxnSpPr>
+          <p:nvPr/>
+        </p:nvCxnSpPr>
+        <p:spPr>
+          <a:xfrm rot="16200000" flipH="1">
+            <a:off x="6198184" y="4649950"/>
+            <a:ext cx="514910" cy="72700"/>
+          </a:xfrm>
+          <a:prstGeom prst="straightConnector1">
+            <a:avLst/>
+          </a:prstGeom>
+          <a:ln>
+            <a:tailEnd type="arrow"/>
+          </a:ln>
+        </p:spPr>
+        <p:style>
+          <a:lnRef idx="1">
+            <a:schemeClr val="accent1"/>
+          </a:lnRef>
+          <a:fillRef idx="0">
+            <a:schemeClr val="accent1"/>
+          </a:fillRef>
+          <a:effectRef idx="0">
+            <a:schemeClr val="accent1"/>
+          </a:effectRef>
+          <a:fontRef idx="minor">
+            <a:schemeClr val="tx1"/>
+          </a:fontRef>
+        </p:style>
+      </p:cxnSp>
+      <p:sp>
+        <p:nvSpPr>
+          <p:cNvPr id="89" name="TextBox 88"/>
+          <p:cNvSpPr txBox="1"/>
+          <p:nvPr/>
+        </p:nvSpPr>
+        <p:spPr>
+          <a:xfrm>
+            <a:off x="6400800" y="4572000"/>
+            <a:ext cx="359394" cy="369332"/>
+          </a:xfrm>
+          <a:prstGeom prst="rect">
+            <a:avLst/>
+          </a:prstGeom>
+          <a:noFill/>
+        </p:spPr>
+        <p:txBody>
+          <a:bodyPr wrap="none" rtlCol="0">
+            <a:spAutoFit/>
+          </a:bodyPr>
+          <a:lstStyle/>
+          <a:p>
+            <a:r>
+              <a:rPr lang="en-US" smtClean="0"/>
+              <a:t>in</a:t>
+            </a:r>
+            <a:endParaRPr lang="en-US"/>
+          </a:p>
+        </p:txBody>
+      </p:sp>
+      <p:sp>
+        <p:nvSpPr>
+          <p:cNvPr id="90" name="TextBox 89"/>
+          <p:cNvSpPr txBox="1"/>
+          <p:nvPr/>
+        </p:nvSpPr>
+        <p:spPr>
+          <a:xfrm>
+            <a:off x="4876800" y="4495800"/>
+            <a:ext cx="902811" cy="369332"/>
+          </a:xfrm>
+          <a:prstGeom prst="rect">
+            <a:avLst/>
+          </a:prstGeom>
+          <a:noFill/>
+        </p:spPr>
+        <p:txBody>
+          <a:bodyPr wrap="none" rtlCol="0">
+            <a:spAutoFit/>
+          </a:bodyPr>
+          <a:lstStyle/>
+          <a:p>
+            <a:r>
+              <a:rPr lang="en-US" err="1" smtClean="0"/>
+              <a:t>initExpr</a:t>
+            </a:r>
+            <a:endParaRPr lang="en-US"/>
+          </a:p>
+        </p:txBody>
+      </p:sp>
+      <p:sp>
+        <p:nvSpPr>
+          <p:cNvPr id="47" name="Oval 46"/>
+          <p:cNvSpPr/>
+          <p:nvPr/>
+        </p:nvSpPr>
+        <p:spPr>
+          <a:xfrm>
+            <a:off x="3124200" y="1447800"/>
+            <a:ext cx="1143000" cy="457200"/>
+          </a:xfrm>
+          <a:prstGeom prst="ellipse">
+            <a:avLst/>
+          </a:prstGeom>
+        </p:spPr>
+        <p:style>
+          <a:lnRef idx="2">
+            <a:schemeClr val="accent1">
+              <a:shade val="50000"/>
+            </a:schemeClr>
+          </a:lnRef>
+          <a:fillRef idx="1">
+            <a:schemeClr val="accent1"/>
+          </a:fillRef>
+          <a:effectRef idx="0">
+            <a:schemeClr val="accent1"/>
+          </a:effectRef>
+          <a:fontRef idx="minor">
+            <a:schemeClr val="lt1"/>
+          </a:fontRef>
+        </p:style>
+        <p:txBody>
+          <a:bodyPr rtlCol="0" anchor="ctr"/>
+          <a:lstStyle/>
+          <a:p>
+            <a:pPr algn="ctr"/>
+            <a:r>
+              <a:rPr lang="en-US" err="1" smtClean="0"/>
+              <a:t>self.f</a:t>
+            </a:r>
+            <a:endParaRPr lang="en-US"/>
+          </a:p>
+        </p:txBody>
+      </p:sp>
+      <p:sp>
+        <p:nvSpPr>
+          <p:cNvPr id="42" name="TextBox 41"/>
+          <p:cNvSpPr txBox="1"/>
+          <p:nvPr/>
+        </p:nvSpPr>
+        <p:spPr>
+          <a:xfrm>
+            <a:off x="3352800" y="1066800"/>
+            <a:ext cx="902811" cy="369332"/>
+          </a:xfrm>
+          <a:prstGeom prst="rect">
+            <a:avLst/>
+          </a:prstGeom>
+          <a:noFill/>
+        </p:spPr>
+        <p:txBody>
+          <a:bodyPr wrap="none" rtlCol="0">
+            <a:spAutoFit/>
+          </a:bodyPr>
+          <a:lstStyle/>
+          <a:p>
+            <a:r>
+              <a:rPr lang="en-US" err="1" smtClean="0"/>
+              <a:t>initExpr</a:t>
+            </a:r>
+            <a:endParaRPr lang="en-US"/>
+          </a:p>
+        </p:txBody>
+      </p:sp>
+      <p:sp>
+        <p:nvSpPr>
+          <p:cNvPr id="61" name="Oval 60"/>
+          <p:cNvSpPr/>
+          <p:nvPr/>
+        </p:nvSpPr>
+        <p:spPr>
+          <a:xfrm flipH="1">
+            <a:off x="4800600" y="4953000"/>
+            <a:ext cx="304800" cy="304800"/>
+          </a:xfrm>
+          <a:prstGeom prst="ellipse">
+            <a:avLst/>
+          </a:prstGeom>
+          <a:noFill/>
+          <a:ln>
+            <a:solidFill>
+              <a:srgbClr val="FF0000"/>
+            </a:solidFill>
+          </a:ln>
+        </p:spPr>
+        <p:style>
+          <a:lnRef idx="2">
+            <a:schemeClr val="accent1">
+              <a:shade val="50000"/>
+            </a:schemeClr>
+          </a:lnRef>
+          <a:fillRef idx="1">
+            <a:schemeClr val="accent1"/>
+          </a:fillRef>
+          <a:effectRef idx="0">
+            <a:schemeClr val="accent1"/>
+          </a:effectRef>
+          <a:fontRef idx="minor">
+            <a:schemeClr val="lt1"/>
+          </a:fontRef>
+        </p:style>
+        <p:txBody>
+          <a:bodyPr rtlCol="0" anchor="ctr"/>
+          <a:lstStyle/>
+          <a:p>
+            <a:pPr algn="ctr"/>
+            <a:endParaRPr lang="en-US"/>
+          </a:p>
+        </p:txBody>
+      </p:sp>
+      <p:sp>
+        <p:nvSpPr>
+          <p:cNvPr id="64" name="TextBox 63"/>
+          <p:cNvSpPr txBox="1"/>
+          <p:nvPr/>
+        </p:nvSpPr>
+        <p:spPr>
+          <a:xfrm>
+            <a:off x="381000" y="838200"/>
+            <a:ext cx="2667000" cy="5355312"/>
+          </a:xfrm>
+          <a:prstGeom prst="rect">
+            <a:avLst/>
+          </a:prstGeom>
+          <a:noFill/>
+        </p:spPr>
+        <p:txBody>
+          <a:bodyPr wrap="square" rtlCol="0">
+            <a:spAutoFit/>
+          </a:bodyPr>
+          <a:lstStyle/>
+          <a:p>
+            <a:pPr>
+              <a:buFont typeface="Arial" pitchFamily="34" charset="0"/>
+              <a:buChar char="•"/>
+            </a:pPr>
+            <a:r>
+              <a:rPr lang="en-US" smtClean="0"/>
+              <a:t>traceback for i.b, unused for i.b--&gt;i.b.c--&gt;i.b.c+x.g--&gt; z in z, unused for let z, [[i.a&gt;2]] with unknown i</a:t>
+            </a:r>
+          </a:p>
+          <a:p>
+            <a:pPr>
+              <a:buFont typeface="Arial" pitchFamily="34" charset="0"/>
+              <a:buChar char="•"/>
+            </a:pPr>
+            <a:r>
+              <a:rPr lang="en-US" smtClean="0"/>
+              <a:t>traceback for i; resolves [[i.a&gt;2]], unused for i--&gt;i.b (cached)</a:t>
+            </a:r>
+          </a:p>
+          <a:p>
+            <a:pPr>
+              <a:buFont typeface="Arial" pitchFamily="34" charset="0"/>
+              <a:buChar char="•"/>
+            </a:pPr>
+            <a:r>
+              <a:rPr lang="en-US" smtClean="0"/>
+              <a:t>traceback for x.a.d leaving select body (let y) scope; unused for x.a.d--&gt; select--&gt;let x (false)</a:t>
+            </a:r>
+          </a:p>
+          <a:p>
+            <a:pPr>
+              <a:buFont typeface="Arial" pitchFamily="34" charset="0"/>
+              <a:buChar char="•"/>
+            </a:pPr>
+            <a:r>
+              <a:rPr lang="en-US" smtClean="0"/>
+              <a:t>traceback for x.a; unused for x.a--&gt;x.a.d (cached)</a:t>
+            </a:r>
+          </a:p>
+          <a:p>
+            <a:pPr>
+              <a:buFont typeface="Arial" pitchFamily="34" charset="0"/>
+              <a:buChar char="•"/>
+            </a:pPr>
+            <a:r>
+              <a:rPr lang="en-US" smtClean="0"/>
+              <a:t>traceback for x; unused for x--&gt;x.a (cached)</a:t>
+            </a:r>
+          </a:p>
+          <a:p>
+            <a:pPr>
+              <a:buFont typeface="Arial" pitchFamily="34" charset="0"/>
+              <a:buChar char="•"/>
+            </a:pPr>
+            <a:r>
+              <a:rPr lang="en-US" smtClean="0"/>
+              <a:t>traceback for self.f; unused for self.f--&gt; unused for all x refs in select, particularly in i.b.c+x.g:</a:t>
+            </a:r>
+            <a:endParaRPr lang="en-US"/>
+          </a:p>
+        </p:txBody>
+      </p:sp>
+      <p:sp>
+        <p:nvSpPr>
+          <p:cNvPr id="65" name="TextBox 64"/>
+          <p:cNvSpPr txBox="1"/>
+          <p:nvPr/>
+        </p:nvSpPr>
+        <p:spPr>
+          <a:xfrm>
+            <a:off x="3581400" y="5486400"/>
+            <a:ext cx="5334000" cy="923330"/>
+          </a:xfrm>
+          <a:prstGeom prst="rect">
+            <a:avLst/>
+          </a:prstGeom>
+          <a:noFill/>
+        </p:spPr>
+        <p:txBody>
+          <a:bodyPr wrap="square" rtlCol="0">
+            <a:spAutoFit/>
+          </a:bodyPr>
+          <a:lstStyle/>
+          <a:p>
+            <a:pPr>
+              <a:buFont typeface="Arial" pitchFamily="34" charset="0"/>
+              <a:buChar char="•"/>
+            </a:pPr>
+            <a:r>
+              <a:rPr lang="en-US" smtClean="0"/>
+              <a:t>gets into scope of x (select) and i (let y)</a:t>
+            </a:r>
+          </a:p>
+          <a:p>
+            <a:pPr>
+              <a:buFont typeface="Arial" pitchFamily="34" charset="0"/>
+              <a:buChar char="•"/>
+            </a:pPr>
+            <a:r>
+              <a:rPr lang="en-US" smtClean="0"/>
+              <a:t>unused for x--&gt;x.g--&gt;i.b.c+x.g-&gt;z in z (false)--&gt;let z--&gt; [[i.a&gt;2]] (with which value for i???)</a:t>
+            </a:r>
+            <a:endParaRPr lang="en-US"/>
+          </a:p>
+        </p:txBody>
+      </p:sp>
+    </p:spTree>
+  </p:cSld>
+  <p:clrMapOvr>
+    <a:masterClrMapping/>
+  </p:clrMapOvr>
+</p:sld>
+</file>
+
+<file path=ppt/slides/slide5.xml><?xml version="1.0" encoding="utf-8"?>
+<p:sld xmlns:a="http://schemas.openxmlformats.org/drawingml/2006/main" xmlns:r="http://schemas.openxmlformats.org/officeDocument/2006/relationships" xmlns:p="http://schemas.openxmlformats.org/presentationml/2006/main">
+  <p:cSld>
+    <p:spTree>
+      <p:nvGrpSpPr>
+        <p:cNvPr id="1" name=""/>
+        <p:cNvGrpSpPr/>
+        <p:nvPr/>
+      </p:nvGrpSpPr>
+      <p:grpSpPr>
+        <a:xfrm>
+          <a:off x="0" y="0"/>
+          <a:ext cx="0" cy="0"/>
+          <a:chOff x="0" y="0"/>
+          <a:chExt cx="0" cy="0"/>
+        </a:xfrm>
+      </p:grpSpPr>
+      <p:sp>
+        <p:nvSpPr>
+          <p:cNvPr id="50" name="Oval 49"/>
+          <p:cNvSpPr/>
+          <p:nvPr/>
+        </p:nvSpPr>
+        <p:spPr>
+          <a:xfrm>
+            <a:off x="3886200" y="152400"/>
+            <a:ext cx="914400" cy="457200"/>
+          </a:xfrm>
+          <a:prstGeom prst="ellipse">
+            <a:avLst/>
+          </a:prstGeom>
+        </p:spPr>
+        <p:style>
+          <a:lnRef idx="2">
+            <a:schemeClr val="accent1">
+              <a:shade val="50000"/>
+            </a:schemeClr>
+          </a:lnRef>
+          <a:fillRef idx="1">
+            <a:schemeClr val="accent1"/>
+          </a:fillRef>
+          <a:effectRef idx="0">
+            <a:schemeClr val="accent1"/>
+          </a:effectRef>
+          <a:fontRef idx="minor">
+            <a:schemeClr val="lt1"/>
+          </a:fontRef>
+        </p:style>
+        <p:txBody>
+          <a:bodyPr rtlCol="0" anchor="ctr"/>
+          <a:lstStyle/>
+          <a:p>
+            <a:pPr algn="ctr"/>
+            <a:r>
+              <a:rPr lang="en-US" smtClean="0"/>
+              <a:t>let y</a:t>
+            </a:r>
+            <a:endParaRPr lang="en-US"/>
+          </a:p>
+        </p:txBody>
+      </p:sp>
+      <p:sp>
+        <p:nvSpPr>
+          <p:cNvPr id="52" name="Oval 51"/>
+          <p:cNvSpPr/>
+          <p:nvPr/>
+        </p:nvSpPr>
+        <p:spPr>
+          <a:xfrm>
+            <a:off x="2590800" y="1066800"/>
+            <a:ext cx="2057400" cy="457200"/>
+          </a:xfrm>
+          <a:prstGeom prst="ellipse">
+            <a:avLst/>
+          </a:prstGeom>
+        </p:spPr>
+        <p:style>
+          <a:lnRef idx="2">
+            <a:schemeClr val="accent1">
+              <a:shade val="50000"/>
+            </a:schemeClr>
+          </a:lnRef>
+          <a:fillRef idx="1">
+            <a:schemeClr val="accent1"/>
+          </a:fillRef>
+          <a:effectRef idx="0">
+            <a:schemeClr val="accent1"/>
+          </a:effectRef>
+          <a:fontRef idx="minor">
+            <a:schemeClr val="lt1"/>
+          </a:fontRef>
+        </p:style>
+        <p:txBody>
+          <a:bodyPr rtlCol="0" anchor="ctr"/>
+          <a:lstStyle/>
+          <a:p>
+            <a:pPr algn="ctr"/>
+            <a:r>
+              <a:rPr lang="en-US" smtClean="0"/>
+              <a:t>self</a:t>
+            </a:r>
+            <a:endParaRPr lang="en-US"/>
+          </a:p>
+        </p:txBody>
+      </p:sp>
+      <p:cxnSp>
+        <p:nvCxnSpPr>
+          <p:cNvPr id="53" name="Straight Arrow Connector 52"/>
+          <p:cNvCxnSpPr>
+            <a:stCxn id="50" idx="3"/>
+            <a:endCxn id="52" idx="0"/>
+          </p:cNvCxnSpPr>
+          <p:nvPr/>
+        </p:nvCxnSpPr>
+        <p:spPr>
+          <a:xfrm rot="5400000">
+            <a:off x="3557729" y="604417"/>
+            <a:ext cx="524155" cy="400611"/>
+          </a:xfrm>
+          <a:prstGeom prst="straightConnector1">
+            <a:avLst/>
+          </a:prstGeom>
+          <a:ln>
+            <a:tailEnd type="arrow"/>
+          </a:ln>
+        </p:spPr>
+        <p:style>
+          <a:lnRef idx="1">
+            <a:schemeClr val="accent1"/>
+          </a:lnRef>
+          <a:fillRef idx="0">
+            <a:schemeClr val="accent1"/>
+          </a:fillRef>
+          <a:effectRef idx="0">
+            <a:schemeClr val="accent1"/>
+          </a:effectRef>
+          <a:fontRef idx="minor">
+            <a:schemeClr val="tx1"/>
+          </a:fontRef>
+        </p:style>
+      </p:cxnSp>
+      <p:cxnSp>
+        <p:nvCxnSpPr>
+          <p:cNvPr id="54" name="Straight Arrow Connector 53"/>
+          <p:cNvCxnSpPr>
+            <a:stCxn id="50" idx="5"/>
+            <a:endCxn id="20" idx="0"/>
+          </p:cNvCxnSpPr>
+          <p:nvPr/>
+        </p:nvCxnSpPr>
+        <p:spPr>
+          <a:xfrm rot="16200000" flipH="1">
+            <a:off x="5100217" y="109116"/>
+            <a:ext cx="600355" cy="1467411"/>
+          </a:xfrm>
+          <a:prstGeom prst="straightConnector1">
+            <a:avLst/>
+          </a:prstGeom>
+          <a:ln>
+            <a:tailEnd type="arrow"/>
+          </a:ln>
+        </p:spPr>
+        <p:style>
+          <a:lnRef idx="1">
+            <a:schemeClr val="accent1"/>
+          </a:lnRef>
+          <a:fillRef idx="0">
+            <a:schemeClr val="accent1"/>
+          </a:fillRef>
+          <a:effectRef idx="0">
+            <a:schemeClr val="accent1"/>
+          </a:effectRef>
+          <a:fontRef idx="minor">
+            <a:schemeClr val="tx1"/>
+          </a:fontRef>
+        </p:style>
+      </p:cxnSp>
+      <p:sp>
+        <p:nvSpPr>
+          <p:cNvPr id="55" name="TextBox 54"/>
+          <p:cNvSpPr txBox="1"/>
+          <p:nvPr/>
+        </p:nvSpPr>
+        <p:spPr>
+          <a:xfrm>
+            <a:off x="5791200" y="685800"/>
+            <a:ext cx="359394" cy="369332"/>
+          </a:xfrm>
+          <a:prstGeom prst="rect">
+            <a:avLst/>
+          </a:prstGeom>
+          <a:noFill/>
+        </p:spPr>
+        <p:txBody>
+          <a:bodyPr wrap="none" rtlCol="0">
+            <a:spAutoFit/>
+          </a:bodyPr>
+          <a:lstStyle/>
+          <a:p>
+            <a:r>
+              <a:rPr lang="en-US" smtClean="0"/>
+              <a:t>in</a:t>
+            </a:r>
+            <a:endParaRPr lang="en-US"/>
+          </a:p>
+        </p:txBody>
+      </p:sp>
+      <p:sp>
+        <p:nvSpPr>
+          <p:cNvPr id="56" name="TextBox 55"/>
+          <p:cNvSpPr txBox="1"/>
+          <p:nvPr/>
+        </p:nvSpPr>
+        <p:spPr>
+          <a:xfrm>
+            <a:off x="2971800" y="609600"/>
+            <a:ext cx="902811" cy="369332"/>
+          </a:xfrm>
+          <a:prstGeom prst="rect">
+            <a:avLst/>
+          </a:prstGeom>
+          <a:noFill/>
+        </p:spPr>
+        <p:txBody>
+          <a:bodyPr wrap="none" rtlCol="0">
+            <a:spAutoFit/>
+          </a:bodyPr>
+          <a:lstStyle/>
+          <a:p>
+            <a:r>
+              <a:rPr lang="en-US" err="1" smtClean="0"/>
+              <a:t>initExpr</a:t>
+            </a:r>
+            <a:endParaRPr lang="en-US"/>
+          </a:p>
+        </p:txBody>
+      </p:sp>
+      <p:sp>
+        <p:nvSpPr>
+          <p:cNvPr id="84" name="Oval 83"/>
+          <p:cNvSpPr/>
+          <p:nvPr/>
+        </p:nvSpPr>
+        <p:spPr>
+          <a:xfrm>
+            <a:off x="6477000" y="1905000"/>
+            <a:ext cx="914400" cy="457200"/>
+          </a:xfrm>
+          <a:prstGeom prst="ellipse">
+            <a:avLst/>
+          </a:prstGeom>
+        </p:spPr>
+        <p:style>
+          <a:lnRef idx="2">
+            <a:schemeClr val="accent1">
+              <a:shade val="50000"/>
+            </a:schemeClr>
+          </a:lnRef>
+          <a:fillRef idx="1">
+            <a:schemeClr val="accent1"/>
+          </a:fillRef>
+          <a:effectRef idx="0">
+            <a:schemeClr val="accent1"/>
+          </a:effectRef>
+          <a:fontRef idx="minor">
+            <a:schemeClr val="lt1"/>
+          </a:fontRef>
+        </p:style>
+        <p:txBody>
+          <a:bodyPr rtlCol="0" anchor="ctr"/>
+          <a:lstStyle/>
+          <a:p>
+            <a:pPr algn="ctr"/>
+            <a:r>
+              <a:rPr lang="en-US" smtClean="0"/>
+              <a:t>let z</a:t>
+            </a:r>
+            <a:endParaRPr lang="en-US"/>
+          </a:p>
+        </p:txBody>
+      </p:sp>
+      <p:sp>
+        <p:nvSpPr>
+          <p:cNvPr id="85" name="Oval 84"/>
+          <p:cNvSpPr/>
+          <p:nvPr/>
+        </p:nvSpPr>
+        <p:spPr>
+          <a:xfrm>
+            <a:off x="5105400" y="2743200"/>
+            <a:ext cx="990600" cy="457200"/>
+          </a:xfrm>
+          <a:prstGeom prst="ellipse">
+            <a:avLst/>
+          </a:prstGeom>
+        </p:spPr>
+        <p:style>
+          <a:lnRef idx="2">
+            <a:schemeClr val="accent1">
+              <a:shade val="50000"/>
+            </a:schemeClr>
+          </a:lnRef>
+          <a:fillRef idx="1">
+            <a:schemeClr val="accent1"/>
+          </a:fillRef>
+          <a:effectRef idx="0">
+            <a:schemeClr val="accent1"/>
+          </a:effectRef>
+          <a:fontRef idx="minor">
+            <a:schemeClr val="lt1"/>
+          </a:fontRef>
+        </p:style>
+        <p:txBody>
+          <a:bodyPr rtlCol="0" anchor="ctr"/>
+          <a:lstStyle/>
+          <a:p>
+            <a:pPr algn="ctr"/>
+            <a:r>
+              <a:rPr lang="en-US" err="1" smtClean="0"/>
+              <a:t>y.h.k</a:t>
+            </a:r>
+            <a:endParaRPr lang="en-US"/>
+          </a:p>
+        </p:txBody>
+      </p:sp>
+      <p:sp>
+        <p:nvSpPr>
+          <p:cNvPr id="86" name="Oval 85"/>
+          <p:cNvSpPr/>
+          <p:nvPr/>
+        </p:nvSpPr>
+        <p:spPr>
+          <a:xfrm>
+            <a:off x="7162800" y="2743200"/>
+            <a:ext cx="1524000" cy="457200"/>
+          </a:xfrm>
+          <a:prstGeom prst="ellipse">
+            <a:avLst/>
+          </a:prstGeom>
+        </p:spPr>
+        <p:style>
+          <a:lnRef idx="2">
+            <a:schemeClr val="accent1">
+              <a:shade val="50000"/>
+            </a:schemeClr>
+          </a:lnRef>
+          <a:fillRef idx="1">
+            <a:schemeClr val="accent1"/>
+          </a:fillRef>
+          <a:effectRef idx="0">
+            <a:schemeClr val="accent1"/>
+          </a:effectRef>
+          <a:fontRef idx="minor">
+            <a:schemeClr val="lt1"/>
+          </a:fontRef>
+        </p:style>
+        <p:txBody>
+          <a:bodyPr rtlCol="0" anchor="ctr"/>
+          <a:lstStyle/>
+          <a:p>
+            <a:pPr algn="ctr"/>
+            <a:r>
+              <a:rPr lang="en-US" smtClean="0"/>
+              <a:t>z</a:t>
+            </a:r>
+            <a:r>
+              <a:rPr lang="en-US" smtClean="0"/>
+              <a:t>+i</a:t>
+            </a:r>
+            <a:endParaRPr lang="en-US"/>
+          </a:p>
+        </p:txBody>
+      </p:sp>
+      <p:cxnSp>
+        <p:nvCxnSpPr>
+          <p:cNvPr id="87" name="Straight Arrow Connector 86"/>
+          <p:cNvCxnSpPr>
+            <a:stCxn id="84" idx="3"/>
+            <a:endCxn id="85" idx="7"/>
+          </p:cNvCxnSpPr>
+          <p:nvPr/>
+        </p:nvCxnSpPr>
+        <p:spPr>
+          <a:xfrm rot="5400000">
+            <a:off x="6023466" y="2222710"/>
+            <a:ext cx="514910" cy="659981"/>
+          </a:xfrm>
+          <a:prstGeom prst="straightConnector1">
+            <a:avLst/>
+          </a:prstGeom>
+          <a:ln>
+            <a:tailEnd type="arrow"/>
+          </a:ln>
+        </p:spPr>
+        <p:style>
+          <a:lnRef idx="1">
+            <a:schemeClr val="accent1"/>
+          </a:lnRef>
+          <a:fillRef idx="0">
+            <a:schemeClr val="accent1"/>
+          </a:fillRef>
+          <a:effectRef idx="0">
+            <a:schemeClr val="accent1"/>
+          </a:effectRef>
+          <a:fontRef idx="minor">
+            <a:schemeClr val="tx1"/>
+          </a:fontRef>
+        </p:style>
+      </p:cxnSp>
+      <p:cxnSp>
+        <p:nvCxnSpPr>
+          <p:cNvPr id="88" name="Straight Arrow Connector 87"/>
+          <p:cNvCxnSpPr>
+            <a:stCxn id="84" idx="5"/>
+            <a:endCxn id="86" idx="1"/>
+          </p:cNvCxnSpPr>
+          <p:nvPr/>
+        </p:nvCxnSpPr>
+        <p:spPr>
+          <a:xfrm rot="16200000" flipH="1">
+            <a:off x="7064282" y="2488452"/>
+            <a:ext cx="514910" cy="128496"/>
+          </a:xfrm>
+          <a:prstGeom prst="straightConnector1">
+            <a:avLst/>
+          </a:prstGeom>
+          <a:ln>
+            <a:tailEnd type="arrow"/>
+          </a:ln>
+        </p:spPr>
+        <p:style>
+          <a:lnRef idx="1">
+            <a:schemeClr val="accent1"/>
+          </a:lnRef>
+          <a:fillRef idx="0">
+            <a:schemeClr val="accent1"/>
+          </a:fillRef>
+          <a:effectRef idx="0">
+            <a:schemeClr val="accent1"/>
+          </a:effectRef>
+          <a:fontRef idx="minor">
+            <a:schemeClr val="tx1"/>
+          </a:fontRef>
+        </p:style>
+      </p:cxnSp>
+      <p:sp>
+        <p:nvSpPr>
+          <p:cNvPr id="89" name="TextBox 88"/>
+          <p:cNvSpPr txBox="1"/>
+          <p:nvPr/>
+        </p:nvSpPr>
+        <p:spPr>
+          <a:xfrm>
+            <a:off x="7239000" y="2438400"/>
+            <a:ext cx="359394" cy="369332"/>
+          </a:xfrm>
+          <a:prstGeom prst="rect">
+            <a:avLst/>
+          </a:prstGeom>
+          <a:noFill/>
+        </p:spPr>
+        <p:txBody>
+          <a:bodyPr wrap="none" rtlCol="0">
+            <a:spAutoFit/>
+          </a:bodyPr>
+          <a:lstStyle/>
+          <a:p>
+            <a:r>
+              <a:rPr lang="en-US" smtClean="0"/>
+              <a:t>in</a:t>
+            </a:r>
+            <a:endParaRPr lang="en-US"/>
+          </a:p>
+        </p:txBody>
+      </p:sp>
+      <p:sp>
+        <p:nvSpPr>
+          <p:cNvPr id="90" name="TextBox 89"/>
+          <p:cNvSpPr txBox="1"/>
+          <p:nvPr/>
+        </p:nvSpPr>
+        <p:spPr>
+          <a:xfrm>
+            <a:off x="5715000" y="2362200"/>
+            <a:ext cx="902811" cy="369332"/>
+          </a:xfrm>
+          <a:prstGeom prst="rect">
+            <a:avLst/>
+          </a:prstGeom>
+          <a:noFill/>
+        </p:spPr>
+        <p:txBody>
+          <a:bodyPr wrap="none" rtlCol="0">
+            <a:spAutoFit/>
+          </a:bodyPr>
+          <a:lstStyle/>
+          <a:p>
+            <a:r>
+              <a:rPr lang="en-US" err="1" smtClean="0"/>
+              <a:t>initExpr</a:t>
+            </a:r>
+            <a:endParaRPr lang="en-US"/>
+          </a:p>
+        </p:txBody>
+      </p:sp>
+      <p:sp>
+        <p:nvSpPr>
+          <p:cNvPr id="41" name="Oval 40"/>
+          <p:cNvSpPr/>
+          <p:nvPr/>
+        </p:nvSpPr>
+        <p:spPr>
+          <a:xfrm flipH="1">
+            <a:off x="5486400" y="2819400"/>
+            <a:ext cx="381000" cy="304800"/>
+          </a:xfrm>
+          <a:prstGeom prst="ellipse">
+            <a:avLst/>
+          </a:prstGeom>
+          <a:noFill/>
+          <a:ln>
+            <a:solidFill>
+              <a:srgbClr val="FF0000"/>
+            </a:solidFill>
+          </a:ln>
+        </p:spPr>
+        <p:style>
+          <a:lnRef idx="2">
+            <a:schemeClr val="accent1">
+              <a:shade val="50000"/>
+            </a:schemeClr>
+          </a:lnRef>
+          <a:fillRef idx="1">
+            <a:schemeClr val="accent1"/>
+          </a:fillRef>
+          <a:effectRef idx="0">
+            <a:schemeClr val="accent1"/>
+          </a:effectRef>
+          <a:fontRef idx="minor">
+            <a:schemeClr val="lt1"/>
+          </a:fontRef>
+        </p:style>
+        <p:txBody>
+          <a:bodyPr rtlCol="0" anchor="ctr"/>
+          <a:lstStyle/>
+          <a:p>
+            <a:pPr algn="ctr"/>
+            <a:endParaRPr lang="en-US"/>
+          </a:p>
+        </p:txBody>
+      </p:sp>
+      <p:sp>
+        <p:nvSpPr>
+          <p:cNvPr id="92" name="TextBox 91"/>
+          <p:cNvSpPr txBox="1"/>
+          <p:nvPr/>
+        </p:nvSpPr>
+        <p:spPr>
+          <a:xfrm>
+            <a:off x="762000" y="4419600"/>
+            <a:ext cx="7543800" cy="1754326"/>
+          </a:xfrm>
+          <a:prstGeom prst="rect">
+            <a:avLst/>
+          </a:prstGeom>
+          <a:noFill/>
+        </p:spPr>
+        <p:txBody>
+          <a:bodyPr wrap="square" rtlCol="0">
+            <a:spAutoFit/>
+          </a:bodyPr>
+          <a:lstStyle/>
+          <a:p>
+            <a:r>
+              <a:rPr lang="en-US" err="1" smtClean="0"/>
+              <a:t>traceback</a:t>
+            </a:r>
+            <a:r>
+              <a:rPr lang="en-US" smtClean="0"/>
+              <a:t> on </a:t>
+            </a:r>
+            <a:r>
+              <a:rPr lang="en-US" err="1" smtClean="0"/>
+              <a:t>y.h</a:t>
+            </a:r>
+            <a:r>
+              <a:rPr lang="en-US" smtClean="0"/>
+              <a:t>; unused for </a:t>
+            </a:r>
+            <a:r>
+              <a:rPr lang="en-US" err="1" smtClean="0"/>
+              <a:t>y.h</a:t>
+            </a:r>
+            <a:r>
+              <a:rPr lang="en-US" smtClean="0"/>
+              <a:t>; unused for </a:t>
+            </a:r>
+            <a:r>
+              <a:rPr lang="en-US" err="1" smtClean="0"/>
+              <a:t>y.h.k</a:t>
+            </a:r>
+            <a:r>
+              <a:rPr lang="en-US" smtClean="0"/>
+              <a:t>; unused for z in z+i; unused for z+i in z+i (=false)</a:t>
+            </a:r>
+          </a:p>
+          <a:p>
+            <a:r>
+              <a:rPr lang="en-US" err="1" smtClean="0"/>
+              <a:t>traceback</a:t>
+            </a:r>
+            <a:r>
+              <a:rPr lang="en-US" smtClean="0"/>
+              <a:t> on y (after reverse-traversal across </a:t>
+            </a:r>
+            <a:r>
+              <a:rPr lang="en-US" err="1" smtClean="0"/>
+              <a:t>y.h</a:t>
+            </a:r>
+            <a:r>
+              <a:rPr lang="en-US" smtClean="0"/>
+              <a:t>); unused for y; unused for </a:t>
+            </a:r>
+            <a:r>
+              <a:rPr lang="en-US" err="1" smtClean="0"/>
+              <a:t>y</a:t>
+            </a:r>
+            <a:r>
+              <a:rPr lang="en-US" err="1" smtClean="0"/>
+              <a:t>.h</a:t>
+            </a:r>
+            <a:r>
+              <a:rPr lang="en-US" smtClean="0"/>
+              <a:t> (cached=false) --&gt; on to initExpr for let-variable y:</a:t>
+            </a:r>
+          </a:p>
+          <a:p>
+            <a:r>
+              <a:rPr lang="en-US" err="1" smtClean="0"/>
+              <a:t>traceback</a:t>
+            </a:r>
+            <a:r>
+              <a:rPr lang="en-US" smtClean="0"/>
+              <a:t> on self; unused for self; unused for y in </a:t>
+            </a:r>
+            <a:r>
+              <a:rPr lang="en-US" err="1" smtClean="0"/>
+              <a:t>y.h.k</a:t>
+            </a:r>
+            <a:r>
+              <a:rPr lang="en-US" smtClean="0"/>
+              <a:t> in let; unused for </a:t>
+            </a:r>
+            <a:r>
+              <a:rPr lang="en-US" err="1" smtClean="0"/>
+              <a:t>y.h</a:t>
+            </a:r>
+            <a:r>
+              <a:rPr lang="en-US" smtClean="0"/>
+              <a:t> in let z</a:t>
+            </a:r>
+            <a:endParaRPr lang="en-US"/>
+          </a:p>
+        </p:txBody>
+      </p:sp>
+      <p:sp>
+        <p:nvSpPr>
+          <p:cNvPr id="20" name="Oval 19"/>
+          <p:cNvSpPr/>
+          <p:nvPr/>
+        </p:nvSpPr>
+        <p:spPr>
+          <a:xfrm>
+            <a:off x="5257800" y="1143000"/>
+            <a:ext cx="1752600" cy="457200"/>
+          </a:xfrm>
+          <a:prstGeom prst="ellipse">
+            <a:avLst/>
+          </a:prstGeom>
+        </p:spPr>
+        <p:style>
+          <a:lnRef idx="2">
+            <a:schemeClr val="accent1">
+              <a:shade val="50000"/>
+            </a:schemeClr>
+          </a:lnRef>
+          <a:fillRef idx="1">
+            <a:schemeClr val="accent1"/>
+          </a:fillRef>
+          <a:effectRef idx="0">
+            <a:schemeClr val="accent1"/>
+          </a:effectRef>
+          <a:fontRef idx="minor">
+            <a:schemeClr val="lt1"/>
+          </a:fontRef>
+        </p:style>
+        <p:txBody>
+          <a:bodyPr rtlCol="0" anchor="ctr"/>
+          <a:lstStyle/>
+          <a:p>
+            <a:pPr algn="ctr"/>
+            <a:r>
+              <a:rPr lang="en-US" smtClean="0"/>
+              <a:t>select(</a:t>
+            </a:r>
+            <a:r>
+              <a:rPr lang="en-US" err="1" smtClean="0"/>
+              <a:t>i</a:t>
+            </a:r>
+            <a:r>
+              <a:rPr lang="en-US" smtClean="0"/>
+              <a:t>|...)</a:t>
+            </a:r>
+            <a:endParaRPr lang="en-US"/>
+          </a:p>
+        </p:txBody>
+      </p:sp>
+      <p:sp>
+        <p:nvSpPr>
+          <p:cNvPr id="21" name="Oval 20"/>
+          <p:cNvSpPr/>
+          <p:nvPr/>
+        </p:nvSpPr>
+        <p:spPr>
+          <a:xfrm>
+            <a:off x="4495800" y="1905000"/>
+            <a:ext cx="1143000" cy="457200"/>
+          </a:xfrm>
+          <a:prstGeom prst="ellipse">
+            <a:avLst/>
+          </a:prstGeom>
+        </p:spPr>
+        <p:style>
+          <a:lnRef idx="2">
+            <a:schemeClr val="accent1">
+              <a:shade val="50000"/>
+            </a:schemeClr>
+          </a:lnRef>
+          <a:fillRef idx="1">
+            <a:schemeClr val="accent1"/>
+          </a:fillRef>
+          <a:effectRef idx="0">
+            <a:schemeClr val="accent1"/>
+          </a:effectRef>
+          <a:fontRef idx="minor">
+            <a:schemeClr val="lt1"/>
+          </a:fontRef>
+        </p:style>
+        <p:txBody>
+          <a:bodyPr rtlCol="0" anchor="ctr"/>
+          <a:lstStyle/>
+          <a:p>
+            <a:pPr algn="ctr"/>
+            <a:r>
+              <a:rPr lang="en-US" err="1" smtClean="0"/>
+              <a:t>x.a</a:t>
+            </a:r>
+            <a:r>
+              <a:rPr lang="en-US" err="1" smtClean="0"/>
+              <a:t>.d</a:t>
+            </a:r>
+            <a:endParaRPr lang="en-US"/>
+          </a:p>
+        </p:txBody>
+      </p:sp>
+      <p:cxnSp>
+        <p:nvCxnSpPr>
+          <p:cNvPr id="23" name="Straight Arrow Connector 22"/>
+          <p:cNvCxnSpPr>
+            <a:stCxn id="20" idx="4"/>
+            <a:endCxn id="84" idx="1"/>
+          </p:cNvCxnSpPr>
+          <p:nvPr/>
+        </p:nvCxnSpPr>
+        <p:spPr>
+          <a:xfrm rot="16200000" flipH="1">
+            <a:off x="6186628" y="1547671"/>
+            <a:ext cx="371755" cy="476811"/>
+          </a:xfrm>
+          <a:prstGeom prst="straightConnector1">
+            <a:avLst/>
+          </a:prstGeom>
+          <a:ln>
+            <a:tailEnd type="arrow"/>
+          </a:ln>
+        </p:spPr>
+        <p:style>
+          <a:lnRef idx="1">
+            <a:schemeClr val="accent1"/>
+          </a:lnRef>
+          <a:fillRef idx="0">
+            <a:schemeClr val="accent1"/>
+          </a:fillRef>
+          <a:effectRef idx="0">
+            <a:schemeClr val="accent1"/>
+          </a:effectRef>
+          <a:fontRef idx="minor">
+            <a:schemeClr val="tx1"/>
+          </a:fontRef>
+        </p:style>
+      </p:cxnSp>
+      <p:cxnSp>
+        <p:nvCxnSpPr>
+          <p:cNvPr id="24" name="Straight Arrow Connector 23"/>
+          <p:cNvCxnSpPr>
+            <a:stCxn id="20" idx="4"/>
+            <a:endCxn id="21" idx="0"/>
+          </p:cNvCxnSpPr>
+          <p:nvPr/>
+        </p:nvCxnSpPr>
+        <p:spPr>
+          <a:xfrm rot="5400000">
+            <a:off x="5448300" y="1219200"/>
+            <a:ext cx="304800" cy="1066800"/>
+          </a:xfrm>
+          <a:prstGeom prst="straightConnector1">
+            <a:avLst/>
+          </a:prstGeom>
+          <a:ln>
+            <a:tailEnd type="arrow"/>
+          </a:ln>
+        </p:spPr>
+        <p:style>
+          <a:lnRef idx="1">
+            <a:schemeClr val="accent1"/>
+          </a:lnRef>
+          <a:fillRef idx="0">
+            <a:schemeClr val="accent1"/>
+          </a:fillRef>
+          <a:effectRef idx="0">
+            <a:schemeClr val="accent1"/>
+          </a:effectRef>
+          <a:fontRef idx="minor">
+            <a:schemeClr val="tx1"/>
+          </a:fontRef>
+        </p:style>
+      </p:cxnSp>
+      <p:sp>
+        <p:nvSpPr>
+          <p:cNvPr id="26" name="TextBox 25"/>
+          <p:cNvSpPr txBox="1"/>
+          <p:nvPr/>
+        </p:nvSpPr>
+        <p:spPr>
+          <a:xfrm>
+            <a:off x="4724400" y="1524000"/>
+            <a:ext cx="808042" cy="369332"/>
+          </a:xfrm>
+          <a:prstGeom prst="rect">
+            <a:avLst/>
+          </a:prstGeom>
+          <a:noFill/>
+        </p:spPr>
+        <p:txBody>
+          <a:bodyPr wrap="none" rtlCol="0">
+            <a:spAutoFit/>
+          </a:bodyPr>
+          <a:lstStyle/>
+          <a:p>
+            <a:r>
+              <a:rPr lang="en-US" smtClean="0"/>
+              <a:t>source</a:t>
+            </a:r>
+            <a:endParaRPr lang="en-US"/>
+          </a:p>
+        </p:txBody>
+      </p:sp>
+      <p:sp>
+        <p:nvSpPr>
+          <p:cNvPr id="27" name="TextBox 26"/>
+          <p:cNvSpPr txBox="1"/>
+          <p:nvPr/>
+        </p:nvSpPr>
+        <p:spPr>
+          <a:xfrm>
+            <a:off x="6629400" y="1524000"/>
+            <a:ext cx="654346" cy="369332"/>
+          </a:xfrm>
+          <a:prstGeom prst="rect">
+            <a:avLst/>
+          </a:prstGeom>
+          <a:noFill/>
+        </p:spPr>
+        <p:txBody>
+          <a:bodyPr wrap="none" rtlCol="0">
+            <a:spAutoFit/>
+          </a:bodyPr>
+          <a:lstStyle/>
+          <a:p>
+            <a:r>
+              <a:rPr lang="en-US" smtClean="0"/>
+              <a:t>body</a:t>
+            </a:r>
+            <a:endParaRPr lang="en-US"/>
           </a:p>
         </p:txBody>
       </p:sp>

</xml_diff>

<commit_message>
updated according to latest assumptions
git-svn-id: https://www.hpi.uni-potsdam.de/giese/gforge/svn/bp2009/sources/trunk@1571 3ca8e212-6386-4b1e-b09d-39f68028012c
</commit_message>
<xml_diff>
--- a/de.hpi.sam.bp2009.solution.impactAnalyzer/ExampleTree.pptx
+++ b/de.hpi.sam.bp2009.solution.impactAnalyzer/ExampleTree.pptx
@@ -4,12 +4,16 @@
   <p:sldMasterIdLst>
     <p:sldMasterId id="2147483648" r:id="rId1"/>
   </p:sldMasterIdLst>
+  <p:notesMasterIdLst>
+    <p:notesMasterId r:id="rId8"/>
+  </p:notesMasterIdLst>
   <p:sldIdLst>
     <p:sldId id="256" r:id="rId2"/>
     <p:sldId id="257" r:id="rId3"/>
     <p:sldId id="258" r:id="rId4"/>
     <p:sldId id="260" r:id="rId5"/>
     <p:sldId id="259" r:id="rId6"/>
+    <p:sldId id="261" r:id="rId7"/>
   </p:sldIdLst>
   <p:sldSz cx="9144000" cy="6858000" type="screen4x3"/>
   <p:notesSz cx="6858000" cy="9144000"/>
@@ -109,6 +113,549 @@
     </a:lvl9pPr>
   </p:defaultTextStyle>
 </p:presentation>
+</file>
+
+<file path=ppt/notesMasters/notesMaster1.xml><?xml version="1.0" encoding="utf-8"?>
+<p:notesMaster xmlns:a="http://schemas.openxmlformats.org/drawingml/2006/main" xmlns:r="http://schemas.openxmlformats.org/officeDocument/2006/relationships" xmlns:p="http://schemas.openxmlformats.org/presentationml/2006/main">
+  <p:cSld>
+    <p:bg>
+      <p:bgRef idx="1001">
+        <a:schemeClr val="bg1"/>
+      </p:bgRef>
+    </p:bg>
+    <p:spTree>
+      <p:nvGrpSpPr>
+        <p:cNvPr id="1" name=""/>
+        <p:cNvGrpSpPr/>
+        <p:nvPr/>
+      </p:nvGrpSpPr>
+      <p:grpSpPr>
+        <a:xfrm>
+          <a:off x="0" y="0"/>
+          <a:ext cx="0" cy="0"/>
+          <a:chOff x="0" y="0"/>
+          <a:chExt cx="0" cy="0"/>
+        </a:xfrm>
+      </p:grpSpPr>
+      <p:sp>
+        <p:nvSpPr>
+          <p:cNvPr id="2" name="Header Placeholder 1"/>
+          <p:cNvSpPr>
+            <a:spLocks noGrp="1"/>
+          </p:cNvSpPr>
+          <p:nvPr>
+            <p:ph type="hdr" sz="quarter"/>
+          </p:nvPr>
+        </p:nvSpPr>
+        <p:spPr>
+          <a:xfrm>
+            <a:off x="0" y="0"/>
+            <a:ext cx="2971800" cy="457200"/>
+          </a:xfrm>
+          <a:prstGeom prst="rect">
+            <a:avLst/>
+          </a:prstGeom>
+        </p:spPr>
+        <p:txBody>
+          <a:bodyPr vert="horz" lIns="91440" tIns="45720" rIns="91440" bIns="45720" rtlCol="0"/>
+          <a:lstStyle>
+            <a:lvl1pPr algn="l">
+              <a:defRPr sz="1200"/>
+            </a:lvl1pPr>
+          </a:lstStyle>
+          <a:p>
+            <a:endParaRPr lang="en-US"/>
+          </a:p>
+        </p:txBody>
+      </p:sp>
+      <p:sp>
+        <p:nvSpPr>
+          <p:cNvPr id="3" name="Date Placeholder 2"/>
+          <p:cNvSpPr>
+            <a:spLocks noGrp="1"/>
+          </p:cNvSpPr>
+          <p:nvPr>
+            <p:ph type="dt" idx="1"/>
+          </p:nvPr>
+        </p:nvSpPr>
+        <p:spPr>
+          <a:xfrm>
+            <a:off x="3884613" y="0"/>
+            <a:ext cx="2971800" cy="457200"/>
+          </a:xfrm>
+          <a:prstGeom prst="rect">
+            <a:avLst/>
+          </a:prstGeom>
+        </p:spPr>
+        <p:txBody>
+          <a:bodyPr vert="horz" lIns="91440" tIns="45720" rIns="91440" bIns="45720" rtlCol="0"/>
+          <a:lstStyle>
+            <a:lvl1pPr algn="r">
+              <a:defRPr sz="1200"/>
+            </a:lvl1pPr>
+          </a:lstStyle>
+          <a:p>
+            <a:fld id="{3C8463C4-E2FC-4168-8788-D9ED5C89F6BC}" type="datetimeFigureOut">
+              <a:rPr lang="en-US" smtClean="0"/>
+              <a:t>9/14/2010</a:t>
+            </a:fld>
+            <a:endParaRPr lang="en-US"/>
+          </a:p>
+        </p:txBody>
+      </p:sp>
+      <p:sp>
+        <p:nvSpPr>
+          <p:cNvPr id="4" name="Slide Image Placeholder 3"/>
+          <p:cNvSpPr>
+            <a:spLocks noGrp="1" noRot="1" noChangeAspect="1"/>
+          </p:cNvSpPr>
+          <p:nvPr>
+            <p:ph type="sldImg" idx="2"/>
+          </p:nvPr>
+        </p:nvSpPr>
+        <p:spPr>
+          <a:xfrm>
+            <a:off x="1143000" y="685800"/>
+            <a:ext cx="4572000" cy="3429000"/>
+          </a:xfrm>
+          <a:prstGeom prst="rect">
+            <a:avLst/>
+          </a:prstGeom>
+          <a:noFill/>
+          <a:ln w="12700">
+            <a:solidFill>
+              <a:prstClr val="black"/>
+            </a:solidFill>
+          </a:ln>
+        </p:spPr>
+        <p:txBody>
+          <a:bodyPr vert="horz" lIns="91440" tIns="45720" rIns="91440" bIns="45720" rtlCol="0" anchor="ctr"/>
+          <a:lstStyle/>
+          <a:p>
+            <a:endParaRPr lang="en-US"/>
+          </a:p>
+        </p:txBody>
+      </p:sp>
+      <p:sp>
+        <p:nvSpPr>
+          <p:cNvPr id="5" name="Notes Placeholder 4"/>
+          <p:cNvSpPr>
+            <a:spLocks noGrp="1"/>
+          </p:cNvSpPr>
+          <p:nvPr>
+            <p:ph type="body" sz="quarter" idx="3"/>
+          </p:nvPr>
+        </p:nvSpPr>
+        <p:spPr>
+          <a:xfrm>
+            <a:off x="685800" y="4343400"/>
+            <a:ext cx="5486400" cy="4114800"/>
+          </a:xfrm>
+          <a:prstGeom prst="rect">
+            <a:avLst/>
+          </a:prstGeom>
+        </p:spPr>
+        <p:txBody>
+          <a:bodyPr vert="horz" lIns="91440" tIns="45720" rIns="91440" bIns="45720" rtlCol="0">
+            <a:normAutofit/>
+          </a:bodyPr>
+          <a:lstStyle/>
+          <a:p>
+            <a:pPr lvl="0"/>
+            <a:r>
+              <a:rPr lang="en-US" smtClean="0"/>
+              <a:t>Click to edit Master text styles</a:t>
+            </a:r>
+          </a:p>
+          <a:p>
+            <a:pPr lvl="1"/>
+            <a:r>
+              <a:rPr lang="en-US" smtClean="0"/>
+              <a:t>Second level</a:t>
+            </a:r>
+          </a:p>
+          <a:p>
+            <a:pPr lvl="2"/>
+            <a:r>
+              <a:rPr lang="en-US" smtClean="0"/>
+              <a:t>Third level</a:t>
+            </a:r>
+          </a:p>
+          <a:p>
+            <a:pPr lvl="3"/>
+            <a:r>
+              <a:rPr lang="en-US" smtClean="0"/>
+              <a:t>Fourth level</a:t>
+            </a:r>
+          </a:p>
+          <a:p>
+            <a:pPr lvl="4"/>
+            <a:r>
+              <a:rPr lang="en-US" smtClean="0"/>
+              <a:t>Fifth level</a:t>
+            </a:r>
+            <a:endParaRPr lang="en-US"/>
+          </a:p>
+        </p:txBody>
+      </p:sp>
+      <p:sp>
+        <p:nvSpPr>
+          <p:cNvPr id="6" name="Footer Placeholder 5"/>
+          <p:cNvSpPr>
+            <a:spLocks noGrp="1"/>
+          </p:cNvSpPr>
+          <p:nvPr>
+            <p:ph type="ftr" sz="quarter" idx="4"/>
+          </p:nvPr>
+        </p:nvSpPr>
+        <p:spPr>
+          <a:xfrm>
+            <a:off x="0" y="8685213"/>
+            <a:ext cx="2971800" cy="457200"/>
+          </a:xfrm>
+          <a:prstGeom prst="rect">
+            <a:avLst/>
+          </a:prstGeom>
+        </p:spPr>
+        <p:txBody>
+          <a:bodyPr vert="horz" lIns="91440" tIns="45720" rIns="91440" bIns="45720" rtlCol="0" anchor="b"/>
+          <a:lstStyle>
+            <a:lvl1pPr algn="l">
+              <a:defRPr sz="1200"/>
+            </a:lvl1pPr>
+          </a:lstStyle>
+          <a:p>
+            <a:endParaRPr lang="en-US"/>
+          </a:p>
+        </p:txBody>
+      </p:sp>
+      <p:sp>
+        <p:nvSpPr>
+          <p:cNvPr id="7" name="Slide Number Placeholder 6"/>
+          <p:cNvSpPr>
+            <a:spLocks noGrp="1"/>
+          </p:cNvSpPr>
+          <p:nvPr>
+            <p:ph type="sldNum" sz="quarter" idx="5"/>
+          </p:nvPr>
+        </p:nvSpPr>
+        <p:spPr>
+          <a:xfrm>
+            <a:off x="3884613" y="8685213"/>
+            <a:ext cx="2971800" cy="457200"/>
+          </a:xfrm>
+          <a:prstGeom prst="rect">
+            <a:avLst/>
+          </a:prstGeom>
+        </p:spPr>
+        <p:txBody>
+          <a:bodyPr vert="horz" lIns="91440" tIns="45720" rIns="91440" bIns="45720" rtlCol="0" anchor="b"/>
+          <a:lstStyle>
+            <a:lvl1pPr algn="r">
+              <a:defRPr sz="1200"/>
+            </a:lvl1pPr>
+          </a:lstStyle>
+          <a:p>
+            <a:fld id="{F62A7951-5499-4090-9D1E-621054BD335E}" type="slidenum">
+              <a:rPr lang="en-US" smtClean="0"/>
+              <a:t>‹#›</a:t>
+            </a:fld>
+            <a:endParaRPr lang="en-US"/>
+          </a:p>
+        </p:txBody>
+      </p:sp>
+    </p:spTree>
+  </p:cSld>
+  <p:clrMap bg1="lt1" tx1="dk1" bg2="lt2" tx2="dk2" accent1="accent1" accent2="accent2" accent3="accent3" accent4="accent4" accent5="accent5" accent6="accent6" hlink="hlink" folHlink="folHlink"/>
+  <p:notesStyle>
+    <a:lvl1pPr marL="0" algn="l" defTabSz="914400" rtl="0" eaLnBrk="1" latinLnBrk="0" hangingPunct="1">
+      <a:defRPr sz="1200" kern="1200">
+        <a:solidFill>
+          <a:schemeClr val="tx1"/>
+        </a:solidFill>
+        <a:latin typeface="+mn-lt"/>
+        <a:ea typeface="+mn-ea"/>
+        <a:cs typeface="+mn-cs"/>
+      </a:defRPr>
+    </a:lvl1pPr>
+    <a:lvl2pPr marL="457200" algn="l" defTabSz="914400" rtl="0" eaLnBrk="1" latinLnBrk="0" hangingPunct="1">
+      <a:defRPr sz="1200" kern="1200">
+        <a:solidFill>
+          <a:schemeClr val="tx1"/>
+        </a:solidFill>
+        <a:latin typeface="+mn-lt"/>
+        <a:ea typeface="+mn-ea"/>
+        <a:cs typeface="+mn-cs"/>
+      </a:defRPr>
+    </a:lvl2pPr>
+    <a:lvl3pPr marL="914400" algn="l" defTabSz="914400" rtl="0" eaLnBrk="1" latinLnBrk="0" hangingPunct="1">
+      <a:defRPr sz="1200" kern="1200">
+        <a:solidFill>
+          <a:schemeClr val="tx1"/>
+        </a:solidFill>
+        <a:latin typeface="+mn-lt"/>
+        <a:ea typeface="+mn-ea"/>
+        <a:cs typeface="+mn-cs"/>
+      </a:defRPr>
+    </a:lvl3pPr>
+    <a:lvl4pPr marL="1371600" algn="l" defTabSz="914400" rtl="0" eaLnBrk="1" latinLnBrk="0" hangingPunct="1">
+      <a:defRPr sz="1200" kern="1200">
+        <a:solidFill>
+          <a:schemeClr val="tx1"/>
+        </a:solidFill>
+        <a:latin typeface="+mn-lt"/>
+        <a:ea typeface="+mn-ea"/>
+        <a:cs typeface="+mn-cs"/>
+      </a:defRPr>
+    </a:lvl4pPr>
+    <a:lvl5pPr marL="1828800" algn="l" defTabSz="914400" rtl="0" eaLnBrk="1" latinLnBrk="0" hangingPunct="1">
+      <a:defRPr sz="1200" kern="1200">
+        <a:solidFill>
+          <a:schemeClr val="tx1"/>
+        </a:solidFill>
+        <a:latin typeface="+mn-lt"/>
+        <a:ea typeface="+mn-ea"/>
+        <a:cs typeface="+mn-cs"/>
+      </a:defRPr>
+    </a:lvl5pPr>
+    <a:lvl6pPr marL="2286000" algn="l" defTabSz="914400" rtl="0" eaLnBrk="1" latinLnBrk="0" hangingPunct="1">
+      <a:defRPr sz="1200" kern="1200">
+        <a:solidFill>
+          <a:schemeClr val="tx1"/>
+        </a:solidFill>
+        <a:latin typeface="+mn-lt"/>
+        <a:ea typeface="+mn-ea"/>
+        <a:cs typeface="+mn-cs"/>
+      </a:defRPr>
+    </a:lvl6pPr>
+    <a:lvl7pPr marL="2743200" algn="l" defTabSz="914400" rtl="0" eaLnBrk="1" latinLnBrk="0" hangingPunct="1">
+      <a:defRPr sz="1200" kern="1200">
+        <a:solidFill>
+          <a:schemeClr val="tx1"/>
+        </a:solidFill>
+        <a:latin typeface="+mn-lt"/>
+        <a:ea typeface="+mn-ea"/>
+        <a:cs typeface="+mn-cs"/>
+      </a:defRPr>
+    </a:lvl7pPr>
+    <a:lvl8pPr marL="3200400" algn="l" defTabSz="914400" rtl="0" eaLnBrk="1" latinLnBrk="0" hangingPunct="1">
+      <a:defRPr sz="1200" kern="1200">
+        <a:solidFill>
+          <a:schemeClr val="tx1"/>
+        </a:solidFill>
+        <a:latin typeface="+mn-lt"/>
+        <a:ea typeface="+mn-ea"/>
+        <a:cs typeface="+mn-cs"/>
+      </a:defRPr>
+    </a:lvl8pPr>
+    <a:lvl9pPr marL="3657600" algn="l" defTabSz="914400" rtl="0" eaLnBrk="1" latinLnBrk="0" hangingPunct="1">
+      <a:defRPr sz="1200" kern="1200">
+        <a:solidFill>
+          <a:schemeClr val="tx1"/>
+        </a:solidFill>
+        <a:latin typeface="+mn-lt"/>
+        <a:ea typeface="+mn-ea"/>
+        <a:cs typeface="+mn-cs"/>
+      </a:defRPr>
+    </a:lvl9pPr>
+  </p:notesStyle>
+</p:notesMaster>
+</file>
+
+<file path=ppt/notesSlides/notesSlide1.xml><?xml version="1.0" encoding="utf-8"?>
+<p:notes xmlns:a="http://schemas.openxmlformats.org/drawingml/2006/main" xmlns:r="http://schemas.openxmlformats.org/officeDocument/2006/relationships" xmlns:p="http://schemas.openxmlformats.org/presentationml/2006/main">
+  <p:cSld>
+    <p:spTree>
+      <p:nvGrpSpPr>
+        <p:cNvPr id="1" name=""/>
+        <p:cNvGrpSpPr/>
+        <p:nvPr/>
+      </p:nvGrpSpPr>
+      <p:grpSpPr>
+        <a:xfrm>
+          <a:off x="0" y="0"/>
+          <a:ext cx="0" cy="0"/>
+          <a:chOff x="0" y="0"/>
+          <a:chExt cx="0" cy="0"/>
+        </a:xfrm>
+      </p:grpSpPr>
+      <p:sp>
+        <p:nvSpPr>
+          <p:cNvPr id="2" name="Slide Image Placeholder 1"/>
+          <p:cNvSpPr>
+            <a:spLocks noGrp="1" noRot="1" noChangeAspect="1"/>
+          </p:cNvSpPr>
+          <p:nvPr>
+            <p:ph type="sldImg"/>
+          </p:nvPr>
+        </p:nvSpPr>
+        <p:spPr/>
+      </p:sp>
+      <p:sp>
+        <p:nvSpPr>
+          <p:cNvPr id="3" name="Notes Placeholder 2"/>
+          <p:cNvSpPr>
+            <a:spLocks noGrp="1"/>
+          </p:cNvSpPr>
+          <p:nvPr>
+            <p:ph type="body" idx="1"/>
+          </p:nvPr>
+        </p:nvSpPr>
+        <p:spPr/>
+        <p:txBody>
+          <a:bodyPr>
+            <a:normAutofit/>
+          </a:bodyPr>
+          <a:lstStyle/>
+          <a:p>
+            <a:r>
+              <a:rPr lang="en-US" smtClean="0"/>
+              <a:t>There</a:t>
+            </a:r>
+            <a:r>
+              <a:rPr lang="en-US" baseline="0" smtClean="0"/>
+              <a:t> is a "hidden link" between the dynamic scope of i (the select body) and the back and forth to/from the self.f initExpr for the x variable. The x variable's value is generally independent of anything inside its in-expression (select). When a change inside the in-expression is traced back to the initExpr, this means that the let-variable is being traced back. This, in turn, implies that unused has been computed for the let variable expression inside the in-expression. Therefore, in case the initExpr is visited due to a traceback from a VariableExp referring the respective let-variable, no further unused check is necessary.</a:t>
+            </a:r>
+          </a:p>
+          <a:p>
+            <a:endParaRPr lang="en-US" baseline="0" smtClean="0"/>
+          </a:p>
+          <a:p>
+            <a:r>
+              <a:rPr lang="en-US" baseline="0" smtClean="0"/>
+              <a:t>But if we don't do the jump back from the initExpr to compute unused(...) for the variable usages (from which we came and for which we had computed the unused(...) function already), we wouldn't face the problem of having to match dynamic scopes for this kind of back and forth in the first place. This could, e.g., be implemented by entering the initExpr into the unused cache with </a:t>
+            </a:r>
+            <a:r>
+              <a:rPr lang="en-US" i="1" baseline="0" smtClean="0"/>
+              <a:t>false</a:t>
+            </a:r>
+            <a:r>
+              <a:rPr lang="en-US" baseline="0" smtClean="0"/>
+              <a:t> as value.</a:t>
+            </a:r>
+          </a:p>
+          <a:p>
+            <a:endParaRPr lang="en-US" baseline="0" smtClean="0"/>
+          </a:p>
+          <a:p>
+            <a:r>
+              <a:rPr lang="en-US" baseline="0" smtClean="0"/>
+              <a:t>When not coming from a traceback of the let variable, the initExpr is not in the unused cache; therefore, the unused check is performed, navigating to the referring VariableExp expressions, thus entering in particular a new "in" scope of the let variable, and in the example above, also the i iterator variable.</a:t>
+            </a:r>
+            <a:endParaRPr lang="en-US"/>
+          </a:p>
+        </p:txBody>
+      </p:sp>
+      <p:sp>
+        <p:nvSpPr>
+          <p:cNvPr id="4" name="Slide Number Placeholder 3"/>
+          <p:cNvSpPr>
+            <a:spLocks noGrp="1"/>
+          </p:cNvSpPr>
+          <p:nvPr>
+            <p:ph type="sldNum" sz="quarter" idx="10"/>
+          </p:nvPr>
+        </p:nvSpPr>
+        <p:spPr/>
+        <p:txBody>
+          <a:bodyPr/>
+          <a:lstStyle/>
+          <a:p>
+            <a:fld id="{F62A7951-5499-4090-9D1E-621054BD335E}" type="slidenum">
+              <a:rPr lang="en-US" smtClean="0"/>
+              <a:t>4</a:t>
+            </a:fld>
+            <a:endParaRPr lang="en-US"/>
+          </a:p>
+        </p:txBody>
+      </p:sp>
+    </p:spTree>
+  </p:cSld>
+  <p:clrMapOvr>
+    <a:masterClrMapping/>
+  </p:clrMapOvr>
+</p:notes>
+</file>
+
+<file path=ppt/notesSlides/notesSlide2.xml><?xml version="1.0" encoding="utf-8"?>
+<p:notes xmlns:a="http://schemas.openxmlformats.org/drawingml/2006/main" xmlns:r="http://schemas.openxmlformats.org/officeDocument/2006/relationships" xmlns:p="http://schemas.openxmlformats.org/presentationml/2006/main">
+  <p:cSld>
+    <p:spTree>
+      <p:nvGrpSpPr>
+        <p:cNvPr id="1" name=""/>
+        <p:cNvGrpSpPr/>
+        <p:nvPr/>
+      </p:nvGrpSpPr>
+      <p:grpSpPr>
+        <a:xfrm>
+          <a:off x="0" y="0"/>
+          <a:ext cx="0" cy="0"/>
+          <a:chOff x="0" y="0"/>
+          <a:chExt cx="0" cy="0"/>
+        </a:xfrm>
+      </p:grpSpPr>
+      <p:sp>
+        <p:nvSpPr>
+          <p:cNvPr id="2" name="Slide Image Placeholder 1"/>
+          <p:cNvSpPr>
+            <a:spLocks noGrp="1" noRot="1" noChangeAspect="1"/>
+          </p:cNvSpPr>
+          <p:nvPr>
+            <p:ph type="sldImg"/>
+          </p:nvPr>
+        </p:nvSpPr>
+        <p:spPr/>
+      </p:sp>
+      <p:sp>
+        <p:nvSpPr>
+          <p:cNvPr id="3" name="Notes Placeholder 2"/>
+          <p:cNvSpPr>
+            <a:spLocks noGrp="1"/>
+          </p:cNvSpPr>
+          <p:nvPr>
+            <p:ph type="body" idx="1"/>
+          </p:nvPr>
+        </p:nvSpPr>
+        <p:spPr/>
+        <p:txBody>
+          <a:bodyPr>
+            <a:normAutofit/>
+          </a:bodyPr>
+          <a:lstStyle/>
+          <a:p>
+            <a:endParaRPr lang="en-US"/>
+          </a:p>
+        </p:txBody>
+      </p:sp>
+      <p:sp>
+        <p:nvSpPr>
+          <p:cNvPr id="4" name="Slide Number Placeholder 3"/>
+          <p:cNvSpPr>
+            <a:spLocks noGrp="1"/>
+          </p:cNvSpPr>
+          <p:nvPr>
+            <p:ph type="sldNum" sz="quarter" idx="10"/>
+          </p:nvPr>
+        </p:nvSpPr>
+        <p:spPr/>
+        <p:txBody>
+          <a:bodyPr/>
+          <a:lstStyle/>
+          <a:p>
+            <a:fld id="{F62A7951-5499-4090-9D1E-621054BD335E}" type="slidenum">
+              <a:rPr lang="en-US" smtClean="0"/>
+              <a:t>6</a:t>
+            </a:fld>
+            <a:endParaRPr lang="en-US"/>
+          </a:p>
+        </p:txBody>
+      </p:sp>
+    </p:spTree>
+  </p:cSld>
+  <p:clrMapOvr>
+    <a:masterClrMapping/>
+  </p:clrMapOvr>
+</p:notes>
 </file>
 
 <file path=ppt/slideLayouts/slideLayout1.xml><?xml version="1.0" encoding="utf-8"?>
@@ -6742,7 +7289,7 @@
         <p:spPr>
           <a:xfrm>
             <a:off x="1066800" y="3048000"/>
-            <a:ext cx="7543800" cy="3693319"/>
+            <a:ext cx="7543800" cy="1477328"/>
           </a:xfrm>
           <a:prstGeom prst="rect">
             <a:avLst/>
@@ -6844,186 +7391,12 @@
           </a:p>
           <a:p>
             <a:r>
-              <a:rPr lang="en-US" err="1" smtClean="0"/>
-              <a:t>traceback</a:t>
-            </a:r>
-            <a:r>
-              <a:rPr lang="en-US" smtClean="0"/>
-              <a:t> on self; unused for self; unused for y in </a:t>
-            </a:r>
-            <a:r>
-              <a:rPr lang="en-US" err="1" smtClean="0"/>
-              <a:t>y.h.k</a:t>
-            </a:r>
-            <a:r>
-              <a:rPr lang="en-US" smtClean="0"/>
-              <a:t> in let z and unused for y in </a:t>
-            </a:r>
-            <a:r>
-              <a:rPr lang="en-US" err="1" smtClean="0"/>
-              <a:t>y+z</a:t>
-            </a:r>
-            <a:r>
-              <a:rPr lang="en-US" smtClean="0"/>
-              <a:t> in let z; unused for </a:t>
-            </a:r>
-            <a:r>
-              <a:rPr lang="en-US" err="1" smtClean="0"/>
-              <a:t>y.h</a:t>
-            </a:r>
-            <a:r>
-              <a:rPr lang="en-US" smtClean="0"/>
-              <a:t> and unused for </a:t>
-            </a:r>
-            <a:r>
-              <a:rPr lang="en-US" err="1" smtClean="0"/>
-              <a:t>y+z</a:t>
-            </a:r>
-            <a:r>
-              <a:rPr lang="en-US" smtClean="0"/>
-              <a:t> in let z</a:t>
-            </a:r>
-          </a:p>
-          <a:p>
-            <a:endParaRPr lang="en-US" smtClean="0"/>
-          </a:p>
-          <a:p>
-            <a:r>
-              <a:rPr lang="en-US" smtClean="0"/>
-              <a:t>Not an exact match because the context expressions are different (let y in the first case, let z in the second case). However, the question remains what to assume for variables when again entering the scopes under let z. let-expressions are only a substitution rule. Leaving the let expression while not changing other variables used in the let expression does not change the dynamic scope</a:t>
-            </a:r>
-            <a:endParaRPr lang="en-US"/>
-          </a:p>
-        </p:txBody>
-      </p:sp>
-      <p:sp>
-        <p:nvSpPr>
-          <p:cNvPr id="93" name="Oval 92"/>
-          <p:cNvSpPr/>
-          <p:nvPr/>
-        </p:nvSpPr>
-        <p:spPr>
-          <a:xfrm>
-            <a:off x="2362200" y="4419600"/>
-            <a:ext cx="1447800" cy="381000"/>
-          </a:xfrm>
-          <a:prstGeom prst="ellipse">
-            <a:avLst/>
-          </a:prstGeom>
-          <a:noFill/>
-          <a:ln>
-            <a:solidFill>
-              <a:srgbClr val="FFFF00"/>
-            </a:solidFill>
-          </a:ln>
-        </p:spPr>
-        <p:style>
-          <a:lnRef idx="2">
-            <a:schemeClr val="accent1">
-              <a:shade val="50000"/>
-            </a:schemeClr>
-          </a:lnRef>
-          <a:fillRef idx="1">
-            <a:schemeClr val="accent1"/>
-          </a:fillRef>
-          <a:effectRef idx="0">
-            <a:schemeClr val="accent1"/>
-          </a:effectRef>
-          <a:fontRef idx="minor">
-            <a:schemeClr val="lt1"/>
-          </a:fontRef>
-        </p:style>
-        <p:txBody>
-          <a:bodyPr rtlCol="0" anchor="ctr"/>
-          <a:lstStyle/>
-          <a:p>
-            <a:pPr algn="ctr"/>
-            <a:endParaRPr lang="en-US"/>
-          </a:p>
-        </p:txBody>
-      </p:sp>
-      <p:sp>
-        <p:nvSpPr>
-          <p:cNvPr id="94" name="Oval 93"/>
-          <p:cNvSpPr/>
-          <p:nvPr/>
-        </p:nvSpPr>
-        <p:spPr>
-          <a:xfrm>
-            <a:off x="2743200" y="3048000"/>
-            <a:ext cx="1600200" cy="381000"/>
-          </a:xfrm>
-          <a:prstGeom prst="ellipse">
-            <a:avLst/>
-          </a:prstGeom>
-          <a:noFill/>
-          <a:ln>
-            <a:solidFill>
-              <a:srgbClr val="FFFF00"/>
-            </a:solidFill>
-          </a:ln>
-        </p:spPr>
-        <p:style>
-          <a:lnRef idx="2">
-            <a:schemeClr val="accent1">
-              <a:shade val="50000"/>
-            </a:schemeClr>
-          </a:lnRef>
-          <a:fillRef idx="1">
-            <a:schemeClr val="accent1"/>
-          </a:fillRef>
-          <a:effectRef idx="0">
-            <a:schemeClr val="accent1"/>
-          </a:effectRef>
-          <a:fontRef idx="minor">
-            <a:schemeClr val="lt1"/>
-          </a:fontRef>
-        </p:style>
-        <p:txBody>
-          <a:bodyPr rtlCol="0" anchor="ctr"/>
-          <a:lstStyle/>
-          <a:p>
-            <a:pPr algn="ctr"/>
-            <a:endParaRPr lang="en-US"/>
-          </a:p>
-        </p:txBody>
-      </p:sp>
-      <p:cxnSp>
-        <p:nvCxnSpPr>
-          <p:cNvPr id="96" name="Straight Arrow Connector 95"/>
-          <p:cNvCxnSpPr>
-            <a:stCxn id="93" idx="0"/>
-            <a:endCxn id="94" idx="4"/>
-          </p:cNvCxnSpPr>
-          <p:nvPr/>
-        </p:nvCxnSpPr>
-        <p:spPr>
-          <a:xfrm rot="5400000" flipH="1" flipV="1">
-            <a:off x="2819400" y="3695700"/>
-            <a:ext cx="990600" cy="457200"/>
-          </a:xfrm>
-          <a:prstGeom prst="straightConnector1">
-            <a:avLst/>
-          </a:prstGeom>
-          <a:ln>
-            <a:tailEnd type="arrow"/>
-          </a:ln>
-        </p:spPr>
-        <p:style>
-          <a:lnRef idx="1">
-            <a:schemeClr val="accent1"/>
-          </a:lnRef>
-          <a:fillRef idx="0">
-            <a:schemeClr val="accent1"/>
-          </a:fillRef>
-          <a:effectRef idx="0">
-            <a:schemeClr val="accent1"/>
-          </a:effectRef>
-          <a:fontRef idx="minor">
-            <a:schemeClr val="tx1"/>
-          </a:fontRef>
-        </p:style>
-      </p:cxnSp>
+              <a:rPr lang="en-US" smtClean="0"/>
+              <a:t>traceback(no-unused) on self</a:t>
+            </a:r>
+          </a:p>
+        </p:txBody>
+      </p:sp>
     </p:spTree>
   </p:cSld>
   <p:clrMapOvr>
@@ -7057,7 +7430,7 @@
         </p:nvSpPr>
         <p:spPr>
           <a:xfrm>
-            <a:off x="4572000" y="685800"/>
+            <a:off x="4648200" y="228600"/>
             <a:ext cx="914400" cy="457200"/>
           </a:xfrm>
           <a:prstGeom prst="ellipse">
@@ -7101,7 +7474,7 @@
         </p:nvSpPr>
         <p:spPr>
           <a:xfrm>
-            <a:off x="5334000" y="1447800"/>
+            <a:off x="5410200" y="990600"/>
             <a:ext cx="1752600" cy="457200"/>
           </a:xfrm>
           <a:prstGeom prst="ellipse">
@@ -7153,7 +7526,7 @@
         </p:nvSpPr>
         <p:spPr>
           <a:xfrm>
-            <a:off x="4572000" y="2209800"/>
+            <a:off x="4648200" y="1752600"/>
             <a:ext cx="1143000" cy="457200"/>
           </a:xfrm>
           <a:prstGeom prst="ellipse">
@@ -7204,7 +7577,7 @@
         </p:nvCxnSpPr>
         <p:spPr>
           <a:xfrm rot="5400000">
-            <a:off x="4183506" y="992350"/>
+            <a:off x="4259706" y="535150"/>
             <a:ext cx="438710" cy="606100"/>
           </a:xfrm>
           <a:prstGeom prst="straightConnector1">
@@ -7240,7 +7613,7 @@
         </p:nvCxnSpPr>
         <p:spPr>
           <a:xfrm rot="16200000" flipH="1">
-            <a:off x="5252221" y="1176313"/>
+            <a:off x="5328421" y="719113"/>
             <a:ext cx="438710" cy="238174"/>
           </a:xfrm>
           <a:prstGeom prst="straightConnector1">
@@ -7276,7 +7649,7 @@
         </p:nvCxnSpPr>
         <p:spPr>
           <a:xfrm rot="16200000" flipH="1">
-            <a:off x="6262828" y="1852471"/>
+            <a:off x="6339028" y="1395271"/>
             <a:ext cx="371755" cy="476811"/>
           </a:xfrm>
           <a:prstGeom prst="straightConnector1">
@@ -7312,7 +7685,7 @@
         </p:nvCxnSpPr>
         <p:spPr>
           <a:xfrm rot="5400000">
-            <a:off x="5524500" y="1524000"/>
+            <a:off x="5600700" y="1066800"/>
             <a:ext cx="304800" cy="1066800"/>
           </a:xfrm>
           <a:prstGeom prst="straightConnector1">
@@ -7345,7 +7718,7 @@
         </p:nvSpPr>
         <p:spPr>
           <a:xfrm>
-            <a:off x="5486400" y="1143000"/>
+            <a:off x="5562600" y="685800"/>
             <a:ext cx="359394" cy="369332"/>
           </a:xfrm>
           <a:prstGeom prst="rect">
@@ -7375,7 +7748,7 @@
         </p:nvSpPr>
         <p:spPr>
           <a:xfrm>
-            <a:off x="4800600" y="1828800"/>
+            <a:off x="4876800" y="1371600"/>
             <a:ext cx="808042" cy="369332"/>
           </a:xfrm>
           <a:prstGeom prst="rect">
@@ -7405,7 +7778,7 @@
         </p:nvSpPr>
         <p:spPr>
           <a:xfrm>
-            <a:off x="6705600" y="1828800"/>
+            <a:off x="6781800" y="1371600"/>
             <a:ext cx="654346" cy="369332"/>
           </a:xfrm>
           <a:prstGeom prst="rect">
@@ -7435,7 +7808,7 @@
         </p:nvSpPr>
         <p:spPr>
           <a:xfrm>
-            <a:off x="6553200" y="2209800"/>
+            <a:off x="6629400" y="1752600"/>
             <a:ext cx="914400" cy="457200"/>
           </a:xfrm>
           <a:prstGeom prst="ellipse">
@@ -7479,7 +7852,7 @@
         </p:nvSpPr>
         <p:spPr>
           <a:xfrm>
-            <a:off x="7239000" y="2971800"/>
+            <a:off x="7315200" y="2514600"/>
             <a:ext cx="1676400" cy="457200"/>
           </a:xfrm>
           <a:prstGeom prst="ellipse">
@@ -7534,7 +7907,7 @@
         </p:nvCxnSpPr>
         <p:spPr>
           <a:xfrm rot="5400000">
-            <a:off x="6333845" y="2685489"/>
+            <a:off x="6410045" y="2228289"/>
             <a:ext cx="438710" cy="267822"/>
           </a:xfrm>
           <a:prstGeom prst="straightConnector1">
@@ -7570,7 +7943,7 @@
         </p:nvCxnSpPr>
         <p:spPr>
           <a:xfrm rot="16200000" flipH="1">
-            <a:off x="7189741" y="2743993"/>
+            <a:off x="7265941" y="2286793"/>
             <a:ext cx="438710" cy="150814"/>
           </a:xfrm>
           <a:prstGeom prst="straightConnector1">
@@ -7603,7 +7976,7 @@
         </p:nvSpPr>
         <p:spPr>
           <a:xfrm>
-            <a:off x="7543800" y="2590800"/>
+            <a:off x="7620000" y="2133600"/>
             <a:ext cx="359394" cy="369332"/>
           </a:xfrm>
           <a:prstGeom prst="rect">
@@ -7633,7 +8006,7 @@
         </p:nvSpPr>
         <p:spPr>
           <a:xfrm>
-            <a:off x="5638800" y="2667000"/>
+            <a:off x="5715000" y="2209800"/>
             <a:ext cx="902811" cy="369332"/>
           </a:xfrm>
           <a:prstGeom prst="rect">
@@ -7663,7 +8036,7 @@
         </p:nvSpPr>
         <p:spPr>
           <a:xfrm>
-            <a:off x="4343400" y="4038600"/>
+            <a:off x="4419600" y="3581400"/>
             <a:ext cx="1143000" cy="457200"/>
           </a:xfrm>
           <a:prstGeom prst="ellipse">
@@ -7707,7 +8080,7 @@
         </p:nvSpPr>
         <p:spPr>
           <a:xfrm>
-            <a:off x="6705600" y="4038600"/>
+            <a:off x="6781800" y="3581400"/>
             <a:ext cx="1295400" cy="457200"/>
           </a:xfrm>
           <a:prstGeom prst="ellipse">
@@ -7755,7 +8128,7 @@
         </p:nvSpPr>
         <p:spPr>
           <a:xfrm>
-            <a:off x="5638800" y="2971800"/>
+            <a:off x="5715000" y="2514600"/>
             <a:ext cx="914400" cy="457200"/>
           </a:xfrm>
           <a:prstGeom prst="ellipse">
@@ -7802,7 +8175,7 @@
         </p:nvCxnSpPr>
         <p:spPr>
           <a:xfrm rot="5400000">
-            <a:off x="5005529" y="3271417"/>
+            <a:off x="5081729" y="2814217"/>
             <a:ext cx="676555" cy="857811"/>
           </a:xfrm>
           <a:prstGeom prst="straightConnector1">
@@ -7838,7 +8211,7 @@
         </p:nvCxnSpPr>
         <p:spPr>
           <a:xfrm rot="5400000">
-            <a:off x="5791200" y="3733800"/>
+            <a:off x="5867400" y="3276600"/>
             <a:ext cx="609600" cy="1588"/>
           </a:xfrm>
           <a:prstGeom prst="straightConnector1">
@@ -7874,7 +8247,7 @@
         </p:nvCxnSpPr>
         <p:spPr>
           <a:xfrm rot="16200000" flipH="1">
-            <a:off x="6285543" y="3495791"/>
+            <a:off x="6361743" y="3038591"/>
             <a:ext cx="743510" cy="476018"/>
           </a:xfrm>
           <a:prstGeom prst="straightConnector1">
@@ -7907,7 +8280,7 @@
         </p:nvSpPr>
         <p:spPr>
           <a:xfrm>
-            <a:off x="4572000" y="3657600"/>
+            <a:off x="4648200" y="3200400"/>
             <a:ext cx="646011" cy="369332"/>
           </a:xfrm>
           <a:prstGeom prst="rect">
@@ -7937,7 +8310,7 @@
         </p:nvSpPr>
         <p:spPr>
           <a:xfrm>
-            <a:off x="5562600" y="3657600"/>
+            <a:off x="5638800" y="3200400"/>
             <a:ext cx="620683" cy="369332"/>
           </a:xfrm>
           <a:prstGeom prst="rect">
@@ -7967,7 +8340,7 @@
         </p:nvSpPr>
         <p:spPr>
           <a:xfrm>
-            <a:off x="6705600" y="3657600"/>
+            <a:off x="6781800" y="3200400"/>
             <a:ext cx="558166" cy="369332"/>
           </a:xfrm>
           <a:prstGeom prst="rect">
@@ -7997,7 +8370,7 @@
         </p:nvSpPr>
         <p:spPr>
           <a:xfrm>
-            <a:off x="5638800" y="4038600"/>
+            <a:off x="5715000" y="3581400"/>
             <a:ext cx="914400" cy="457200"/>
           </a:xfrm>
           <a:prstGeom prst="ellipse">
@@ -8041,7 +8414,7 @@
         </p:nvSpPr>
         <p:spPr>
           <a:xfrm>
-            <a:off x="4343400" y="4876800"/>
+            <a:off x="4419600" y="4419600"/>
             <a:ext cx="1600200" cy="457200"/>
           </a:xfrm>
           <a:prstGeom prst="ellipse">
@@ -8085,7 +8458,7 @@
         </p:nvSpPr>
         <p:spPr>
           <a:xfrm>
-            <a:off x="6324600" y="4876800"/>
+            <a:off x="6400800" y="4419600"/>
             <a:ext cx="1143000" cy="457200"/>
           </a:xfrm>
           <a:prstGeom prst="ellipse">
@@ -8132,7 +8505,7 @@
         </p:nvCxnSpPr>
         <p:spPr>
           <a:xfrm rot="5400000">
-            <a:off x="5483529" y="4654573"/>
+            <a:off x="5559729" y="4197373"/>
             <a:ext cx="514910" cy="63455"/>
           </a:xfrm>
           <a:prstGeom prst="straightConnector1">
@@ -8168,7 +8541,7 @@
         </p:nvCxnSpPr>
         <p:spPr>
           <a:xfrm rot="16200000" flipH="1">
-            <a:off x="6198184" y="4649950"/>
+            <a:off x="6274384" y="4192750"/>
             <a:ext cx="514910" cy="72700"/>
           </a:xfrm>
           <a:prstGeom prst="straightConnector1">
@@ -8201,7 +8574,7 @@
         </p:nvSpPr>
         <p:spPr>
           <a:xfrm>
-            <a:off x="6400800" y="4572000"/>
+            <a:off x="6477000" y="4114800"/>
             <a:ext cx="359394" cy="369332"/>
           </a:xfrm>
           <a:prstGeom prst="rect">
@@ -8231,7 +8604,7 @@
         </p:nvSpPr>
         <p:spPr>
           <a:xfrm>
-            <a:off x="4876800" y="4495800"/>
+            <a:off x="4953000" y="4038600"/>
             <a:ext cx="902811" cy="369332"/>
           </a:xfrm>
           <a:prstGeom prst="rect">
@@ -8261,7 +8634,7 @@
         </p:nvSpPr>
         <p:spPr>
           <a:xfrm>
-            <a:off x="3124200" y="1447800"/>
+            <a:off x="3200400" y="990600"/>
             <a:ext cx="1143000" cy="457200"/>
           </a:xfrm>
           <a:prstGeom prst="ellipse">
@@ -8305,7 +8678,7 @@
         </p:nvSpPr>
         <p:spPr>
           <a:xfrm>
-            <a:off x="3352800" y="1066800"/>
+            <a:off x="3429000" y="609600"/>
             <a:ext cx="902811" cy="369332"/>
           </a:xfrm>
           <a:prstGeom prst="rect">
@@ -8335,7 +8708,7 @@
         </p:nvSpPr>
         <p:spPr>
           <a:xfrm flipH="1">
-            <a:off x="4800600" y="4953000"/>
+            <a:off x="4876800" y="4495800"/>
             <a:ext cx="304800" cy="304800"/>
           </a:xfrm>
           <a:prstGeom prst="ellipse">
@@ -8381,8 +8754,8 @@
         </p:nvSpPr>
         <p:spPr>
           <a:xfrm>
-            <a:off x="381000" y="838200"/>
-            <a:ext cx="2667000" cy="5355312"/>
+            <a:off x="381000" y="304800"/>
+            <a:ext cx="2667000" cy="5909310"/>
           </a:xfrm>
           <a:prstGeom prst="rect">
             <a:avLst/>
@@ -8451,33 +8824,9 @@
             </a:pPr>
             <a:r>
               <a:rPr lang="en-US" smtClean="0"/>
-              <a:t>traceback for self.f; unused for self.f--&gt; unused for all x refs in select, particularly in i.b.c+x.g:</a:t>
-            </a:r>
-            <a:endParaRPr lang="en-US"/>
-          </a:p>
-        </p:txBody>
-      </p:sp>
-      <p:sp>
-        <p:nvSpPr>
-          <p:cNvPr id="65" name="TextBox 64"/>
-          <p:cNvSpPr txBox="1"/>
-          <p:nvPr/>
-        </p:nvSpPr>
-        <p:spPr>
-          <a:xfrm>
-            <a:off x="3581400" y="5486400"/>
-            <a:ext cx="5334000" cy="923330"/>
-          </a:xfrm>
-          <a:prstGeom prst="rect">
-            <a:avLst/>
-          </a:prstGeom>
-          <a:noFill/>
-        </p:spPr>
-        <p:txBody>
-          <a:bodyPr wrap="square" rtlCol="0">
-            <a:spAutoFit/>
-          </a:bodyPr>
-          <a:lstStyle/>
+              <a:t>traceback(cache:  unused(self.f)=false) for self.f</a:t>
+            </a:r>
+          </a:p>
           <a:p>
             <a:pPr>
               <a:buFont typeface="Arial" pitchFamily="34" charset="0"/>
@@ -8485,17 +8834,7 @@
             </a:pPr>
             <a:r>
               <a:rPr lang="en-US" smtClean="0"/>
-              <a:t>gets into scope of x (select) and i (let y)</a:t>
-            </a:r>
-          </a:p>
-          <a:p>
-            <a:pPr>
-              <a:buFont typeface="Arial" pitchFamily="34" charset="0"/>
-              <a:buChar char="•"/>
-            </a:pPr>
-            <a:r>
-              <a:rPr lang="en-US" smtClean="0"/>
-              <a:t>unused for x--&gt;x.g--&gt;i.b.c+x.g-&gt;z in z (false)--&gt;let z--&gt; [[i.a&gt;2]] (with which value for i???)</a:t>
+              <a:t>traceback for self; unused for self--&gt;self.f (cached: false)</a:t>
             </a:r>
             <a:endParaRPr lang="en-US"/>
           </a:p>
@@ -8534,7 +8873,7 @@
         </p:nvSpPr>
         <p:spPr>
           <a:xfrm>
-            <a:off x="3886200" y="152400"/>
+            <a:off x="2743200" y="609600"/>
             <a:ext cx="914400" cy="457200"/>
           </a:xfrm>
           <a:prstGeom prst="ellipse">
@@ -8578,7 +8917,7 @@
         </p:nvSpPr>
         <p:spPr>
           <a:xfrm>
-            <a:off x="2590800" y="1066800"/>
+            <a:off x="1447800" y="1524000"/>
             <a:ext cx="2057400" cy="457200"/>
           </a:xfrm>
           <a:prstGeom prst="ellipse">
@@ -8625,7 +8964,7 @@
         </p:nvCxnSpPr>
         <p:spPr>
           <a:xfrm rot="5400000">
-            <a:off x="3557729" y="604417"/>
+            <a:off x="2414729" y="1061617"/>
             <a:ext cx="524155" cy="400611"/>
           </a:xfrm>
           <a:prstGeom prst="straightConnector1">
@@ -8661,7 +9000,7 @@
         </p:nvCxnSpPr>
         <p:spPr>
           <a:xfrm rot="16200000" flipH="1">
-            <a:off x="5100217" y="109116"/>
+            <a:off x="3957217" y="566316"/>
             <a:ext cx="600355" cy="1467411"/>
           </a:xfrm>
           <a:prstGeom prst="straightConnector1">
@@ -8694,7 +9033,7 @@
         </p:nvSpPr>
         <p:spPr>
           <a:xfrm>
-            <a:off x="5791200" y="685800"/>
+            <a:off x="4648200" y="1143000"/>
             <a:ext cx="359394" cy="369332"/>
           </a:xfrm>
           <a:prstGeom prst="rect">
@@ -8724,7 +9063,7 @@
         </p:nvSpPr>
         <p:spPr>
           <a:xfrm>
-            <a:off x="2971800" y="609600"/>
+            <a:off x="1828800" y="1066800"/>
             <a:ext cx="902811" cy="369332"/>
           </a:xfrm>
           <a:prstGeom prst="rect">
@@ -8754,7 +9093,7 @@
         </p:nvSpPr>
         <p:spPr>
           <a:xfrm>
-            <a:off x="6477000" y="1905000"/>
+            <a:off x="5334000" y="2362200"/>
             <a:ext cx="914400" cy="457200"/>
           </a:xfrm>
           <a:prstGeom prst="ellipse">
@@ -8798,7 +9137,7 @@
         </p:nvSpPr>
         <p:spPr>
           <a:xfrm>
-            <a:off x="5105400" y="2743200"/>
+            <a:off x="3962400" y="3200400"/>
             <a:ext cx="990600" cy="457200"/>
           </a:xfrm>
           <a:prstGeom prst="ellipse">
@@ -8842,7 +9181,7 @@
         </p:nvSpPr>
         <p:spPr>
           <a:xfrm>
-            <a:off x="7162800" y="2743200"/>
+            <a:off x="6019800" y="3200400"/>
             <a:ext cx="1524000" cy="457200"/>
           </a:xfrm>
           <a:prstGeom prst="ellipse">
@@ -8893,7 +9232,7 @@
         </p:nvCxnSpPr>
         <p:spPr>
           <a:xfrm rot="5400000">
-            <a:off x="6023466" y="2222710"/>
+            <a:off x="4880466" y="2679910"/>
             <a:ext cx="514910" cy="659981"/>
           </a:xfrm>
           <a:prstGeom prst="straightConnector1">
@@ -8929,7 +9268,7 @@
         </p:nvCxnSpPr>
         <p:spPr>
           <a:xfrm rot="16200000" flipH="1">
-            <a:off x="7064282" y="2488452"/>
+            <a:off x="5921282" y="2945652"/>
             <a:ext cx="514910" cy="128496"/>
           </a:xfrm>
           <a:prstGeom prst="straightConnector1">
@@ -8962,7 +9301,7 @@
         </p:nvSpPr>
         <p:spPr>
           <a:xfrm>
-            <a:off x="7239000" y="2438400"/>
+            <a:off x="6096000" y="2895600"/>
             <a:ext cx="359394" cy="369332"/>
           </a:xfrm>
           <a:prstGeom prst="rect">
@@ -8992,7 +9331,7 @@
         </p:nvSpPr>
         <p:spPr>
           <a:xfrm>
-            <a:off x="5715000" y="2362200"/>
+            <a:off x="4572000" y="2819400"/>
             <a:ext cx="902811" cy="369332"/>
           </a:xfrm>
           <a:prstGeom prst="rect">
@@ -9022,7 +9361,7 @@
         </p:nvSpPr>
         <p:spPr>
           <a:xfrm flipH="1">
-            <a:off x="5486400" y="2819400"/>
+            <a:off x="4343400" y="3276600"/>
             <a:ext cx="381000" cy="304800"/>
           </a:xfrm>
           <a:prstGeom prst="ellipse">
@@ -9152,23 +9491,7 @@
             </a:r>
             <a:r>
               <a:rPr lang="en-US" smtClean="0"/>
-              <a:t> on self; unused for self; unused for y in </a:t>
-            </a:r>
-            <a:r>
-              <a:rPr lang="en-US" err="1" smtClean="0"/>
-              <a:t>y.h.k</a:t>
-            </a:r>
-            <a:r>
-              <a:rPr lang="en-US" smtClean="0"/>
-              <a:t> in let; unused for </a:t>
-            </a:r>
-            <a:r>
-              <a:rPr lang="en-US" err="1" smtClean="0"/>
-              <a:t>y.h</a:t>
-            </a:r>
-            <a:r>
-              <a:rPr lang="en-US" smtClean="0"/>
-              <a:t> in let z</a:t>
+              <a:t> on self (insert into cache: unused(self)=false); unused for self (cached: false)</a:t>
             </a:r>
             <a:endParaRPr lang="en-US"/>
           </a:p>
@@ -9182,7 +9505,7 @@
         </p:nvSpPr>
         <p:spPr>
           <a:xfrm>
-            <a:off x="5257800" y="1143000"/>
+            <a:off x="4114800" y="1600200"/>
             <a:ext cx="1752600" cy="457200"/>
           </a:xfrm>
           <a:prstGeom prst="ellipse">
@@ -9234,7 +9557,7 @@
         </p:nvSpPr>
         <p:spPr>
           <a:xfrm>
-            <a:off x="4495800" y="1905000"/>
+            <a:off x="3352800" y="2362200"/>
             <a:ext cx="1143000" cy="457200"/>
           </a:xfrm>
           <a:prstGeom prst="ellipse">
@@ -9285,7 +9608,7 @@
         </p:nvCxnSpPr>
         <p:spPr>
           <a:xfrm rot="16200000" flipH="1">
-            <a:off x="6186628" y="1547671"/>
+            <a:off x="5043628" y="2004871"/>
             <a:ext cx="371755" cy="476811"/>
           </a:xfrm>
           <a:prstGeom prst="straightConnector1">
@@ -9321,7 +9644,7 @@
         </p:nvCxnSpPr>
         <p:spPr>
           <a:xfrm rot="5400000">
-            <a:off x="5448300" y="1219200"/>
+            <a:off x="4305300" y="1676400"/>
             <a:ext cx="304800" cy="1066800"/>
           </a:xfrm>
           <a:prstGeom prst="straightConnector1">
@@ -9354,7 +9677,7 @@
         </p:nvSpPr>
         <p:spPr>
           <a:xfrm>
-            <a:off x="4724400" y="1524000"/>
+            <a:off x="3581400" y="1981200"/>
             <a:ext cx="808042" cy="369332"/>
           </a:xfrm>
           <a:prstGeom prst="rect">
@@ -9384,7 +9707,7 @@
         </p:nvSpPr>
         <p:spPr>
           <a:xfrm>
-            <a:off x="6629400" y="1524000"/>
+            <a:off x="5486400" y="1981200"/>
             <a:ext cx="654346" cy="369332"/>
           </a:xfrm>
           <a:prstGeom prst="rect">
@@ -9406,6 +9729,528 @@
           </a:p>
         </p:txBody>
       </p:sp>
+    </p:spTree>
+  </p:cSld>
+  <p:clrMapOvr>
+    <a:masterClrMapping/>
+  </p:clrMapOvr>
+</p:sld>
+</file>
+
+<file path=ppt/slides/slide6.xml><?xml version="1.0" encoding="utf-8"?>
+<p:sld xmlns:a="http://schemas.openxmlformats.org/drawingml/2006/main" xmlns:r="http://schemas.openxmlformats.org/officeDocument/2006/relationships" xmlns:p="http://schemas.openxmlformats.org/presentationml/2006/main">
+  <p:cSld>
+    <p:spTree>
+      <p:nvGrpSpPr>
+        <p:cNvPr id="1" name=""/>
+        <p:cNvGrpSpPr/>
+        <p:nvPr/>
+      </p:nvGrpSpPr>
+      <p:grpSpPr>
+        <a:xfrm>
+          <a:off x="0" y="0"/>
+          <a:ext cx="0" cy="0"/>
+          <a:chOff x="0" y="0"/>
+          <a:chExt cx="0" cy="0"/>
+        </a:xfrm>
+      </p:grpSpPr>
+      <p:sp>
+        <p:nvSpPr>
+          <p:cNvPr id="7" name="Oval 6"/>
+          <p:cNvSpPr/>
+          <p:nvPr/>
+        </p:nvSpPr>
+        <p:spPr>
+          <a:xfrm>
+            <a:off x="4572000" y="762000"/>
+            <a:ext cx="3581400" cy="457200"/>
+          </a:xfrm>
+          <a:prstGeom prst="ellipse">
+            <a:avLst/>
+          </a:prstGeom>
+        </p:spPr>
+        <p:style>
+          <a:lnRef idx="2">
+            <a:schemeClr val="accent1">
+              <a:shade val="50000"/>
+            </a:schemeClr>
+          </a:lnRef>
+          <a:fillRef idx="1">
+            <a:schemeClr val="accent1"/>
+          </a:fillRef>
+          <a:effectRef idx="0">
+            <a:schemeClr val="accent1"/>
+          </a:effectRef>
+          <a:fontRef idx="minor">
+            <a:schemeClr val="lt1"/>
+          </a:fontRef>
+        </p:style>
+        <p:txBody>
+          <a:bodyPr rtlCol="0" anchor="ctr"/>
+          <a:lstStyle/>
+          <a:p>
+            <a:pPr algn="ctr"/>
+            <a:r>
+              <a:rPr lang="en-US" smtClean="0"/>
+              <a:t>iterate(result=self; i</a:t>
+            </a:r>
+            <a:r>
+              <a:rPr lang="en-US" smtClean="0"/>
+              <a:t>|...)</a:t>
+            </a:r>
+            <a:endParaRPr lang="en-US"/>
+          </a:p>
+        </p:txBody>
+      </p:sp>
+      <p:sp>
+        <p:nvSpPr>
+          <p:cNvPr id="9" name="Oval 8"/>
+          <p:cNvSpPr/>
+          <p:nvPr/>
+        </p:nvSpPr>
+        <p:spPr>
+          <a:xfrm>
+            <a:off x="4267200" y="1524000"/>
+            <a:ext cx="1524000" cy="457200"/>
+          </a:xfrm>
+          <a:prstGeom prst="ellipse">
+            <a:avLst/>
+          </a:prstGeom>
+        </p:spPr>
+        <p:style>
+          <a:lnRef idx="2">
+            <a:schemeClr val="accent1">
+              <a:shade val="50000"/>
+            </a:schemeClr>
+          </a:lnRef>
+          <a:fillRef idx="1">
+            <a:schemeClr val="accent1"/>
+          </a:fillRef>
+          <a:effectRef idx="0">
+            <a:schemeClr val="accent1"/>
+          </a:effectRef>
+          <a:fontRef idx="minor">
+            <a:schemeClr val="lt1"/>
+          </a:fontRef>
+        </p:style>
+        <p:txBody>
+          <a:bodyPr rtlCol="0" anchor="ctr"/>
+          <a:lstStyle/>
+          <a:p>
+            <a:pPr algn="ctr"/>
+            <a:r>
+              <a:rPr lang="en-US" smtClean="0"/>
+              <a:t>self</a:t>
+            </a:r>
+            <a:r>
+              <a:rPr lang="en-US" smtClean="0"/>
+              <a:t>.a</a:t>
+            </a:r>
+            <a:r>
+              <a:rPr lang="en-US" smtClean="0"/>
+              <a:t>.d</a:t>
+            </a:r>
+            <a:endParaRPr lang="en-US"/>
+          </a:p>
+        </p:txBody>
+      </p:sp>
+      <p:cxnSp>
+        <p:nvCxnSpPr>
+          <p:cNvPr id="26" name="Straight Arrow Connector 25"/>
+          <p:cNvCxnSpPr>
+            <a:stCxn id="7" idx="4"/>
+            <a:endCxn id="50" idx="1"/>
+          </p:cNvCxnSpPr>
+          <p:nvPr/>
+        </p:nvCxnSpPr>
+        <p:spPr>
+          <a:xfrm rot="16200000" flipH="1">
+            <a:off x="6334406" y="1247494"/>
+            <a:ext cx="371755" cy="315166"/>
+          </a:xfrm>
+          <a:prstGeom prst="straightConnector1">
+            <a:avLst/>
+          </a:prstGeom>
+          <a:ln>
+            <a:tailEnd type="arrow"/>
+          </a:ln>
+        </p:spPr>
+        <p:style>
+          <a:lnRef idx="1">
+            <a:schemeClr val="accent1"/>
+          </a:lnRef>
+          <a:fillRef idx="0">
+            <a:schemeClr val="accent1"/>
+          </a:fillRef>
+          <a:effectRef idx="0">
+            <a:schemeClr val="accent1"/>
+          </a:effectRef>
+          <a:fontRef idx="minor">
+            <a:schemeClr val="tx1"/>
+          </a:fontRef>
+        </p:style>
+      </p:cxnSp>
+      <p:cxnSp>
+        <p:nvCxnSpPr>
+          <p:cNvPr id="28" name="Straight Arrow Connector 27"/>
+          <p:cNvCxnSpPr>
+            <a:stCxn id="7" idx="4"/>
+            <a:endCxn id="9" idx="0"/>
+          </p:cNvCxnSpPr>
+          <p:nvPr/>
+        </p:nvCxnSpPr>
+        <p:spPr>
+          <a:xfrm rot="5400000">
+            <a:off x="5543550" y="704850"/>
+            <a:ext cx="304800" cy="1333500"/>
+          </a:xfrm>
+          <a:prstGeom prst="straightConnector1">
+            <a:avLst/>
+          </a:prstGeom>
+          <a:ln>
+            <a:tailEnd type="arrow"/>
+          </a:ln>
+        </p:spPr>
+        <p:style>
+          <a:lnRef idx="1">
+            <a:schemeClr val="accent1"/>
+          </a:lnRef>
+          <a:fillRef idx="0">
+            <a:schemeClr val="accent1"/>
+          </a:fillRef>
+          <a:effectRef idx="0">
+            <a:schemeClr val="accent1"/>
+          </a:effectRef>
+          <a:fontRef idx="minor">
+            <a:schemeClr val="tx1"/>
+          </a:fontRef>
+        </p:style>
+      </p:cxnSp>
+      <p:sp>
+        <p:nvSpPr>
+          <p:cNvPr id="48" name="TextBox 47"/>
+          <p:cNvSpPr txBox="1"/>
+          <p:nvPr/>
+        </p:nvSpPr>
+        <p:spPr>
+          <a:xfrm>
+            <a:off x="4876800" y="1143000"/>
+            <a:ext cx="808042" cy="369332"/>
+          </a:xfrm>
+          <a:prstGeom prst="rect">
+            <a:avLst/>
+          </a:prstGeom>
+          <a:noFill/>
+        </p:spPr>
+        <p:txBody>
+          <a:bodyPr wrap="none" rtlCol="0">
+            <a:spAutoFit/>
+          </a:bodyPr>
+          <a:lstStyle/>
+          <a:p>
+            <a:r>
+              <a:rPr lang="en-US" smtClean="0"/>
+              <a:t>source</a:t>
+            </a:r>
+            <a:endParaRPr lang="en-US"/>
+          </a:p>
+        </p:txBody>
+      </p:sp>
+      <p:sp>
+        <p:nvSpPr>
+          <p:cNvPr id="49" name="TextBox 48"/>
+          <p:cNvSpPr txBox="1"/>
+          <p:nvPr/>
+        </p:nvSpPr>
+        <p:spPr>
+          <a:xfrm>
+            <a:off x="6781800" y="1143000"/>
+            <a:ext cx="654346" cy="369332"/>
+          </a:xfrm>
+          <a:prstGeom prst="rect">
+            <a:avLst/>
+          </a:prstGeom>
+          <a:noFill/>
+        </p:spPr>
+        <p:txBody>
+          <a:bodyPr wrap="none" rtlCol="0">
+            <a:spAutoFit/>
+          </a:bodyPr>
+          <a:lstStyle/>
+          <a:p>
+            <a:r>
+              <a:rPr lang="en-US" smtClean="0"/>
+              <a:t>body</a:t>
+            </a:r>
+            <a:endParaRPr lang="en-US"/>
+          </a:p>
+        </p:txBody>
+      </p:sp>
+      <p:sp>
+        <p:nvSpPr>
+          <p:cNvPr id="50" name="Oval 49"/>
+          <p:cNvSpPr/>
+          <p:nvPr/>
+        </p:nvSpPr>
+        <p:spPr>
+          <a:xfrm>
+            <a:off x="6477000" y="1524000"/>
+            <a:ext cx="1371600" cy="457200"/>
+          </a:xfrm>
+          <a:prstGeom prst="ellipse">
+            <a:avLst/>
+          </a:prstGeom>
+        </p:spPr>
+        <p:style>
+          <a:lnRef idx="2">
+            <a:schemeClr val="accent1">
+              <a:shade val="50000"/>
+            </a:schemeClr>
+          </a:lnRef>
+          <a:fillRef idx="1">
+            <a:schemeClr val="accent1"/>
+          </a:fillRef>
+          <a:effectRef idx="0">
+            <a:schemeClr val="accent1"/>
+          </a:effectRef>
+          <a:fontRef idx="minor">
+            <a:schemeClr val="lt1"/>
+          </a:fontRef>
+        </p:style>
+        <p:txBody>
+          <a:bodyPr rtlCol="0" anchor="ctr"/>
+          <a:lstStyle/>
+          <a:p>
+            <a:pPr algn="ctr"/>
+            <a:r>
+              <a:rPr lang="en-US" smtClean="0"/>
+              <a:t>result.c</a:t>
+            </a:r>
+            <a:endParaRPr lang="en-US"/>
+          </a:p>
+        </p:txBody>
+      </p:sp>
+      <p:sp>
+        <p:nvSpPr>
+          <p:cNvPr id="64" name="TextBox 63"/>
+          <p:cNvSpPr txBox="1"/>
+          <p:nvPr/>
+        </p:nvSpPr>
+        <p:spPr>
+          <a:xfrm>
+            <a:off x="381000" y="838200"/>
+            <a:ext cx="3657600" cy="5355312"/>
+          </a:xfrm>
+          <a:prstGeom prst="rect">
+            <a:avLst/>
+          </a:prstGeom>
+          <a:noFill/>
+        </p:spPr>
+        <p:txBody>
+          <a:bodyPr wrap="square" rtlCol="0">
+            <a:spAutoFit/>
+          </a:bodyPr>
+          <a:lstStyle/>
+          <a:p>
+            <a:pPr>
+              <a:buFont typeface="Arial" pitchFamily="34" charset="0"/>
+              <a:buChar char="•"/>
+            </a:pPr>
+            <a:r>
+              <a:rPr lang="en-US" smtClean="0"/>
+              <a:t>traceback for result, entering result value for current dynamic scope #n; unused for result--&gt; result.c--&gt; [[self.a.d]] with unknown self--&gt; iterate (false)</a:t>
+            </a:r>
+          </a:p>
+          <a:p>
+            <a:pPr>
+              <a:buFont typeface="Arial" pitchFamily="34" charset="0"/>
+              <a:buChar char="•"/>
+            </a:pPr>
+            <a:r>
+              <a:rPr lang="en-US" smtClean="0"/>
+              <a:t>branch:</a:t>
+            </a:r>
+          </a:p>
+          <a:p>
+            <a:pPr lvl="1">
+              <a:buFont typeface="Arial" pitchFamily="34" charset="0"/>
+              <a:buChar char="•"/>
+            </a:pPr>
+            <a:r>
+              <a:rPr lang="en-US" smtClean="0"/>
+              <a:t>traceback for self, infers one of </a:t>
+            </a:r>
+            <a:r>
+              <a:rPr lang="en-US" b="1" smtClean="0"/>
+              <a:t>potentially several </a:t>
+            </a:r>
+            <a:r>
+              <a:rPr lang="en-US" smtClean="0"/>
+              <a:t>values for self; unused for self--&gt; iterate (false)</a:t>
+            </a:r>
+          </a:p>
+          <a:p>
+            <a:pPr lvl="1">
+              <a:buFont typeface="Arial" pitchFamily="34" charset="0"/>
+              <a:buChar char="•"/>
+            </a:pPr>
+            <a:r>
+              <a:rPr lang="en-US" smtClean="0"/>
+              <a:t>traceback for result.c, entering new dynamic scope for result.c (n++); unused for result.c but in different dynamic scope than the one cached--&gt;[[self.a.d]] with yet unknown self (self values inferred on the other branch don't count in this branch)</a:t>
+            </a:r>
+          </a:p>
+        </p:txBody>
+      </p:sp>
+      <p:sp>
+        <p:nvSpPr>
+          <p:cNvPr id="77" name="Oval 76"/>
+          <p:cNvSpPr/>
+          <p:nvPr/>
+        </p:nvSpPr>
+        <p:spPr>
+          <a:xfrm flipH="1">
+            <a:off x="6705600" y="1600200"/>
+            <a:ext cx="914400" cy="304800"/>
+          </a:xfrm>
+          <a:prstGeom prst="ellipse">
+            <a:avLst/>
+          </a:prstGeom>
+          <a:noFill/>
+          <a:ln>
+            <a:solidFill>
+              <a:srgbClr val="FF0000"/>
+            </a:solidFill>
+          </a:ln>
+        </p:spPr>
+        <p:style>
+          <a:lnRef idx="2">
+            <a:schemeClr val="accent1">
+              <a:shade val="50000"/>
+            </a:schemeClr>
+          </a:lnRef>
+          <a:fillRef idx="1">
+            <a:schemeClr val="accent1"/>
+          </a:fillRef>
+          <a:effectRef idx="0">
+            <a:schemeClr val="accent1"/>
+          </a:effectRef>
+          <a:fontRef idx="minor">
+            <a:schemeClr val="lt1"/>
+          </a:fontRef>
+        </p:style>
+        <p:txBody>
+          <a:bodyPr rtlCol="0" anchor="ctr"/>
+          <a:lstStyle/>
+          <a:p>
+            <a:pPr algn="ctr"/>
+            <a:endParaRPr lang="en-US"/>
+          </a:p>
+        </p:txBody>
+      </p:sp>
+      <p:cxnSp>
+        <p:nvCxnSpPr>
+          <p:cNvPr id="79" name="Straight Arrow Connector 78"/>
+          <p:cNvCxnSpPr>
+            <a:endCxn id="80" idx="1"/>
+          </p:cNvCxnSpPr>
+          <p:nvPr/>
+        </p:nvCxnSpPr>
+        <p:spPr>
+          <a:xfrm>
+            <a:off x="3886200" y="2971800"/>
+            <a:ext cx="762000" cy="246966"/>
+          </a:xfrm>
+          <a:prstGeom prst="straightConnector1">
+            <a:avLst/>
+          </a:prstGeom>
+          <a:ln>
+            <a:tailEnd type="arrow"/>
+          </a:ln>
+        </p:spPr>
+        <p:style>
+          <a:lnRef idx="1">
+            <a:schemeClr val="accent1"/>
+          </a:lnRef>
+          <a:fillRef idx="0">
+            <a:schemeClr val="accent1"/>
+          </a:fillRef>
+          <a:effectRef idx="0">
+            <a:schemeClr val="accent1"/>
+          </a:effectRef>
+          <a:fontRef idx="minor">
+            <a:schemeClr val="tx1"/>
+          </a:fontRef>
+        </p:style>
+      </p:cxnSp>
+      <p:sp>
+        <p:nvSpPr>
+          <p:cNvPr id="80" name="TextBox 79"/>
+          <p:cNvSpPr txBox="1"/>
+          <p:nvPr/>
+        </p:nvSpPr>
+        <p:spPr>
+          <a:xfrm>
+            <a:off x="4648200" y="2895600"/>
+            <a:ext cx="4495800" cy="646331"/>
+          </a:xfrm>
+          <a:prstGeom prst="rect">
+            <a:avLst/>
+          </a:prstGeom>
+          <a:noFill/>
+        </p:spPr>
+        <p:txBody>
+          <a:bodyPr wrap="square" rtlCol="0">
+            <a:spAutoFit/>
+          </a:bodyPr>
+          <a:lstStyle/>
+          <a:p>
+            <a:r>
+              <a:rPr lang="en-US" smtClean="0"/>
+              <a:t>If a value is inferred for self, this triggers the [[self.a.d]] callback</a:t>
+            </a:r>
+          </a:p>
+        </p:txBody>
+      </p:sp>
+      <p:cxnSp>
+        <p:nvCxnSpPr>
+          <p:cNvPr id="91" name="Elbow Connector 90"/>
+          <p:cNvCxnSpPr>
+            <a:stCxn id="64" idx="2"/>
+            <a:endCxn id="64" idx="0"/>
+          </p:cNvCxnSpPr>
+          <p:nvPr/>
+        </p:nvCxnSpPr>
+        <p:spPr>
+          <a:xfrm rot="5400000" flipH="1">
+            <a:off x="-467856" y="3515856"/>
+            <a:ext cx="5355312" cy="1588"/>
+          </a:xfrm>
+          <a:prstGeom prst="bentConnector5">
+            <a:avLst>
+              <a:gd name="adj1" fmla="val -4269"/>
+              <a:gd name="adj2" fmla="val 129559194"/>
+              <a:gd name="adj3" fmla="val 104269"/>
+            </a:avLst>
+          </a:prstGeom>
+          <a:ln>
+            <a:tailEnd type="arrow"/>
+          </a:ln>
+        </p:spPr>
+        <p:style>
+          <a:lnRef idx="1">
+            <a:schemeClr val="accent1"/>
+          </a:lnRef>
+          <a:fillRef idx="0">
+            <a:schemeClr val="accent1"/>
+          </a:fillRef>
+          <a:effectRef idx="0">
+            <a:schemeClr val="accent1"/>
+          </a:effectRef>
+          <a:fontRef idx="minor">
+            <a:schemeClr val="tx1"/>
+          </a:fontRef>
+        </p:style>
+      </p:cxnSp>
     </p:spTree>
   </p:cSld>
   <p:clrMapOvr>
@@ -9695,4 +10540,287 @@
   <a:objectDefaults/>
   <a:extraClrSchemeLst/>
 </a:theme>
+</file>
+
+<file path=ppt/theme/theme2.xml><?xml version="1.0" encoding="utf-8"?>
+<a:theme xmlns:a="http://schemas.openxmlformats.org/drawingml/2006/main" name="Office Theme">
+  <a:themeElements>
+    <a:clrScheme name="Office">
+      <a:dk1>
+        <a:sysClr val="windowText" lastClr="000000"/>
+      </a:dk1>
+      <a:lt1>
+        <a:sysClr val="window" lastClr="FFFFFF"/>
+      </a:lt1>
+      <a:dk2>
+        <a:srgbClr val="1F497D"/>
+      </a:dk2>
+      <a:lt2>
+        <a:srgbClr val="EEECE1"/>
+      </a:lt2>
+      <a:accent1>
+        <a:srgbClr val="4F81BD"/>
+      </a:accent1>
+      <a:accent2>
+        <a:srgbClr val="C0504D"/>
+      </a:accent2>
+      <a:accent3>
+        <a:srgbClr val="9BBB59"/>
+      </a:accent3>
+      <a:accent4>
+        <a:srgbClr val="8064A2"/>
+      </a:accent4>
+      <a:accent5>
+        <a:srgbClr val="4BACC6"/>
+      </a:accent5>
+      <a:accent6>
+        <a:srgbClr val="F79646"/>
+      </a:accent6>
+      <a:hlink>
+        <a:srgbClr val="0000FF"/>
+      </a:hlink>
+      <a:folHlink>
+        <a:srgbClr val="800080"/>
+      </a:folHlink>
+    </a:clrScheme>
+    <a:fontScheme name="Office">
+      <a:majorFont>
+        <a:latin typeface="Calibri"/>
+        <a:ea typeface=""/>
+        <a:cs typeface=""/>
+        <a:font script="Jpan" typeface="ＭＳ Ｐゴシック"/>
+        <a:font script="Hang" typeface="맑은 고딕"/>
+        <a:font script="Hans" typeface="宋体"/>
+        <a:font script="Hant" typeface="新細明體"/>
+        <a:font script="Arab" typeface="Times New Roman"/>
+        <a:font script="Hebr" typeface="Times New Roman"/>
+        <a:font script="Thai" typeface="Angsana New"/>
+        <a:font script="Ethi" typeface="Nyala"/>
+        <a:font script="Beng" typeface="Vrinda"/>
+        <a:font script="Gujr" typeface="Shruti"/>
+        <a:font script="Khmr" typeface="MoolBoran"/>
+        <a:font script="Knda" typeface="Tunga"/>
+        <a:font script="Guru" typeface="Raavi"/>
+        <a:font script="Cans" typeface="Euphemia"/>
+        <a:font script="Cher" typeface="Plantagenet Cherokee"/>
+        <a:font script="Yiii" typeface="Microsoft Yi Baiti"/>
+        <a:font script="Tibt" typeface="Microsoft Himalaya"/>
+        <a:font script="Thaa" typeface="MV Boli"/>
+        <a:font script="Deva" typeface="Mangal"/>
+        <a:font script="Telu" typeface="Gautami"/>
+        <a:font script="Taml" typeface="Latha"/>
+        <a:font script="Syrc" typeface="Estrangelo Edessa"/>
+        <a:font script="Orya" typeface="Kalinga"/>
+        <a:font script="Mlym" typeface="Kartika"/>
+        <a:font script="Laoo" typeface="DokChampa"/>
+        <a:font script="Sinh" typeface="Iskoola Pota"/>
+        <a:font script="Mong" typeface="Mongolian Baiti"/>
+        <a:font script="Viet" typeface="Times New Roman"/>
+        <a:font script="Uigh" typeface="Microsoft Uighur"/>
+      </a:majorFont>
+      <a:minorFont>
+        <a:latin typeface="Calibri"/>
+        <a:ea typeface=""/>
+        <a:cs typeface=""/>
+        <a:font script="Jpan" typeface="ＭＳ Ｐゴシック"/>
+        <a:font script="Hang" typeface="맑은 고딕"/>
+        <a:font script="Hans" typeface="宋体"/>
+        <a:font script="Hant" typeface="新細明體"/>
+        <a:font script="Arab" typeface="Arial"/>
+        <a:font script="Hebr" typeface="Arial"/>
+        <a:font script="Thai" typeface="Cordia New"/>
+        <a:font script="Ethi" typeface="Nyala"/>
+        <a:font script="Beng" typeface="Vrinda"/>
+        <a:font script="Gujr" typeface="Shruti"/>
+        <a:font script="Khmr" typeface="DaunPenh"/>
+        <a:font script="Knda" typeface="Tunga"/>
+        <a:font script="Guru" typeface="Raavi"/>
+        <a:font script="Cans" typeface="Euphemia"/>
+        <a:font script="Cher" typeface="Plantagenet Cherokee"/>
+        <a:font script="Yiii" typeface="Microsoft Yi Baiti"/>
+        <a:font script="Tibt" typeface="Microsoft Himalaya"/>
+        <a:font script="Thaa" typeface="MV Boli"/>
+        <a:font script="Deva" typeface="Mangal"/>
+        <a:font script="Telu" typeface="Gautami"/>
+        <a:font script="Taml" typeface="Latha"/>
+        <a:font script="Syrc" typeface="Estrangelo Edessa"/>
+        <a:font script="Orya" typeface="Kalinga"/>
+        <a:font script="Mlym" typeface="Kartika"/>
+        <a:font script="Laoo" typeface="DokChampa"/>
+        <a:font script="Sinh" typeface="Iskoola Pota"/>
+        <a:font script="Mong" typeface="Mongolian Baiti"/>
+        <a:font script="Viet" typeface="Arial"/>
+        <a:font script="Uigh" typeface="Microsoft Uighur"/>
+      </a:minorFont>
+    </a:fontScheme>
+    <a:fmtScheme name="Office">
+      <a:fillStyleLst>
+        <a:solidFill>
+          <a:schemeClr val="phClr"/>
+        </a:solidFill>
+        <a:gradFill rotWithShape="1">
+          <a:gsLst>
+            <a:gs pos="0">
+              <a:schemeClr val="phClr">
+                <a:tint val="50000"/>
+                <a:satMod val="300000"/>
+              </a:schemeClr>
+            </a:gs>
+            <a:gs pos="35000">
+              <a:schemeClr val="phClr">
+                <a:tint val="37000"/>
+                <a:satMod val="300000"/>
+              </a:schemeClr>
+            </a:gs>
+            <a:gs pos="100000">
+              <a:schemeClr val="phClr">
+                <a:tint val="15000"/>
+                <a:satMod val="350000"/>
+              </a:schemeClr>
+            </a:gs>
+          </a:gsLst>
+          <a:lin ang="16200000" scaled="1"/>
+        </a:gradFill>
+        <a:gradFill rotWithShape="1">
+          <a:gsLst>
+            <a:gs pos="0">
+              <a:schemeClr val="phClr">
+                <a:shade val="51000"/>
+                <a:satMod val="130000"/>
+              </a:schemeClr>
+            </a:gs>
+            <a:gs pos="80000">
+              <a:schemeClr val="phClr">
+                <a:shade val="93000"/>
+                <a:satMod val="130000"/>
+              </a:schemeClr>
+            </a:gs>
+            <a:gs pos="100000">
+              <a:schemeClr val="phClr">
+                <a:shade val="94000"/>
+                <a:satMod val="135000"/>
+              </a:schemeClr>
+            </a:gs>
+          </a:gsLst>
+          <a:lin ang="16200000" scaled="0"/>
+        </a:gradFill>
+      </a:fillStyleLst>
+      <a:lnStyleLst>
+        <a:ln w="9525" cap="flat" cmpd="sng" algn="ctr">
+          <a:solidFill>
+            <a:schemeClr val="phClr">
+              <a:shade val="95000"/>
+              <a:satMod val="105000"/>
+            </a:schemeClr>
+          </a:solidFill>
+          <a:prstDash val="solid"/>
+        </a:ln>
+        <a:ln w="25400" cap="flat" cmpd="sng" algn="ctr">
+          <a:solidFill>
+            <a:schemeClr val="phClr"/>
+          </a:solidFill>
+          <a:prstDash val="solid"/>
+        </a:ln>
+        <a:ln w="38100" cap="flat" cmpd="sng" algn="ctr">
+          <a:solidFill>
+            <a:schemeClr val="phClr"/>
+          </a:solidFill>
+          <a:prstDash val="solid"/>
+        </a:ln>
+      </a:lnStyleLst>
+      <a:effectStyleLst>
+        <a:effectStyle>
+          <a:effectLst>
+            <a:outerShdw blurRad="40000" dist="20000" dir="5400000" rotWithShape="0">
+              <a:srgbClr val="000000">
+                <a:alpha val="38000"/>
+              </a:srgbClr>
+            </a:outerShdw>
+          </a:effectLst>
+        </a:effectStyle>
+        <a:effectStyle>
+          <a:effectLst>
+            <a:outerShdw blurRad="40000" dist="23000" dir="5400000" rotWithShape="0">
+              <a:srgbClr val="000000">
+                <a:alpha val="35000"/>
+              </a:srgbClr>
+            </a:outerShdw>
+          </a:effectLst>
+        </a:effectStyle>
+        <a:effectStyle>
+          <a:effectLst>
+            <a:outerShdw blurRad="40000" dist="23000" dir="5400000" rotWithShape="0">
+              <a:srgbClr val="000000">
+                <a:alpha val="35000"/>
+              </a:srgbClr>
+            </a:outerShdw>
+          </a:effectLst>
+          <a:scene3d>
+            <a:camera prst="orthographicFront">
+              <a:rot lat="0" lon="0" rev="0"/>
+            </a:camera>
+            <a:lightRig rig="threePt" dir="t">
+              <a:rot lat="0" lon="0" rev="1200000"/>
+            </a:lightRig>
+          </a:scene3d>
+          <a:sp3d>
+            <a:bevelT w="63500" h="25400"/>
+          </a:sp3d>
+        </a:effectStyle>
+      </a:effectStyleLst>
+      <a:bgFillStyleLst>
+        <a:solidFill>
+          <a:schemeClr val="phClr"/>
+        </a:solidFill>
+        <a:gradFill rotWithShape="1">
+          <a:gsLst>
+            <a:gs pos="0">
+              <a:schemeClr val="phClr">
+                <a:tint val="40000"/>
+                <a:satMod val="350000"/>
+              </a:schemeClr>
+            </a:gs>
+            <a:gs pos="40000">
+              <a:schemeClr val="phClr">
+                <a:tint val="45000"/>
+                <a:shade val="99000"/>
+                <a:satMod val="350000"/>
+              </a:schemeClr>
+            </a:gs>
+            <a:gs pos="100000">
+              <a:schemeClr val="phClr">
+                <a:shade val="20000"/>
+                <a:satMod val="255000"/>
+              </a:schemeClr>
+            </a:gs>
+          </a:gsLst>
+          <a:path path="circle">
+            <a:fillToRect l="50000" t="-80000" r="50000" b="180000"/>
+          </a:path>
+        </a:gradFill>
+        <a:gradFill rotWithShape="1">
+          <a:gsLst>
+            <a:gs pos="0">
+              <a:schemeClr val="phClr">
+                <a:tint val="80000"/>
+                <a:satMod val="300000"/>
+              </a:schemeClr>
+            </a:gs>
+            <a:gs pos="100000">
+              <a:schemeClr val="phClr">
+                <a:shade val="30000"/>
+                <a:satMod val="200000"/>
+              </a:schemeClr>
+            </a:gs>
+          </a:gsLst>
+          <a:path path="circle">
+            <a:fillToRect l="50000" t="50000" r="50000" b="50000"/>
+          </a:path>
+        </a:gradFill>
+      </a:bgFillStyleLst>
+    </a:fmtScheme>
+  </a:themeElements>
+  <a:objectDefaults/>
+  <a:extraClrSchemeLst/>
+</a:theme>
 </file>
</xml_diff>

<commit_message>
unused checks work now; however, with the current test cases, it seems that performance got slightly worse. It needs to be determined if that's more in up-front effort or in execution
git-svn-id: https://www.hpi.uni-potsdam.de/giese/gforge/svn/bp2009/sources/trunk@1663 3ca8e212-6386-4b1e-b09d-39f68028012c
</commit_message>
<xml_diff>
--- a/de.hpi.sam.bp2009.solution.impactAnalyzer/ExampleTree.pptx
+++ b/de.hpi.sam.bp2009.solution.impactAnalyzer/ExampleTree.pptx
@@ -5,15 +5,16 @@
     <p:sldMasterId id="2147483648" r:id="rId1"/>
   </p:sldMasterIdLst>
   <p:notesMasterIdLst>
-    <p:notesMasterId r:id="rId8"/>
+    <p:notesMasterId r:id="rId9"/>
   </p:notesMasterIdLst>
   <p:sldIdLst>
     <p:sldId id="256" r:id="rId2"/>
     <p:sldId id="257" r:id="rId3"/>
     <p:sldId id="258" r:id="rId4"/>
     <p:sldId id="260" r:id="rId5"/>
-    <p:sldId id="259" r:id="rId6"/>
-    <p:sldId id="261" r:id="rId7"/>
+    <p:sldId id="262" r:id="rId6"/>
+    <p:sldId id="259" r:id="rId7"/>
+    <p:sldId id="261" r:id="rId8"/>
   </p:sldIdLst>
   <p:sldSz cx="9144000" cy="6858000" type="screen4x3"/>
   <p:notesSz cx="6858000" cy="9144000"/>
@@ -644,7 +645,88 @@
           <a:p>
             <a:fld id="{F62A7951-5499-4090-9D1E-621054BD335E}" type="slidenum">
               <a:rPr lang="en-US" smtClean="0"/>
-              <a:t>6</a:t>
+              <a:t>5</a:t>
+            </a:fld>
+            <a:endParaRPr lang="en-US"/>
+          </a:p>
+        </p:txBody>
+      </p:sp>
+    </p:spTree>
+  </p:cSld>
+  <p:clrMapOvr>
+    <a:masterClrMapping/>
+  </p:clrMapOvr>
+</p:notes>
+</file>
+
+<file path=ppt/notesSlides/notesSlide3.xml><?xml version="1.0" encoding="utf-8"?>
+<p:notes xmlns:a="http://schemas.openxmlformats.org/drawingml/2006/main" xmlns:r="http://schemas.openxmlformats.org/officeDocument/2006/relationships" xmlns:p="http://schemas.openxmlformats.org/presentationml/2006/main">
+  <p:cSld>
+    <p:spTree>
+      <p:nvGrpSpPr>
+        <p:cNvPr id="1" name=""/>
+        <p:cNvGrpSpPr/>
+        <p:nvPr/>
+      </p:nvGrpSpPr>
+      <p:grpSpPr>
+        <a:xfrm>
+          <a:off x="0" y="0"/>
+          <a:ext cx="0" cy="0"/>
+          <a:chOff x="0" y="0"/>
+          <a:chExt cx="0" cy="0"/>
+        </a:xfrm>
+      </p:grpSpPr>
+      <p:sp>
+        <p:nvSpPr>
+          <p:cNvPr id="2" name="Slide Image Placeholder 1"/>
+          <p:cNvSpPr>
+            <a:spLocks noGrp="1" noRot="1" noChangeAspect="1"/>
+          </p:cNvSpPr>
+          <p:nvPr>
+            <p:ph type="sldImg"/>
+          </p:nvPr>
+        </p:nvSpPr>
+        <p:spPr/>
+      </p:sp>
+      <p:sp>
+        <p:nvSpPr>
+          <p:cNvPr id="3" name="Notes Placeholder 2"/>
+          <p:cNvSpPr>
+            <a:spLocks noGrp="1"/>
+          </p:cNvSpPr>
+          <p:nvPr>
+            <p:ph type="body" idx="1"/>
+          </p:nvPr>
+        </p:nvSpPr>
+        <p:spPr/>
+        <p:txBody>
+          <a:bodyPr>
+            <a:normAutofit/>
+          </a:bodyPr>
+          <a:lstStyle/>
+          <a:p>
+            <a:endParaRPr lang="en-US"/>
+          </a:p>
+        </p:txBody>
+      </p:sp>
+      <p:sp>
+        <p:nvSpPr>
+          <p:cNvPr id="4" name="Slide Number Placeholder 3"/>
+          <p:cNvSpPr>
+            <a:spLocks noGrp="1"/>
+          </p:cNvSpPr>
+          <p:nvPr>
+            <p:ph type="sldNum" sz="quarter" idx="10"/>
+          </p:nvPr>
+        </p:nvSpPr>
+        <p:spPr/>
+        <p:txBody>
+          <a:bodyPr/>
+          <a:lstStyle/>
+          <a:p>
+            <a:fld id="{F62A7951-5499-4090-9D1E-621054BD335E}" type="slidenum">
+              <a:rPr lang="en-US" smtClean="0"/>
+              <a:t>7</a:t>
             </a:fld>
             <a:endParaRPr lang="en-US"/>
           </a:p>
@@ -8867,6 +8949,284 @@
       </p:grpSpPr>
       <p:sp>
         <p:nvSpPr>
+          <p:cNvPr id="64" name="TextBox 63"/>
+          <p:cNvSpPr txBox="1"/>
+          <p:nvPr/>
+        </p:nvSpPr>
+        <p:spPr>
+          <a:xfrm>
+            <a:off x="381000" y="304800"/>
+            <a:ext cx="5334000" cy="2862322"/>
+          </a:xfrm>
+          <a:prstGeom prst="rect">
+            <a:avLst/>
+          </a:prstGeom>
+          <a:noFill/>
+        </p:spPr>
+        <p:txBody>
+          <a:bodyPr wrap="square" rtlCol="0">
+            <a:spAutoFit/>
+          </a:bodyPr>
+          <a:lstStyle/>
+          <a:p>
+            <a:pPr>
+              <a:buFont typeface="Arial" pitchFamily="34" charset="0"/>
+              <a:buChar char="•"/>
+            </a:pPr>
+            <a:r>
+              <a:rPr lang="en-US" smtClean="0"/>
+              <a:t>traceback for x.z in d(...) infers x, branch:</a:t>
+            </a:r>
+          </a:p>
+          <a:p>
+            <a:pPr lvl="1">
+              <a:buFont typeface="Arial" pitchFamily="34" charset="0"/>
+              <a:buChar char="•"/>
+            </a:pPr>
+            <a:r>
+              <a:rPr lang="en-US" smtClean="0"/>
+              <a:t>traces back to self.d(x,y) and infers x, traces back to self.b(x, y) and infers x --&gt; [[x.z&gt;y.z]] for unknown y@0</a:t>
+            </a:r>
+          </a:p>
+          <a:p>
+            <a:pPr lvl="1">
+              <a:buFont typeface="Arial" pitchFamily="34" charset="0"/>
+              <a:buChar char="•"/>
+            </a:pPr>
+            <a:r>
+              <a:rPr lang="en-US" smtClean="0"/>
+              <a:t>traces back to self.d(y,x) and infers y, traces back to self.c(x, y) and infers y@1; does not trigger [[x.z&gt;y.z]] because dynamic scope y@0&lt;&gt;y@1.</a:t>
+            </a:r>
+          </a:p>
+          <a:p>
+            <a:pPr lvl="1">
+              <a:buFont typeface="Arial" pitchFamily="34" charset="0"/>
+              <a:buChar char="•"/>
+            </a:pPr>
+            <a:endParaRPr lang="en-US" smtClean="0"/>
+          </a:p>
+          <a:p>
+            <a:r>
+              <a:rPr lang="en-US" smtClean="0"/>
+              <a:t>Problem: actually, the dynamic scopes would have been the same</a:t>
+            </a:r>
+          </a:p>
+        </p:txBody>
+      </p:sp>
+      <p:sp>
+        <p:nvSpPr>
+          <p:cNvPr id="38" name="TextBox 37"/>
+          <p:cNvSpPr txBox="1"/>
+          <p:nvPr/>
+        </p:nvSpPr>
+        <p:spPr>
+          <a:xfrm>
+            <a:off x="6019800" y="304800"/>
+            <a:ext cx="2743200" cy="4247317"/>
+          </a:xfrm>
+          <a:prstGeom prst="rect">
+            <a:avLst/>
+          </a:prstGeom>
+          <a:noFill/>
+        </p:spPr>
+        <p:txBody>
+          <a:bodyPr wrap="square" rtlCol="0">
+            <a:spAutoFit/>
+          </a:bodyPr>
+          <a:lstStyle/>
+          <a:p>
+            <a:r>
+              <a:rPr lang="en-US" smtClean="0"/>
+              <a:t>a(x:T, y:T):Integer body:</a:t>
+            </a:r>
+          </a:p>
+          <a:p>
+            <a:r>
+              <a:rPr lang="en-US" smtClean="0"/>
+              <a:t> </a:t>
+            </a:r>
+            <a:r>
+              <a:rPr lang="en-US" smtClean="0"/>
+              <a:t> if x.z &gt; y.z then</a:t>
+            </a:r>
+          </a:p>
+          <a:p>
+            <a:r>
+              <a:rPr lang="en-US" smtClean="0"/>
+              <a:t>    self.b(x, y) + self.c(x, y)</a:t>
+            </a:r>
+          </a:p>
+          <a:p>
+            <a:r>
+              <a:rPr lang="en-US" smtClean="0"/>
+              <a:t> </a:t>
+            </a:r>
+            <a:r>
+              <a:rPr lang="en-US" smtClean="0"/>
+              <a:t> else</a:t>
+            </a:r>
+          </a:p>
+          <a:p>
+            <a:r>
+              <a:rPr lang="en-US" smtClean="0"/>
+              <a:t> </a:t>
+            </a:r>
+            <a:r>
+              <a:rPr lang="en-US" smtClean="0"/>
+              <a:t>   ...</a:t>
+            </a:r>
+          </a:p>
+          <a:p>
+            <a:r>
+              <a:rPr lang="en-US" smtClean="0"/>
+              <a:t> </a:t>
+            </a:r>
+            <a:r>
+              <a:rPr lang="en-US" smtClean="0"/>
+              <a:t> endif</a:t>
+            </a:r>
+          </a:p>
+          <a:p>
+            <a:endParaRPr lang="en-US" smtClean="0"/>
+          </a:p>
+          <a:p>
+            <a:r>
+              <a:rPr lang="en-US" smtClean="0"/>
+              <a:t>b(x:T, y:T):Integer body:</a:t>
+            </a:r>
+          </a:p>
+          <a:p>
+            <a:r>
+              <a:rPr lang="en-US" smtClean="0"/>
+              <a:t> </a:t>
+            </a:r>
+            <a:r>
+              <a:rPr lang="en-US" smtClean="0"/>
+              <a:t> self.d(x, y)</a:t>
+            </a:r>
+          </a:p>
+          <a:p>
+            <a:endParaRPr lang="en-US" smtClean="0"/>
+          </a:p>
+          <a:p>
+            <a:r>
+              <a:rPr lang="en-US" smtClean="0"/>
+              <a:t>c(x:T, y:T):Integer body:</a:t>
+            </a:r>
+          </a:p>
+          <a:p>
+            <a:r>
+              <a:rPr lang="en-US" smtClean="0"/>
+              <a:t> </a:t>
+            </a:r>
+            <a:r>
+              <a:rPr lang="en-US" smtClean="0"/>
+              <a:t> self.d(</a:t>
+            </a:r>
+            <a:r>
+              <a:rPr lang="en-US" b="1" smtClean="0"/>
+              <a:t>y, x</a:t>
+            </a:r>
+            <a:r>
+              <a:rPr lang="en-US" smtClean="0"/>
+              <a:t>)</a:t>
+            </a:r>
+          </a:p>
+          <a:p>
+            <a:endParaRPr lang="en-US" smtClean="0"/>
+          </a:p>
+          <a:p>
+            <a:r>
+              <a:rPr lang="en-US" smtClean="0"/>
+              <a:t>d(x:T, y:T):Integer body:</a:t>
+            </a:r>
+          </a:p>
+          <a:p>
+            <a:r>
+              <a:rPr lang="en-US" smtClean="0"/>
+              <a:t> </a:t>
+            </a:r>
+            <a:r>
+              <a:rPr lang="en-US" smtClean="0"/>
+              <a:t> x.z + y.z</a:t>
+            </a:r>
+            <a:endParaRPr lang="en-US"/>
+          </a:p>
+        </p:txBody>
+      </p:sp>
+      <p:sp>
+        <p:nvSpPr>
+          <p:cNvPr id="40" name="Oval 39"/>
+          <p:cNvSpPr/>
+          <p:nvPr/>
+        </p:nvSpPr>
+        <p:spPr>
+          <a:xfrm flipH="1">
+            <a:off x="6172200" y="4191000"/>
+            <a:ext cx="304800" cy="304800"/>
+          </a:xfrm>
+          <a:prstGeom prst="ellipse">
+            <a:avLst/>
+          </a:prstGeom>
+          <a:noFill/>
+          <a:ln>
+            <a:solidFill>
+              <a:srgbClr val="FF0000"/>
+            </a:solidFill>
+          </a:ln>
+        </p:spPr>
+        <p:style>
+          <a:lnRef idx="2">
+            <a:schemeClr val="accent1">
+              <a:shade val="50000"/>
+            </a:schemeClr>
+          </a:lnRef>
+          <a:fillRef idx="1">
+            <a:schemeClr val="accent1"/>
+          </a:fillRef>
+          <a:effectRef idx="0">
+            <a:schemeClr val="accent1"/>
+          </a:effectRef>
+          <a:fontRef idx="minor">
+            <a:schemeClr val="lt1"/>
+          </a:fontRef>
+        </p:style>
+        <p:txBody>
+          <a:bodyPr rtlCol="0" anchor="ctr"/>
+          <a:lstStyle/>
+          <a:p>
+            <a:pPr algn="ctr"/>
+            <a:endParaRPr lang="en-US"/>
+          </a:p>
+        </p:txBody>
+      </p:sp>
+    </p:spTree>
+  </p:cSld>
+  <p:clrMapOvr>
+    <a:masterClrMapping/>
+  </p:clrMapOvr>
+</p:sld>
+</file>
+
+<file path=ppt/slides/slide6.xml><?xml version="1.0" encoding="utf-8"?>
+<p:sld xmlns:a="http://schemas.openxmlformats.org/drawingml/2006/main" xmlns:r="http://schemas.openxmlformats.org/officeDocument/2006/relationships" xmlns:p="http://schemas.openxmlformats.org/presentationml/2006/main">
+  <p:cSld>
+    <p:spTree>
+      <p:nvGrpSpPr>
+        <p:cNvPr id="1" name=""/>
+        <p:cNvGrpSpPr/>
+        <p:nvPr/>
+      </p:nvGrpSpPr>
+      <p:grpSpPr>
+        <a:xfrm>
+          <a:off x="0" y="0"/>
+          <a:ext cx="0" cy="0"/>
+          <a:chOff x="0" y="0"/>
+          <a:chExt cx="0" cy="0"/>
+        </a:xfrm>
+      </p:grpSpPr>
+      <p:sp>
+        <p:nvSpPr>
           <p:cNvPr id="50" name="Oval 49"/>
           <p:cNvSpPr/>
           <p:nvPr/>
@@ -9737,7 +10097,7 @@
 </p:sld>
 </file>
 
-<file path=ppt/slides/slide6.xml><?xml version="1.0" encoding="utf-8"?>
+<file path=ppt/slides/slide7.xml><?xml version="1.0" encoding="utf-8"?>
 <p:sld xmlns:a="http://schemas.openxmlformats.org/drawingml/2006/main" xmlns:r="http://schemas.openxmlformats.org/officeDocument/2006/relationships" xmlns:p="http://schemas.openxmlformats.org/presentationml/2006/main">
   <p:cSld>
     <p:spTree>

</xml_diff>